<commit_message>
Update: new DXS crystal setups (option 1 and 2)
</commit_message>
<xml_diff>
--- a/06-25-21_Meeting.pptx
+++ b/06-25-21_Meeting.pptx
@@ -135,6 +135,9 @@
           </p14:sldIdLst>
         </p14:section>
       </p14:sectionLst>
+    </p:ext>
+    <p:ext uri="{EFAFB233-063F-42B5-8137-9DF3F51BA10A}">
+      <p15:sldGuideLst xmlns:p15="http://schemas.microsoft.com/office/powerpoint/2012/main"/>
     </p:ext>
   </p:extLst>
 </p:presentation>
@@ -3610,7 +3613,7 @@
             <p:nvPr/>
           </p:nvCxnSpPr>
           <p:spPr>
-            <a:xfrm rot="10800000">
+            <a:xfrm>
               <a:off x="396858" y="2013417"/>
               <a:ext cx="0" cy="1945341"/>
             </a:xfrm>
@@ -4952,11 +4955,13 @@
                 </a:ext>
               </a:extLst>
             </p:cNvPr>
-            <p:cNvCxnSpPr/>
+            <p:cNvCxnSpPr>
+              <a:cxnSpLocks/>
+            </p:cNvCxnSpPr>
             <p:nvPr/>
           </p:nvCxnSpPr>
           <p:spPr>
-            <a:xfrm>
+            <a:xfrm rot="10800000">
               <a:off x="396858" y="2013417"/>
               <a:ext cx="0" cy="1945341"/>
             </a:xfrm>
@@ -5351,11 +5356,13 @@
                 </a:ext>
               </a:extLst>
             </p:cNvPr>
-            <p:cNvCxnSpPr/>
+            <p:cNvCxnSpPr>
+              <a:cxnSpLocks/>
+            </p:cNvCxnSpPr>
             <p:nvPr/>
           </p:nvCxnSpPr>
           <p:spPr>
-            <a:xfrm>
+            <a:xfrm rot="10800000">
               <a:off x="396858" y="2013417"/>
               <a:ext cx="0" cy="1945341"/>
             </a:xfrm>
@@ -5756,7 +5763,7 @@
             <p:nvPr/>
           </p:nvCxnSpPr>
           <p:spPr>
-            <a:xfrm rot="10800000">
+            <a:xfrm>
               <a:off x="396858" y="2013417"/>
               <a:ext cx="0" cy="1945341"/>
             </a:xfrm>
@@ -6157,7 +6164,7 @@
             <p:nvPr/>
           </p:nvCxnSpPr>
           <p:spPr>
-            <a:xfrm rot="10800000">
+            <a:xfrm>
               <a:off x="396858" y="2013417"/>
               <a:ext cx="0" cy="1945341"/>
             </a:xfrm>
@@ -6558,7 +6565,7 @@
             <p:nvPr/>
           </p:nvCxnSpPr>
           <p:spPr>
-            <a:xfrm rot="10800000">
+            <a:xfrm>
               <a:off x="396858" y="2013417"/>
               <a:ext cx="0" cy="1945341"/>
             </a:xfrm>

</xml_diff>

<commit_message>
Update: new summary slides
</commit_message>
<xml_diff>
--- a/06-25-21_Meeting.pptx
+++ b/06-25-21_Meeting.pptx
@@ -4,6 +4,9 @@
   <p:sldMasterIdLst>
     <p:sldMasterId id="2147483648" r:id="rId1"/>
   </p:sldMasterIdLst>
+  <p:notesMasterIdLst>
+    <p:notesMasterId r:id="rId18"/>
+  </p:notesMasterIdLst>
   <p:sldIdLst>
     <p:sldId id="256" r:id="rId2"/>
     <p:sldId id="257" r:id="rId3"/>
@@ -15,6 +18,12 @@
     <p:sldId id="263" r:id="rId9"/>
     <p:sldId id="264" r:id="rId10"/>
     <p:sldId id="265" r:id="rId11"/>
+    <p:sldId id="269" r:id="rId12"/>
+    <p:sldId id="270" r:id="rId13"/>
+    <p:sldId id="266" r:id="rId14"/>
+    <p:sldId id="271" r:id="rId15"/>
+    <p:sldId id="272" r:id="rId16"/>
+    <p:sldId id="267" r:id="rId17"/>
   </p:sldIdLst>
   <p:sldSz cx="12192000" cy="6858000"/>
   <p:notesSz cx="6858000" cy="9144000"/>
@@ -134,6 +143,20 @@
             <p14:sldId id="265"/>
           </p14:sldIdLst>
         </p14:section>
+        <p14:section name="option1" id="{39B2A507-41BD-4DB6-BE60-E6A213A83A07}">
+          <p14:sldIdLst>
+            <p14:sldId id="269"/>
+            <p14:sldId id="270"/>
+            <p14:sldId id="266"/>
+          </p14:sldIdLst>
+        </p14:section>
+        <p14:section name="full-option2" id="{5E4261CB-BE16-4402-A487-14300437F034}">
+          <p14:sldIdLst>
+            <p14:sldId id="271"/>
+            <p14:sldId id="272"/>
+            <p14:sldId id="267"/>
+          </p14:sldIdLst>
+        </p14:section>
       </p14:sectionLst>
     </p:ext>
     <p:ext uri="{EFAFB233-063F-42B5-8137-9DF3F51BA10A}">
@@ -141,6 +164,523 @@
     </p:ext>
   </p:extLst>
 </p:presentation>
+</file>
+
+<file path=ppt/notesMasters/notesMaster1.xml><?xml version="1.0" encoding="utf-8"?>
+<p:notesMaster xmlns:a="http://schemas.openxmlformats.org/drawingml/2006/main" xmlns:r="http://schemas.openxmlformats.org/officeDocument/2006/relationships" xmlns:p="http://schemas.openxmlformats.org/presentationml/2006/main">
+  <p:cSld>
+    <p:bg>
+      <p:bgRef idx="1001">
+        <a:schemeClr val="bg1"/>
+      </p:bgRef>
+    </p:bg>
+    <p:spTree>
+      <p:nvGrpSpPr>
+        <p:cNvPr id="1" name=""/>
+        <p:cNvGrpSpPr/>
+        <p:nvPr/>
+      </p:nvGrpSpPr>
+      <p:grpSpPr>
+        <a:xfrm>
+          <a:off x="0" y="0"/>
+          <a:ext cx="0" cy="0"/>
+          <a:chOff x="0" y="0"/>
+          <a:chExt cx="0" cy="0"/>
+        </a:xfrm>
+      </p:grpSpPr>
+      <p:sp>
+        <p:nvSpPr>
+          <p:cNvPr id="2" name="页眉占位符 1"/>
+          <p:cNvSpPr>
+            <a:spLocks noGrp="1"/>
+          </p:cNvSpPr>
+          <p:nvPr>
+            <p:ph type="hdr" sz="quarter"/>
+          </p:nvPr>
+        </p:nvSpPr>
+        <p:spPr>
+          <a:xfrm>
+            <a:off x="0" y="0"/>
+            <a:ext cx="2971800" cy="458788"/>
+          </a:xfrm>
+          <a:prstGeom prst="rect">
+            <a:avLst/>
+          </a:prstGeom>
+        </p:spPr>
+        <p:txBody>
+          <a:bodyPr vert="horz" lIns="91440" tIns="45720" rIns="91440" bIns="45720" rtlCol="0"/>
+          <a:lstStyle>
+            <a:lvl1pPr algn="l">
+              <a:defRPr sz="1200"/>
+            </a:lvl1pPr>
+          </a:lstStyle>
+          <a:p>
+            <a:endParaRPr lang="zh-CN" altLang="en-US"/>
+          </a:p>
+        </p:txBody>
+      </p:sp>
+      <p:sp>
+        <p:nvSpPr>
+          <p:cNvPr id="3" name="日期占位符 2"/>
+          <p:cNvSpPr>
+            <a:spLocks noGrp="1"/>
+          </p:cNvSpPr>
+          <p:nvPr>
+            <p:ph type="dt" idx="1"/>
+          </p:nvPr>
+        </p:nvSpPr>
+        <p:spPr>
+          <a:xfrm>
+            <a:off x="3884613" y="0"/>
+            <a:ext cx="2971800" cy="458788"/>
+          </a:xfrm>
+          <a:prstGeom prst="rect">
+            <a:avLst/>
+          </a:prstGeom>
+        </p:spPr>
+        <p:txBody>
+          <a:bodyPr vert="horz" lIns="91440" tIns="45720" rIns="91440" bIns="45720" rtlCol="0"/>
+          <a:lstStyle>
+            <a:lvl1pPr algn="r">
+              <a:defRPr sz="1200"/>
+            </a:lvl1pPr>
+          </a:lstStyle>
+          <a:p>
+            <a:fld id="{0CEEE009-7277-4A06-BBBC-24F6D41C1EA5}" type="datetimeFigureOut">
+              <a:rPr lang="zh-CN" altLang="en-US" smtClean="0"/>
+              <a:t>2021/6/26</a:t>
+            </a:fld>
+            <a:endParaRPr lang="zh-CN" altLang="en-US"/>
+          </a:p>
+        </p:txBody>
+      </p:sp>
+      <p:sp>
+        <p:nvSpPr>
+          <p:cNvPr id="4" name="幻灯片图像占位符 3"/>
+          <p:cNvSpPr>
+            <a:spLocks noGrp="1" noRot="1" noChangeAspect="1"/>
+          </p:cNvSpPr>
+          <p:nvPr>
+            <p:ph type="sldImg" idx="2"/>
+          </p:nvPr>
+        </p:nvSpPr>
+        <p:spPr>
+          <a:xfrm>
+            <a:off x="685800" y="1143000"/>
+            <a:ext cx="5486400" cy="3086100"/>
+          </a:xfrm>
+          <a:prstGeom prst="rect">
+            <a:avLst/>
+          </a:prstGeom>
+          <a:noFill/>
+          <a:ln w="12700">
+            <a:solidFill>
+              <a:prstClr val="black"/>
+            </a:solidFill>
+          </a:ln>
+        </p:spPr>
+        <p:txBody>
+          <a:bodyPr vert="horz" lIns="91440" tIns="45720" rIns="91440" bIns="45720" rtlCol="0" anchor="ctr"/>
+          <a:lstStyle/>
+          <a:p>
+            <a:endParaRPr lang="zh-CN" altLang="en-US"/>
+          </a:p>
+        </p:txBody>
+      </p:sp>
+      <p:sp>
+        <p:nvSpPr>
+          <p:cNvPr id="5" name="备注占位符 4"/>
+          <p:cNvSpPr>
+            <a:spLocks noGrp="1"/>
+          </p:cNvSpPr>
+          <p:nvPr>
+            <p:ph type="body" sz="quarter" idx="3"/>
+          </p:nvPr>
+        </p:nvSpPr>
+        <p:spPr>
+          <a:xfrm>
+            <a:off x="685800" y="4400550"/>
+            <a:ext cx="5486400" cy="3600450"/>
+          </a:xfrm>
+          <a:prstGeom prst="rect">
+            <a:avLst/>
+          </a:prstGeom>
+        </p:spPr>
+        <p:txBody>
+          <a:bodyPr vert="horz" lIns="91440" tIns="45720" rIns="91440" bIns="45720" rtlCol="0"/>
+          <a:lstStyle/>
+          <a:p>
+            <a:pPr lvl="0"/>
+            <a:r>
+              <a:rPr lang="zh-CN" altLang="en-US"/>
+              <a:t>单击此处编辑母版文本样式</a:t>
+            </a:r>
+          </a:p>
+          <a:p>
+            <a:pPr lvl="1"/>
+            <a:r>
+              <a:rPr lang="zh-CN" altLang="en-US"/>
+              <a:t>二级</a:t>
+            </a:r>
+          </a:p>
+          <a:p>
+            <a:pPr lvl="2"/>
+            <a:r>
+              <a:rPr lang="zh-CN" altLang="en-US"/>
+              <a:t>三级</a:t>
+            </a:r>
+          </a:p>
+          <a:p>
+            <a:pPr lvl="3"/>
+            <a:r>
+              <a:rPr lang="zh-CN" altLang="en-US"/>
+              <a:t>四级</a:t>
+            </a:r>
+          </a:p>
+          <a:p>
+            <a:pPr lvl="4"/>
+            <a:r>
+              <a:rPr lang="zh-CN" altLang="en-US"/>
+              <a:t>五级</a:t>
+            </a:r>
+          </a:p>
+        </p:txBody>
+      </p:sp>
+      <p:sp>
+        <p:nvSpPr>
+          <p:cNvPr id="6" name="页脚占位符 5"/>
+          <p:cNvSpPr>
+            <a:spLocks noGrp="1"/>
+          </p:cNvSpPr>
+          <p:nvPr>
+            <p:ph type="ftr" sz="quarter" idx="4"/>
+          </p:nvPr>
+        </p:nvSpPr>
+        <p:spPr>
+          <a:xfrm>
+            <a:off x="0" y="8685213"/>
+            <a:ext cx="2971800" cy="458787"/>
+          </a:xfrm>
+          <a:prstGeom prst="rect">
+            <a:avLst/>
+          </a:prstGeom>
+        </p:spPr>
+        <p:txBody>
+          <a:bodyPr vert="horz" lIns="91440" tIns="45720" rIns="91440" bIns="45720" rtlCol="0" anchor="b"/>
+          <a:lstStyle>
+            <a:lvl1pPr algn="l">
+              <a:defRPr sz="1200"/>
+            </a:lvl1pPr>
+          </a:lstStyle>
+          <a:p>
+            <a:endParaRPr lang="zh-CN" altLang="en-US"/>
+          </a:p>
+        </p:txBody>
+      </p:sp>
+      <p:sp>
+        <p:nvSpPr>
+          <p:cNvPr id="7" name="灯片编号占位符 6"/>
+          <p:cNvSpPr>
+            <a:spLocks noGrp="1"/>
+          </p:cNvSpPr>
+          <p:nvPr>
+            <p:ph type="sldNum" sz="quarter" idx="5"/>
+          </p:nvPr>
+        </p:nvSpPr>
+        <p:spPr>
+          <a:xfrm>
+            <a:off x="3884613" y="8685213"/>
+            <a:ext cx="2971800" cy="458787"/>
+          </a:xfrm>
+          <a:prstGeom prst="rect">
+            <a:avLst/>
+          </a:prstGeom>
+        </p:spPr>
+        <p:txBody>
+          <a:bodyPr vert="horz" lIns="91440" tIns="45720" rIns="91440" bIns="45720" rtlCol="0" anchor="b"/>
+          <a:lstStyle>
+            <a:lvl1pPr algn="r">
+              <a:defRPr sz="1200"/>
+            </a:lvl1pPr>
+          </a:lstStyle>
+          <a:p>
+            <a:fld id="{5020031F-FCA8-49D6-95C1-FC62A29DDECE}" type="slidenum">
+              <a:rPr lang="zh-CN" altLang="en-US" smtClean="0"/>
+              <a:t>‹#›</a:t>
+            </a:fld>
+            <a:endParaRPr lang="zh-CN" altLang="en-US"/>
+          </a:p>
+        </p:txBody>
+      </p:sp>
+    </p:spTree>
+    <p:extLst>
+      <p:ext uri="{BB962C8B-B14F-4D97-AF65-F5344CB8AC3E}">
+        <p14:creationId xmlns:p14="http://schemas.microsoft.com/office/powerpoint/2010/main" val="22398410"/>
+      </p:ext>
+    </p:extLst>
+  </p:cSld>
+  <p:clrMap bg1="lt1" tx1="dk1" bg2="lt2" tx2="dk2" accent1="accent1" accent2="accent2" accent3="accent3" accent4="accent4" accent5="accent5" accent6="accent6" hlink="hlink" folHlink="folHlink"/>
+  <p:notesStyle>
+    <a:lvl1pPr marL="0" algn="l" defTabSz="914400" rtl="0" eaLnBrk="1" latinLnBrk="0" hangingPunct="1">
+      <a:defRPr sz="1200" kern="1200">
+        <a:solidFill>
+          <a:schemeClr val="tx1"/>
+        </a:solidFill>
+        <a:latin typeface="+mn-lt"/>
+        <a:ea typeface="+mn-ea"/>
+        <a:cs typeface="+mn-cs"/>
+      </a:defRPr>
+    </a:lvl1pPr>
+    <a:lvl2pPr marL="457200" algn="l" defTabSz="914400" rtl="0" eaLnBrk="1" latinLnBrk="0" hangingPunct="1">
+      <a:defRPr sz="1200" kern="1200">
+        <a:solidFill>
+          <a:schemeClr val="tx1"/>
+        </a:solidFill>
+        <a:latin typeface="+mn-lt"/>
+        <a:ea typeface="+mn-ea"/>
+        <a:cs typeface="+mn-cs"/>
+      </a:defRPr>
+    </a:lvl2pPr>
+    <a:lvl3pPr marL="914400" algn="l" defTabSz="914400" rtl="0" eaLnBrk="1" latinLnBrk="0" hangingPunct="1">
+      <a:defRPr sz="1200" kern="1200">
+        <a:solidFill>
+          <a:schemeClr val="tx1"/>
+        </a:solidFill>
+        <a:latin typeface="+mn-lt"/>
+        <a:ea typeface="+mn-ea"/>
+        <a:cs typeface="+mn-cs"/>
+      </a:defRPr>
+    </a:lvl3pPr>
+    <a:lvl4pPr marL="1371600" algn="l" defTabSz="914400" rtl="0" eaLnBrk="1" latinLnBrk="0" hangingPunct="1">
+      <a:defRPr sz="1200" kern="1200">
+        <a:solidFill>
+          <a:schemeClr val="tx1"/>
+        </a:solidFill>
+        <a:latin typeface="+mn-lt"/>
+        <a:ea typeface="+mn-ea"/>
+        <a:cs typeface="+mn-cs"/>
+      </a:defRPr>
+    </a:lvl4pPr>
+    <a:lvl5pPr marL="1828800" algn="l" defTabSz="914400" rtl="0" eaLnBrk="1" latinLnBrk="0" hangingPunct="1">
+      <a:defRPr sz="1200" kern="1200">
+        <a:solidFill>
+          <a:schemeClr val="tx1"/>
+        </a:solidFill>
+        <a:latin typeface="+mn-lt"/>
+        <a:ea typeface="+mn-ea"/>
+        <a:cs typeface="+mn-cs"/>
+      </a:defRPr>
+    </a:lvl5pPr>
+    <a:lvl6pPr marL="2286000" algn="l" defTabSz="914400" rtl="0" eaLnBrk="1" latinLnBrk="0" hangingPunct="1">
+      <a:defRPr sz="1200" kern="1200">
+        <a:solidFill>
+          <a:schemeClr val="tx1"/>
+        </a:solidFill>
+        <a:latin typeface="+mn-lt"/>
+        <a:ea typeface="+mn-ea"/>
+        <a:cs typeface="+mn-cs"/>
+      </a:defRPr>
+    </a:lvl6pPr>
+    <a:lvl7pPr marL="2743200" algn="l" defTabSz="914400" rtl="0" eaLnBrk="1" latinLnBrk="0" hangingPunct="1">
+      <a:defRPr sz="1200" kern="1200">
+        <a:solidFill>
+          <a:schemeClr val="tx1"/>
+        </a:solidFill>
+        <a:latin typeface="+mn-lt"/>
+        <a:ea typeface="+mn-ea"/>
+        <a:cs typeface="+mn-cs"/>
+      </a:defRPr>
+    </a:lvl7pPr>
+    <a:lvl8pPr marL="3200400" algn="l" defTabSz="914400" rtl="0" eaLnBrk="1" latinLnBrk="0" hangingPunct="1">
+      <a:defRPr sz="1200" kern="1200">
+        <a:solidFill>
+          <a:schemeClr val="tx1"/>
+        </a:solidFill>
+        <a:latin typeface="+mn-lt"/>
+        <a:ea typeface="+mn-ea"/>
+        <a:cs typeface="+mn-cs"/>
+      </a:defRPr>
+    </a:lvl8pPr>
+    <a:lvl9pPr marL="3657600" algn="l" defTabSz="914400" rtl="0" eaLnBrk="1" latinLnBrk="0" hangingPunct="1">
+      <a:defRPr sz="1200" kern="1200">
+        <a:solidFill>
+          <a:schemeClr val="tx1"/>
+        </a:solidFill>
+        <a:latin typeface="+mn-lt"/>
+        <a:ea typeface="+mn-ea"/>
+        <a:cs typeface="+mn-cs"/>
+      </a:defRPr>
+    </a:lvl9pPr>
+  </p:notesStyle>
+</p:notesMaster>
+</file>
+
+<file path=ppt/notesSlides/notesSlide1.xml><?xml version="1.0" encoding="utf-8"?>
+<p:notes xmlns:a="http://schemas.openxmlformats.org/drawingml/2006/main" xmlns:r="http://schemas.openxmlformats.org/officeDocument/2006/relationships" xmlns:p="http://schemas.openxmlformats.org/presentationml/2006/main">
+  <p:cSld>
+    <p:spTree>
+      <p:nvGrpSpPr>
+        <p:cNvPr id="1" name=""/>
+        <p:cNvGrpSpPr/>
+        <p:nvPr/>
+      </p:nvGrpSpPr>
+      <p:grpSpPr>
+        <a:xfrm>
+          <a:off x="0" y="0"/>
+          <a:ext cx="0" cy="0"/>
+          <a:chOff x="0" y="0"/>
+          <a:chExt cx="0" cy="0"/>
+        </a:xfrm>
+      </p:grpSpPr>
+      <p:sp>
+        <p:nvSpPr>
+          <p:cNvPr id="2" name="幻灯片图像占位符 1"/>
+          <p:cNvSpPr>
+            <a:spLocks noGrp="1" noRot="1" noChangeAspect="1"/>
+          </p:cNvSpPr>
+          <p:nvPr>
+            <p:ph type="sldImg"/>
+          </p:nvPr>
+        </p:nvSpPr>
+        <p:spPr/>
+      </p:sp>
+      <p:sp>
+        <p:nvSpPr>
+          <p:cNvPr id="3" name="备注占位符 2"/>
+          <p:cNvSpPr>
+            <a:spLocks noGrp="1"/>
+          </p:cNvSpPr>
+          <p:nvPr>
+            <p:ph type="body" idx="1"/>
+          </p:nvPr>
+        </p:nvSpPr>
+        <p:spPr/>
+        <p:txBody>
+          <a:bodyPr/>
+          <a:lstStyle/>
+          <a:p>
+            <a:endParaRPr lang="zh-CN" altLang="en-US" dirty="0"/>
+          </a:p>
+        </p:txBody>
+      </p:sp>
+      <p:sp>
+        <p:nvSpPr>
+          <p:cNvPr id="4" name="灯片编号占位符 3"/>
+          <p:cNvSpPr>
+            <a:spLocks noGrp="1"/>
+          </p:cNvSpPr>
+          <p:nvPr>
+            <p:ph type="sldNum" sz="quarter" idx="5"/>
+          </p:nvPr>
+        </p:nvSpPr>
+        <p:spPr/>
+        <p:txBody>
+          <a:bodyPr/>
+          <a:lstStyle/>
+          <a:p>
+            <a:fld id="{5020031F-FCA8-49D6-95C1-FC62A29DDECE}" type="slidenum">
+              <a:rPr lang="zh-CN" altLang="en-US" smtClean="0"/>
+              <a:t>11</a:t>
+            </a:fld>
+            <a:endParaRPr lang="zh-CN" altLang="en-US"/>
+          </a:p>
+        </p:txBody>
+      </p:sp>
+    </p:spTree>
+    <p:extLst>
+      <p:ext uri="{BB962C8B-B14F-4D97-AF65-F5344CB8AC3E}">
+        <p14:creationId xmlns:p14="http://schemas.microsoft.com/office/powerpoint/2010/main" val="477483290"/>
+      </p:ext>
+    </p:extLst>
+  </p:cSld>
+  <p:clrMapOvr>
+    <a:masterClrMapping/>
+  </p:clrMapOvr>
+</p:notes>
+</file>
+
+<file path=ppt/notesSlides/notesSlide2.xml><?xml version="1.0" encoding="utf-8"?>
+<p:notes xmlns:a="http://schemas.openxmlformats.org/drawingml/2006/main" xmlns:r="http://schemas.openxmlformats.org/officeDocument/2006/relationships" xmlns:p="http://schemas.openxmlformats.org/presentationml/2006/main">
+  <p:cSld>
+    <p:spTree>
+      <p:nvGrpSpPr>
+        <p:cNvPr id="1" name=""/>
+        <p:cNvGrpSpPr/>
+        <p:nvPr/>
+      </p:nvGrpSpPr>
+      <p:grpSpPr>
+        <a:xfrm>
+          <a:off x="0" y="0"/>
+          <a:ext cx="0" cy="0"/>
+          <a:chOff x="0" y="0"/>
+          <a:chExt cx="0" cy="0"/>
+        </a:xfrm>
+      </p:grpSpPr>
+      <p:sp>
+        <p:nvSpPr>
+          <p:cNvPr id="2" name="幻灯片图像占位符 1"/>
+          <p:cNvSpPr>
+            <a:spLocks noGrp="1" noRot="1" noChangeAspect="1"/>
+          </p:cNvSpPr>
+          <p:nvPr>
+            <p:ph type="sldImg"/>
+          </p:nvPr>
+        </p:nvSpPr>
+        <p:spPr/>
+      </p:sp>
+      <p:sp>
+        <p:nvSpPr>
+          <p:cNvPr id="3" name="备注占位符 2"/>
+          <p:cNvSpPr>
+            <a:spLocks noGrp="1"/>
+          </p:cNvSpPr>
+          <p:nvPr>
+            <p:ph type="body" idx="1"/>
+          </p:nvPr>
+        </p:nvSpPr>
+        <p:spPr/>
+        <p:txBody>
+          <a:bodyPr/>
+          <a:lstStyle/>
+          <a:p>
+            <a:endParaRPr lang="zh-CN" altLang="en-US" dirty="0"/>
+          </a:p>
+        </p:txBody>
+      </p:sp>
+      <p:sp>
+        <p:nvSpPr>
+          <p:cNvPr id="4" name="灯片编号占位符 3"/>
+          <p:cNvSpPr>
+            <a:spLocks noGrp="1"/>
+          </p:cNvSpPr>
+          <p:nvPr>
+            <p:ph type="sldNum" sz="quarter" idx="5"/>
+          </p:nvPr>
+        </p:nvSpPr>
+        <p:spPr/>
+        <p:txBody>
+          <a:bodyPr/>
+          <a:lstStyle/>
+          <a:p>
+            <a:fld id="{5020031F-FCA8-49D6-95C1-FC62A29DDECE}" type="slidenum">
+              <a:rPr lang="zh-CN" altLang="en-US" smtClean="0"/>
+              <a:t>14</a:t>
+            </a:fld>
+            <a:endParaRPr lang="zh-CN" altLang="en-US"/>
+          </a:p>
+        </p:txBody>
+      </p:sp>
+    </p:spTree>
+    <p:extLst>
+      <p:ext uri="{BB962C8B-B14F-4D97-AF65-F5344CB8AC3E}">
+        <p14:creationId xmlns:p14="http://schemas.microsoft.com/office/powerpoint/2010/main" val="4227952875"/>
+      </p:ext>
+    </p:extLst>
+  </p:cSld>
+  <p:clrMapOvr>
+    <a:masterClrMapping/>
+  </p:clrMapOvr>
+</p:notes>
 </file>
 
 <file path=ppt/slideLayouts/slideLayout1.xml><?xml version="1.0" encoding="utf-8"?>
@@ -290,7 +830,7 @@
           <a:p>
             <a:fld id="{06161B35-A5D1-400A-97A7-7B15B42727C3}" type="datetimeFigureOut">
               <a:rPr lang="zh-CN" altLang="en-US" smtClean="0"/>
-              <a:t>2021/6/25</a:t>
+              <a:t>2021/6/26</a:t>
             </a:fld>
             <a:endParaRPr lang="zh-CN" altLang="en-US"/>
           </a:p>
@@ -488,7 +1028,7 @@
           <a:p>
             <a:fld id="{06161B35-A5D1-400A-97A7-7B15B42727C3}" type="datetimeFigureOut">
               <a:rPr lang="zh-CN" altLang="en-US" smtClean="0"/>
-              <a:t>2021/6/25</a:t>
+              <a:t>2021/6/26</a:t>
             </a:fld>
             <a:endParaRPr lang="zh-CN" altLang="en-US"/>
           </a:p>
@@ -696,7 +1236,7 @@
           <a:p>
             <a:fld id="{06161B35-A5D1-400A-97A7-7B15B42727C3}" type="datetimeFigureOut">
               <a:rPr lang="zh-CN" altLang="en-US" smtClean="0"/>
-              <a:t>2021/6/25</a:t>
+              <a:t>2021/6/26</a:t>
             </a:fld>
             <a:endParaRPr lang="zh-CN" altLang="en-US"/>
           </a:p>
@@ -894,7 +1434,7 @@
           <a:p>
             <a:fld id="{06161B35-A5D1-400A-97A7-7B15B42727C3}" type="datetimeFigureOut">
               <a:rPr lang="zh-CN" altLang="en-US" smtClean="0"/>
-              <a:t>2021/6/25</a:t>
+              <a:t>2021/6/26</a:t>
             </a:fld>
             <a:endParaRPr lang="zh-CN" altLang="en-US"/>
           </a:p>
@@ -1169,7 +1709,7 @@
           <a:p>
             <a:fld id="{06161B35-A5D1-400A-97A7-7B15B42727C3}" type="datetimeFigureOut">
               <a:rPr lang="zh-CN" altLang="en-US" smtClean="0"/>
-              <a:t>2021/6/25</a:t>
+              <a:t>2021/6/26</a:t>
             </a:fld>
             <a:endParaRPr lang="zh-CN" altLang="en-US"/>
           </a:p>
@@ -1434,7 +1974,7 @@
           <a:p>
             <a:fld id="{06161B35-A5D1-400A-97A7-7B15B42727C3}" type="datetimeFigureOut">
               <a:rPr lang="zh-CN" altLang="en-US" smtClean="0"/>
-              <a:t>2021/6/25</a:t>
+              <a:t>2021/6/26</a:t>
             </a:fld>
             <a:endParaRPr lang="zh-CN" altLang="en-US"/>
           </a:p>
@@ -1846,7 +2386,7 @@
           <a:p>
             <a:fld id="{06161B35-A5D1-400A-97A7-7B15B42727C3}" type="datetimeFigureOut">
               <a:rPr lang="zh-CN" altLang="en-US" smtClean="0"/>
-              <a:t>2021/6/25</a:t>
+              <a:t>2021/6/26</a:t>
             </a:fld>
             <a:endParaRPr lang="zh-CN" altLang="en-US"/>
           </a:p>
@@ -1987,7 +2527,7 @@
           <a:p>
             <a:fld id="{06161B35-A5D1-400A-97A7-7B15B42727C3}" type="datetimeFigureOut">
               <a:rPr lang="zh-CN" altLang="en-US" smtClean="0"/>
-              <a:t>2021/6/25</a:t>
+              <a:t>2021/6/26</a:t>
             </a:fld>
             <a:endParaRPr lang="zh-CN" altLang="en-US"/>
           </a:p>
@@ -2100,7 +2640,7 @@
           <a:p>
             <a:fld id="{06161B35-A5D1-400A-97A7-7B15B42727C3}" type="datetimeFigureOut">
               <a:rPr lang="zh-CN" altLang="en-US" smtClean="0"/>
-              <a:t>2021/6/25</a:t>
+              <a:t>2021/6/26</a:t>
             </a:fld>
             <a:endParaRPr lang="zh-CN" altLang="en-US"/>
           </a:p>
@@ -2411,7 +2951,7 @@
           <a:p>
             <a:fld id="{06161B35-A5D1-400A-97A7-7B15B42727C3}" type="datetimeFigureOut">
               <a:rPr lang="zh-CN" altLang="en-US" smtClean="0"/>
-              <a:t>2021/6/25</a:t>
+              <a:t>2021/6/26</a:t>
             </a:fld>
             <a:endParaRPr lang="zh-CN" altLang="en-US"/>
           </a:p>
@@ -2699,7 +3239,7 @@
           <a:p>
             <a:fld id="{06161B35-A5D1-400A-97A7-7B15B42727C3}" type="datetimeFigureOut">
               <a:rPr lang="zh-CN" altLang="en-US" smtClean="0"/>
-              <a:t>2021/6/25</a:t>
+              <a:t>2021/6/26</a:t>
             </a:fld>
             <a:endParaRPr lang="zh-CN" altLang="en-US"/>
           </a:p>
@@ -2940,7 +3480,7 @@
           <a:p>
             <a:fld id="{06161B35-A5D1-400A-97A7-7B15B42727C3}" type="datetimeFigureOut">
               <a:rPr lang="zh-CN" altLang="en-US" smtClean="0"/>
-              <a:t>2021/6/25</a:t>
+              <a:t>2021/6/26</a:t>
             </a:fld>
             <a:endParaRPr lang="zh-CN" altLang="en-US"/>
           </a:p>
@@ -3523,7 +4063,7 @@
           <p:nvPr/>
         </p:nvPicPr>
         <p:blipFill>
-          <a:blip r:embed="rId3">
+          <a:blip r:embed="rId2">
             <a:extLst>
               <a:ext uri="{28A0092B-C50C-407E-A947-70E740481C1C}">
                 <a14:useLocalDpi xmlns:a14="http://schemas.microsoft.com/office/drawing/2010/main" val="0"/>
@@ -3535,8 +4075,8 @@
         </p:blipFill>
         <p:spPr>
           <a:xfrm>
-            <a:off x="1236004" y="3258000"/>
-            <a:ext cx="9719989" cy="1799997"/>
+            <a:off x="1236006" y="3258000"/>
+            <a:ext cx="9719984" cy="1799997"/>
           </a:xfrm>
           <a:prstGeom prst="rect">
             <a:avLst/>
@@ -3558,7 +4098,7 @@
           <p:nvPr/>
         </p:nvPicPr>
         <p:blipFill>
-          <a:blip r:embed="rId4">
+          <a:blip r:embed="rId3">
             <a:extLst>
               <a:ext uri="{28A0092B-C50C-407E-A947-70E740481C1C}">
                 <a14:useLocalDpi xmlns:a14="http://schemas.microsoft.com/office/drawing/2010/main" val="0"/>
@@ -3570,252 +4110,14 @@
         </p:blipFill>
         <p:spPr>
           <a:xfrm>
-            <a:off x="1236004" y="5058000"/>
-            <a:ext cx="9719989" cy="1799997"/>
+            <a:off x="1236006" y="5058000"/>
+            <a:ext cx="9719984" cy="1799997"/>
           </a:xfrm>
           <a:prstGeom prst="rect">
             <a:avLst/>
           </a:prstGeom>
         </p:spPr>
       </p:pic>
-      <p:grpSp>
-        <p:nvGrpSpPr>
-          <p:cNvPr id="6" name="组合 5">
-            <a:extLst>
-              <a:ext uri="{FF2B5EF4-FFF2-40B4-BE49-F238E27FC236}">
-                <a16:creationId xmlns:a16="http://schemas.microsoft.com/office/drawing/2014/main" id="{CC6F33AF-7A54-4250-AE94-FFD745B0B9F8}"/>
-              </a:ext>
-            </a:extLst>
-          </p:cNvPr>
-          <p:cNvGrpSpPr/>
-          <p:nvPr/>
-        </p:nvGrpSpPr>
-        <p:grpSpPr>
-          <a:xfrm>
-            <a:off x="-8060" y="1542210"/>
-            <a:ext cx="1217321" cy="5122327"/>
-            <a:chOff x="-8060" y="1542210"/>
-            <a:chExt cx="1217321" cy="5122327"/>
-          </a:xfrm>
-        </p:grpSpPr>
-        <p:cxnSp>
-          <p:nvCxnSpPr>
-            <p:cNvPr id="8" name="直接箭头连接符 7">
-              <a:extLst>
-                <a:ext uri="{FF2B5EF4-FFF2-40B4-BE49-F238E27FC236}">
-                  <a16:creationId xmlns:a16="http://schemas.microsoft.com/office/drawing/2014/main" id="{4D9BC747-7671-409C-9BAA-67DCB68F59DE}"/>
-                </a:ext>
-              </a:extLst>
-            </p:cNvPr>
-            <p:cNvCxnSpPr>
-              <a:cxnSpLocks/>
-            </p:cNvCxnSpPr>
-            <p:nvPr/>
-          </p:nvCxnSpPr>
-          <p:spPr>
-            <a:xfrm>
-              <a:off x="396858" y="2013417"/>
-              <a:ext cx="0" cy="1945341"/>
-            </a:xfrm>
-            <a:prstGeom prst="straightConnector1">
-              <a:avLst/>
-            </a:prstGeom>
-            <a:ln w="76200">
-              <a:tailEnd type="triangle"/>
-            </a:ln>
-          </p:spPr>
-          <p:style>
-            <a:lnRef idx="2">
-              <a:schemeClr val="accent2"/>
-            </a:lnRef>
-            <a:fillRef idx="0">
-              <a:schemeClr val="accent2"/>
-            </a:fillRef>
-            <a:effectRef idx="1">
-              <a:schemeClr val="accent2"/>
-            </a:effectRef>
-            <a:fontRef idx="minor">
-              <a:schemeClr val="tx1"/>
-            </a:fontRef>
-          </p:style>
-        </p:cxnSp>
-        <p:sp>
-          <p:nvSpPr>
-            <p:cNvPr id="10" name="文本框 9">
-              <a:extLst>
-                <a:ext uri="{FF2B5EF4-FFF2-40B4-BE49-F238E27FC236}">
-                  <a16:creationId xmlns:a16="http://schemas.microsoft.com/office/drawing/2014/main" id="{9083B443-06B4-475D-9A51-E890EE40DB04}"/>
-                </a:ext>
-              </a:extLst>
-            </p:cNvPr>
-            <p:cNvSpPr txBox="1"/>
-            <p:nvPr/>
-          </p:nvSpPr>
-          <p:spPr>
-            <a:xfrm>
-              <a:off x="-8060" y="1542210"/>
-              <a:ext cx="809837" cy="369332"/>
-            </a:xfrm>
-            <a:prstGeom prst="rect">
-              <a:avLst/>
-            </a:prstGeom>
-            <a:noFill/>
-          </p:spPr>
-          <p:txBody>
-            <a:bodyPr wrap="none" rtlCol="0">
-              <a:spAutoFit/>
-            </a:bodyPr>
-            <a:lstStyle/>
-            <a:p>
-              <a:r>
-                <a:rPr lang="en-US" altLang="zh-CN" dirty="0">
-                  <a:solidFill>
-                    <a:schemeClr val="accent2"/>
-                  </a:solidFill>
-                </a:rPr>
-                <a:t>power</a:t>
-              </a:r>
-              <a:endParaRPr lang="zh-CN" altLang="en-US" dirty="0">
-                <a:solidFill>
-                  <a:schemeClr val="accent2"/>
-                </a:solidFill>
-              </a:endParaRPr>
-            </a:p>
-          </p:txBody>
-        </p:sp>
-        <p:sp>
-          <p:nvSpPr>
-            <p:cNvPr id="11" name="文本框 10">
-              <a:extLst>
-                <a:ext uri="{FF2B5EF4-FFF2-40B4-BE49-F238E27FC236}">
-                  <a16:creationId xmlns:a16="http://schemas.microsoft.com/office/drawing/2014/main" id="{06C81BF8-6C37-48F0-85C3-BB040F65C59F}"/>
-                </a:ext>
-              </a:extLst>
-            </p:cNvPr>
-            <p:cNvSpPr txBox="1"/>
-            <p:nvPr/>
-          </p:nvSpPr>
-          <p:spPr>
-            <a:xfrm>
-              <a:off x="801777" y="2616755"/>
-              <a:ext cx="407484" cy="369332"/>
-            </a:xfrm>
-            <a:prstGeom prst="rect">
-              <a:avLst/>
-            </a:prstGeom>
-            <a:noFill/>
-          </p:spPr>
-          <p:txBody>
-            <a:bodyPr wrap="none" rtlCol="0">
-              <a:spAutoFit/>
-            </a:bodyPr>
-            <a:lstStyle/>
-            <a:p>
-              <a:r>
-                <a:rPr lang="en-US" altLang="zh-CN" dirty="0">
-                  <a:solidFill>
-                    <a:schemeClr val="accent2"/>
-                  </a:solidFill>
-                </a:rPr>
-                <a:t>1x</a:t>
-              </a:r>
-              <a:endParaRPr lang="zh-CN" altLang="en-US" dirty="0">
-                <a:solidFill>
-                  <a:schemeClr val="accent2"/>
-                </a:solidFill>
-              </a:endParaRPr>
-            </a:p>
-          </p:txBody>
-        </p:sp>
-        <p:sp>
-          <p:nvSpPr>
-            <p:cNvPr id="12" name="文本框 11">
-              <a:extLst>
-                <a:ext uri="{FF2B5EF4-FFF2-40B4-BE49-F238E27FC236}">
-                  <a16:creationId xmlns:a16="http://schemas.microsoft.com/office/drawing/2014/main" id="{3E485737-A416-4BCD-8A7D-1394E29467C8}"/>
-                </a:ext>
-              </a:extLst>
-            </p:cNvPr>
-            <p:cNvSpPr txBox="1"/>
-            <p:nvPr/>
-          </p:nvSpPr>
-          <p:spPr>
-            <a:xfrm>
-              <a:off x="801777" y="4455980"/>
-              <a:ext cx="407484" cy="369332"/>
-            </a:xfrm>
-            <a:prstGeom prst="rect">
-              <a:avLst/>
-            </a:prstGeom>
-            <a:noFill/>
-          </p:spPr>
-          <p:txBody>
-            <a:bodyPr wrap="none" rtlCol="0">
-              <a:spAutoFit/>
-            </a:bodyPr>
-            <a:lstStyle/>
-            <a:p>
-              <a:r>
-                <a:rPr lang="en-US" altLang="zh-CN" dirty="0">
-                  <a:solidFill>
-                    <a:schemeClr val="accent2"/>
-                  </a:solidFill>
-                </a:rPr>
-                <a:t>3x</a:t>
-              </a:r>
-              <a:endParaRPr lang="zh-CN" altLang="en-US" dirty="0">
-                <a:solidFill>
-                  <a:schemeClr val="accent2"/>
-                </a:solidFill>
-              </a:endParaRPr>
-            </a:p>
-          </p:txBody>
-        </p:sp>
-        <p:sp>
-          <p:nvSpPr>
-            <p:cNvPr id="13" name="文本框 12">
-              <a:extLst>
-                <a:ext uri="{FF2B5EF4-FFF2-40B4-BE49-F238E27FC236}">
-                  <a16:creationId xmlns:a16="http://schemas.microsoft.com/office/drawing/2014/main" id="{ACB49CF5-78DD-4B0A-901A-38947A009A39}"/>
-                </a:ext>
-              </a:extLst>
-            </p:cNvPr>
-            <p:cNvSpPr txBox="1"/>
-            <p:nvPr/>
-          </p:nvSpPr>
-          <p:spPr>
-            <a:xfrm>
-              <a:off x="801777" y="6295205"/>
-              <a:ext cx="407484" cy="369332"/>
-            </a:xfrm>
-            <a:prstGeom prst="rect">
-              <a:avLst/>
-            </a:prstGeom>
-            <a:noFill/>
-          </p:spPr>
-          <p:txBody>
-            <a:bodyPr wrap="none" rtlCol="0">
-              <a:spAutoFit/>
-            </a:bodyPr>
-            <a:lstStyle/>
-            <a:p>
-              <a:r>
-                <a:rPr lang="en-US" altLang="zh-CN" dirty="0">
-                  <a:solidFill>
-                    <a:schemeClr val="accent2"/>
-                  </a:solidFill>
-                </a:rPr>
-                <a:t>5x</a:t>
-              </a:r>
-              <a:endParaRPr lang="zh-CN" altLang="en-US" dirty="0">
-                <a:solidFill>
-                  <a:schemeClr val="accent2"/>
-                </a:solidFill>
-              </a:endParaRPr>
-            </a:p>
-          </p:txBody>
-        </p:sp>
-      </p:grpSp>
     </p:spTree>
     <p:extLst>
       <p:ext uri="{BB962C8B-B14F-4D97-AF65-F5344CB8AC3E}">
@@ -3829,7 +4131,7 @@
 </p:sld>
 </file>
 
-<file path=ppt/slides/slide2.xml><?xml version="1.0" encoding="utf-8"?>
+<file path=ppt/slides/slide11.xml><?xml version="1.0" encoding="utf-8"?>
 <p:sld xmlns:a="http://schemas.openxmlformats.org/drawingml/2006/main" xmlns:r="http://schemas.openxmlformats.org/officeDocument/2006/relationships" xmlns:p="http://schemas.openxmlformats.org/presentationml/2006/main">
   <p:cSld>
     <p:spTree>
@@ -3851,7 +4153,7 @@
           <p:cNvPr id="2" name="标题 1">
             <a:extLst>
               <a:ext uri="{FF2B5EF4-FFF2-40B4-BE49-F238E27FC236}">
-                <a16:creationId xmlns:a16="http://schemas.microsoft.com/office/drawing/2014/main" id="{F908C6EE-D5B7-4F48-93CB-4506A050410E}"/>
+                <a16:creationId xmlns:a16="http://schemas.microsoft.com/office/drawing/2014/main" id="{E992A8B7-1629-42FE-AA40-407523A09B1A}"/>
               </a:ext>
             </a:extLst>
           </p:cNvPr>
@@ -3869,7 +4171,7 @@
           <a:p>
             <a:r>
               <a:rPr lang="en-US" altLang="zh-CN" dirty="0"/>
-              <a:t>Telescope mirror optimization</a:t>
+              <a:t>Beam profile with perfect optics, focus</a:t>
             </a:r>
             <a:endParaRPr lang="zh-CN" altLang="en-US" dirty="0"/>
           </a:p>
@@ -3877,43 +4179,219 @@
       </p:sp>
       <p:pic>
         <p:nvPicPr>
-          <p:cNvPr id="5" name="内容占位符 4" descr="图形用户界面&#10;&#10;低可信度描述已自动生成">
-            <a:extLst>
-              <a:ext uri="{FF2B5EF4-FFF2-40B4-BE49-F238E27FC236}">
-                <a16:creationId xmlns:a16="http://schemas.microsoft.com/office/drawing/2014/main" id="{6248DB74-BF71-4039-A471-B727AAD8018E}"/>
+          <p:cNvPr id="7" name="图片 6">
+            <a:extLst>
+              <a:ext uri="{FF2B5EF4-FFF2-40B4-BE49-F238E27FC236}">
+                <a16:creationId xmlns:a16="http://schemas.microsoft.com/office/drawing/2014/main" id="{0695FD20-324B-4EC0-A6C5-FBF4633B6AD7}"/>
               </a:ext>
             </a:extLst>
           </p:cNvPr>
           <p:cNvPicPr>
-            <a:picLocks noGrp="1" noChangeAspect="1"/>
+            <a:picLocks noChangeAspect="1"/>
           </p:cNvPicPr>
-          <p:nvPr>
-            <p:ph idx="1"/>
-          </p:nvPr>
+          <p:nvPr/>
         </p:nvPicPr>
         <p:blipFill>
-          <a:blip r:embed="rId2">
+          <a:blip r:embed="rId3">
             <a:extLst>
               <a:ext uri="{28A0092B-C50C-407E-A947-70E740481C1C}">
                 <a14:useLocalDpi xmlns:a14="http://schemas.microsoft.com/office/drawing/2010/main" val="0"/>
               </a:ext>
             </a:extLst>
           </a:blip>
-          <a:stretch>
-            <a:fillRect/>
-          </a:stretch>
+          <a:srcRect/>
+          <a:stretch/>
         </p:blipFill>
         <p:spPr>
           <a:xfrm>
-            <a:off x="838200" y="2806340"/>
-            <a:ext cx="10515600" cy="2389908"/>
-          </a:xfrm>
+            <a:off x="143431" y="1466568"/>
+            <a:ext cx="4320000" cy="4320000"/>
+          </a:xfrm>
+          <a:prstGeom prst="rect">
+            <a:avLst/>
+          </a:prstGeom>
         </p:spPr>
       </p:pic>
+      <p:pic>
+        <p:nvPicPr>
+          <p:cNvPr id="11" name="图片 10">
+            <a:extLst>
+              <a:ext uri="{FF2B5EF4-FFF2-40B4-BE49-F238E27FC236}">
+                <a16:creationId xmlns:a16="http://schemas.microsoft.com/office/drawing/2014/main" id="{E5628EC7-BA5C-4CB6-9488-0D3B767DE1A7}"/>
+              </a:ext>
+            </a:extLst>
+          </p:cNvPr>
+          <p:cNvPicPr>
+            <a:picLocks noChangeAspect="1"/>
+          </p:cNvPicPr>
+          <p:nvPr/>
+        </p:nvPicPr>
+        <p:blipFill>
+          <a:blip r:embed="rId4">
+            <a:extLst>
+              <a:ext uri="{28A0092B-C50C-407E-A947-70E740481C1C}">
+                <a14:useLocalDpi xmlns:a14="http://schemas.microsoft.com/office/drawing/2010/main" val="0"/>
+              </a:ext>
+            </a:extLst>
+          </a:blip>
+          <a:srcRect/>
+          <a:stretch/>
+        </p:blipFill>
+        <p:spPr>
+          <a:xfrm>
+            <a:off x="4826695" y="1166796"/>
+            <a:ext cx="3240000" cy="3240000"/>
+          </a:xfrm>
+          <a:prstGeom prst="rect">
+            <a:avLst/>
+          </a:prstGeom>
+        </p:spPr>
+      </p:pic>
+      <p:pic>
+        <p:nvPicPr>
+          <p:cNvPr id="13" name="图片 12">
+            <a:extLst>
+              <a:ext uri="{FF2B5EF4-FFF2-40B4-BE49-F238E27FC236}">
+                <a16:creationId xmlns:a16="http://schemas.microsoft.com/office/drawing/2014/main" id="{96DD5AB7-74FD-47AC-98EA-290C937072DC}"/>
+              </a:ext>
+            </a:extLst>
+          </p:cNvPr>
+          <p:cNvPicPr>
+            <a:picLocks noChangeAspect="1"/>
+          </p:cNvPicPr>
+          <p:nvPr/>
+        </p:nvPicPr>
+        <p:blipFill>
+          <a:blip r:embed="rId5">
+            <a:extLst>
+              <a:ext uri="{28A0092B-C50C-407E-A947-70E740481C1C}">
+                <a14:useLocalDpi xmlns:a14="http://schemas.microsoft.com/office/drawing/2010/main" val="0"/>
+              </a:ext>
+            </a:extLst>
+          </a:blip>
+          <a:srcRect/>
+          <a:stretch/>
+        </p:blipFill>
+        <p:spPr>
+          <a:xfrm>
+            <a:off x="4821677" y="3882903"/>
+            <a:ext cx="3240000" cy="3240000"/>
+          </a:xfrm>
+          <a:prstGeom prst="rect">
+            <a:avLst/>
+          </a:prstGeom>
+        </p:spPr>
+      </p:pic>
+      <p:pic>
+        <p:nvPicPr>
+          <p:cNvPr id="15" name="图片 14">
+            <a:extLst>
+              <a:ext uri="{FF2B5EF4-FFF2-40B4-BE49-F238E27FC236}">
+                <a16:creationId xmlns:a16="http://schemas.microsoft.com/office/drawing/2014/main" id="{37D5B7FD-4547-422A-B3A4-F8B9F0FF001D}"/>
+              </a:ext>
+            </a:extLst>
+          </p:cNvPr>
+          <p:cNvPicPr>
+            <a:picLocks noChangeAspect="1"/>
+          </p:cNvPicPr>
+          <p:nvPr/>
+        </p:nvPicPr>
+        <p:blipFill>
+          <a:blip r:embed="rId6">
+            <a:extLst>
+              <a:ext uri="{28A0092B-C50C-407E-A947-70E740481C1C}">
+                <a14:useLocalDpi xmlns:a14="http://schemas.microsoft.com/office/drawing/2010/main" val="0"/>
+              </a:ext>
+            </a:extLst>
+          </a:blip>
+          <a:srcRect/>
+          <a:stretch/>
+        </p:blipFill>
+        <p:spPr>
+          <a:xfrm>
+            <a:off x="8471990" y="1166796"/>
+            <a:ext cx="3240000" cy="3240000"/>
+          </a:xfrm>
+          <a:prstGeom prst="rect">
+            <a:avLst/>
+          </a:prstGeom>
+        </p:spPr>
+      </p:pic>
+      <p:pic>
+        <p:nvPicPr>
+          <p:cNvPr id="17" name="图片 16">
+            <a:extLst>
+              <a:ext uri="{FF2B5EF4-FFF2-40B4-BE49-F238E27FC236}">
+                <a16:creationId xmlns:a16="http://schemas.microsoft.com/office/drawing/2014/main" id="{C9206398-C7CA-4063-8AF7-467401B14B6C}"/>
+              </a:ext>
+            </a:extLst>
+          </p:cNvPr>
+          <p:cNvPicPr>
+            <a:picLocks noChangeAspect="1"/>
+          </p:cNvPicPr>
+          <p:nvPr/>
+        </p:nvPicPr>
+        <p:blipFill>
+          <a:blip r:embed="rId7">
+            <a:extLst>
+              <a:ext uri="{28A0092B-C50C-407E-A947-70E740481C1C}">
+                <a14:useLocalDpi xmlns:a14="http://schemas.microsoft.com/office/drawing/2010/main" val="0"/>
+              </a:ext>
+            </a:extLst>
+          </a:blip>
+          <a:srcRect/>
+          <a:stretch/>
+        </p:blipFill>
+        <p:spPr>
+          <a:xfrm>
+            <a:off x="8471990" y="3882903"/>
+            <a:ext cx="3240000" cy="3240000"/>
+          </a:xfrm>
+          <a:prstGeom prst="rect">
+            <a:avLst/>
+          </a:prstGeom>
+        </p:spPr>
+      </p:pic>
+      <p:sp>
+        <p:nvSpPr>
+          <p:cNvPr id="18" name="文本框 17">
+            <a:extLst>
+              <a:ext uri="{FF2B5EF4-FFF2-40B4-BE49-F238E27FC236}">
+                <a16:creationId xmlns:a16="http://schemas.microsoft.com/office/drawing/2014/main" id="{ECD58FBA-3E13-4416-8A8D-3A5BB1FCF885}"/>
+              </a:ext>
+            </a:extLst>
+          </p:cNvPr>
+          <p:cNvSpPr txBox="1"/>
+          <p:nvPr/>
+        </p:nvSpPr>
+        <p:spPr>
+          <a:xfrm>
+            <a:off x="268945" y="5846544"/>
+            <a:ext cx="4257243" cy="646331"/>
+          </a:xfrm>
+          <a:prstGeom prst="rect">
+            <a:avLst/>
+          </a:prstGeom>
+          <a:noFill/>
+        </p:spPr>
+        <p:txBody>
+          <a:bodyPr wrap="square" rtlCol="0">
+            <a:spAutoFit/>
+          </a:bodyPr>
+          <a:lstStyle/>
+          <a:p>
+            <a:r>
+              <a:rPr lang="en-US" altLang="zh-CN" dirty="0"/>
+              <a:t>Open slit, beam cut off in x due to telescope mirror 2 (1m)</a:t>
+            </a:r>
+            <a:endParaRPr lang="zh-CN" altLang="en-US" dirty="0"/>
+          </a:p>
+        </p:txBody>
+      </p:sp>
     </p:spTree>
     <p:extLst>
       <p:ext uri="{BB962C8B-B14F-4D97-AF65-F5344CB8AC3E}">
-        <p14:creationId xmlns:p14="http://schemas.microsoft.com/office/powerpoint/2010/main" val="3357739531"/>
+        <p14:creationId xmlns:p14="http://schemas.microsoft.com/office/powerpoint/2010/main" val="1946967870"/>
       </p:ext>
     </p:extLst>
   </p:cSld>
@@ -3923,282 +4401,7 @@
 </p:sld>
 </file>
 
-<file path=ppt/slides/slide3.xml><?xml version="1.0" encoding="utf-8"?>
-<p:sld xmlns:a="http://schemas.openxmlformats.org/drawingml/2006/main" xmlns:r="http://schemas.openxmlformats.org/officeDocument/2006/relationships" xmlns:p="http://schemas.openxmlformats.org/presentationml/2006/main">
-  <p:cSld>
-    <p:spTree>
-      <p:nvGrpSpPr>
-        <p:cNvPr id="1" name=""/>
-        <p:cNvGrpSpPr/>
-        <p:nvPr/>
-      </p:nvGrpSpPr>
-      <p:grpSpPr>
-        <a:xfrm>
-          <a:off x="0" y="0"/>
-          <a:ext cx="0" cy="0"/>
-          <a:chOff x="0" y="0"/>
-          <a:chExt cx="0" cy="0"/>
-        </a:xfrm>
-      </p:grpSpPr>
-      <p:sp>
-        <p:nvSpPr>
-          <p:cNvPr id="2" name="标题 1">
-            <a:extLst>
-              <a:ext uri="{FF2B5EF4-FFF2-40B4-BE49-F238E27FC236}">
-                <a16:creationId xmlns:a16="http://schemas.microsoft.com/office/drawing/2014/main" id="{E992A8B7-1629-42FE-AA40-407523A09B1A}"/>
-              </a:ext>
-            </a:extLst>
-          </p:cNvPr>
-          <p:cNvSpPr>
-            <a:spLocks noGrp="1"/>
-          </p:cNvSpPr>
-          <p:nvPr>
-            <p:ph type="title"/>
-          </p:nvPr>
-        </p:nvSpPr>
-        <p:spPr/>
-        <p:txBody>
-          <a:bodyPr/>
-          <a:lstStyle/>
-          <a:p>
-            <a:r>
-              <a:rPr lang="en-US" altLang="zh-CN" dirty="0"/>
-              <a:t>Beam profile with perfect optics, focus</a:t>
-            </a:r>
-            <a:endParaRPr lang="zh-CN" altLang="en-US" dirty="0"/>
-          </a:p>
-        </p:txBody>
-      </p:sp>
-      <p:pic>
-        <p:nvPicPr>
-          <p:cNvPr id="7" name="图片 6" descr="图片包含 徽标&#10;&#10;描述已自动生成">
-            <a:extLst>
-              <a:ext uri="{FF2B5EF4-FFF2-40B4-BE49-F238E27FC236}">
-                <a16:creationId xmlns:a16="http://schemas.microsoft.com/office/drawing/2014/main" id="{0695FD20-324B-4EC0-A6C5-FBF4633B6AD7}"/>
-              </a:ext>
-            </a:extLst>
-          </p:cNvPr>
-          <p:cNvPicPr>
-            <a:picLocks noChangeAspect="1"/>
-          </p:cNvPicPr>
-          <p:nvPr/>
-        </p:nvPicPr>
-        <p:blipFill>
-          <a:blip r:embed="rId2">
-            <a:extLst>
-              <a:ext uri="{28A0092B-C50C-407E-A947-70E740481C1C}">
-                <a14:useLocalDpi xmlns:a14="http://schemas.microsoft.com/office/drawing/2010/main" val="0"/>
-              </a:ext>
-            </a:extLst>
-          </a:blip>
-          <a:stretch>
-            <a:fillRect/>
-          </a:stretch>
-        </p:blipFill>
-        <p:spPr>
-          <a:xfrm>
-            <a:off x="143431" y="1466568"/>
-            <a:ext cx="4320000" cy="4320000"/>
-          </a:xfrm>
-          <a:prstGeom prst="rect">
-            <a:avLst/>
-          </a:prstGeom>
-        </p:spPr>
-      </p:pic>
-      <p:pic>
-        <p:nvPicPr>
-          <p:cNvPr id="11" name="图片 10" descr="黑暗中亮着灯&#10;&#10;低可信度描述已自动生成">
-            <a:extLst>
-              <a:ext uri="{FF2B5EF4-FFF2-40B4-BE49-F238E27FC236}">
-                <a16:creationId xmlns:a16="http://schemas.microsoft.com/office/drawing/2014/main" id="{E5628EC7-BA5C-4CB6-9488-0D3B767DE1A7}"/>
-              </a:ext>
-            </a:extLst>
-          </p:cNvPr>
-          <p:cNvPicPr>
-            <a:picLocks noChangeAspect="1"/>
-          </p:cNvPicPr>
-          <p:nvPr/>
-        </p:nvPicPr>
-        <p:blipFill>
-          <a:blip r:embed="rId3">
-            <a:extLst>
-              <a:ext uri="{28A0092B-C50C-407E-A947-70E740481C1C}">
-                <a14:useLocalDpi xmlns:a14="http://schemas.microsoft.com/office/drawing/2010/main" val="0"/>
-              </a:ext>
-            </a:extLst>
-          </a:blip>
-          <a:stretch>
-            <a:fillRect/>
-          </a:stretch>
-        </p:blipFill>
-        <p:spPr>
-          <a:xfrm>
-            <a:off x="4826695" y="1166796"/>
-            <a:ext cx="3240000" cy="3240000"/>
-          </a:xfrm>
-          <a:prstGeom prst="rect">
-            <a:avLst/>
-          </a:prstGeom>
-        </p:spPr>
-      </p:pic>
-      <p:pic>
-        <p:nvPicPr>
-          <p:cNvPr id="13" name="图片 12" descr="黑暗中的灯光&#10;&#10;中度可信度描述已自动生成">
-            <a:extLst>
-              <a:ext uri="{FF2B5EF4-FFF2-40B4-BE49-F238E27FC236}">
-                <a16:creationId xmlns:a16="http://schemas.microsoft.com/office/drawing/2014/main" id="{96DD5AB7-74FD-47AC-98EA-290C937072DC}"/>
-              </a:ext>
-            </a:extLst>
-          </p:cNvPr>
-          <p:cNvPicPr>
-            <a:picLocks noChangeAspect="1"/>
-          </p:cNvPicPr>
-          <p:nvPr/>
-        </p:nvPicPr>
-        <p:blipFill>
-          <a:blip r:embed="rId4">
-            <a:extLst>
-              <a:ext uri="{28A0092B-C50C-407E-A947-70E740481C1C}">
-                <a14:useLocalDpi xmlns:a14="http://schemas.microsoft.com/office/drawing/2010/main" val="0"/>
-              </a:ext>
-            </a:extLst>
-          </a:blip>
-          <a:stretch>
-            <a:fillRect/>
-          </a:stretch>
-        </p:blipFill>
-        <p:spPr>
-          <a:xfrm>
-            <a:off x="4821677" y="3882903"/>
-            <a:ext cx="3240000" cy="3240000"/>
-          </a:xfrm>
-          <a:prstGeom prst="rect">
-            <a:avLst/>
-          </a:prstGeom>
-        </p:spPr>
-      </p:pic>
-      <p:pic>
-        <p:nvPicPr>
-          <p:cNvPr id="15" name="图片 14" descr="黑暗中的灯光&#10;&#10;中度可信度描述已自动生成">
-            <a:extLst>
-              <a:ext uri="{FF2B5EF4-FFF2-40B4-BE49-F238E27FC236}">
-                <a16:creationId xmlns:a16="http://schemas.microsoft.com/office/drawing/2014/main" id="{37D5B7FD-4547-422A-B3A4-F8B9F0FF001D}"/>
-              </a:ext>
-            </a:extLst>
-          </p:cNvPr>
-          <p:cNvPicPr>
-            <a:picLocks noChangeAspect="1"/>
-          </p:cNvPicPr>
-          <p:nvPr/>
-        </p:nvPicPr>
-        <p:blipFill>
-          <a:blip r:embed="rId5">
-            <a:extLst>
-              <a:ext uri="{28A0092B-C50C-407E-A947-70E740481C1C}">
-                <a14:useLocalDpi xmlns:a14="http://schemas.microsoft.com/office/drawing/2010/main" val="0"/>
-              </a:ext>
-            </a:extLst>
-          </a:blip>
-          <a:stretch>
-            <a:fillRect/>
-          </a:stretch>
-        </p:blipFill>
-        <p:spPr>
-          <a:xfrm>
-            <a:off x="8471990" y="1166796"/>
-            <a:ext cx="3240000" cy="3240000"/>
-          </a:xfrm>
-          <a:prstGeom prst="rect">
-            <a:avLst/>
-          </a:prstGeom>
-        </p:spPr>
-      </p:pic>
-      <p:pic>
-        <p:nvPicPr>
-          <p:cNvPr id="17" name="图片 16" descr="黑暗中亮着灯&#10;&#10;低可信度描述已自动生成">
-            <a:extLst>
-              <a:ext uri="{FF2B5EF4-FFF2-40B4-BE49-F238E27FC236}">
-                <a16:creationId xmlns:a16="http://schemas.microsoft.com/office/drawing/2014/main" id="{C9206398-C7CA-4063-8AF7-467401B14B6C}"/>
-              </a:ext>
-            </a:extLst>
-          </p:cNvPr>
-          <p:cNvPicPr>
-            <a:picLocks noChangeAspect="1"/>
-          </p:cNvPicPr>
-          <p:nvPr/>
-        </p:nvPicPr>
-        <p:blipFill>
-          <a:blip r:embed="rId6">
-            <a:extLst>
-              <a:ext uri="{28A0092B-C50C-407E-A947-70E740481C1C}">
-                <a14:useLocalDpi xmlns:a14="http://schemas.microsoft.com/office/drawing/2010/main" val="0"/>
-              </a:ext>
-            </a:extLst>
-          </a:blip>
-          <a:stretch>
-            <a:fillRect/>
-          </a:stretch>
-        </p:blipFill>
-        <p:spPr>
-          <a:xfrm>
-            <a:off x="8471990" y="3882903"/>
-            <a:ext cx="3240000" cy="3240000"/>
-          </a:xfrm>
-          <a:prstGeom prst="rect">
-            <a:avLst/>
-          </a:prstGeom>
-        </p:spPr>
-      </p:pic>
-      <p:sp>
-        <p:nvSpPr>
-          <p:cNvPr id="18" name="文本框 17">
-            <a:extLst>
-              <a:ext uri="{FF2B5EF4-FFF2-40B4-BE49-F238E27FC236}">
-                <a16:creationId xmlns:a16="http://schemas.microsoft.com/office/drawing/2014/main" id="{ECD58FBA-3E13-4416-8A8D-3A5BB1FCF885}"/>
-              </a:ext>
-            </a:extLst>
-          </p:cNvPr>
-          <p:cNvSpPr txBox="1"/>
-          <p:nvPr/>
-        </p:nvSpPr>
-        <p:spPr>
-          <a:xfrm>
-            <a:off x="268945" y="5846544"/>
-            <a:ext cx="4257243" cy="646331"/>
-          </a:xfrm>
-          <a:prstGeom prst="rect">
-            <a:avLst/>
-          </a:prstGeom>
-          <a:noFill/>
-        </p:spPr>
-        <p:txBody>
-          <a:bodyPr wrap="square" rtlCol="0">
-            <a:spAutoFit/>
-          </a:bodyPr>
-          <a:lstStyle/>
-          <a:p>
-            <a:r>
-              <a:rPr lang="en-US" altLang="zh-CN" dirty="0"/>
-              <a:t>Open slit, beam cut off in x due to telescope mirror 2 (1m)</a:t>
-            </a:r>
-            <a:endParaRPr lang="zh-CN" altLang="en-US" dirty="0"/>
-          </a:p>
-        </p:txBody>
-      </p:sp>
-    </p:spTree>
-    <p:extLst>
-      <p:ext uri="{BB962C8B-B14F-4D97-AF65-F5344CB8AC3E}">
-        <p14:creationId xmlns:p14="http://schemas.microsoft.com/office/powerpoint/2010/main" val="1960242697"/>
-      </p:ext>
-    </p:extLst>
-  </p:cSld>
-  <p:clrMapOvr>
-    <a:masterClrMapping/>
-  </p:clrMapOvr>
-</p:sld>
-</file>
-
-<file path=ppt/slides/slide4.xml><?xml version="1.0" encoding="utf-8"?>
+<file path=ppt/slides/slide12.xml><?xml version="1.0" encoding="utf-8"?>
 <p:sld xmlns:a="http://schemas.openxmlformats.org/drawingml/2006/main" xmlns:r="http://schemas.openxmlformats.org/officeDocument/2006/relationships" xmlns:p="http://schemas.openxmlformats.org/presentationml/2006/main">
   <p:cSld>
     <p:spTree>
@@ -4498,6 +4701,2071 @@
         </p:nvGrpSpPr>
         <p:grpSpPr>
           <a:xfrm>
+            <a:off x="0" y="1214343"/>
+            <a:ext cx="1831159" cy="1800000"/>
+            <a:chOff x="2898769" y="5057999"/>
+            <a:chExt cx="1831159" cy="1800000"/>
+          </a:xfrm>
+        </p:grpSpPr>
+        <p:pic>
+          <p:nvPicPr>
+            <p:cNvPr id="4" name="图片 3">
+              <a:extLst>
+                <a:ext uri="{FF2B5EF4-FFF2-40B4-BE49-F238E27FC236}">
+                  <a16:creationId xmlns:a16="http://schemas.microsoft.com/office/drawing/2014/main" id="{3390C116-28D1-41B8-AC87-2CA3B61F025E}"/>
+                </a:ext>
+              </a:extLst>
+            </p:cNvPr>
+            <p:cNvPicPr>
+              <a:picLocks noChangeAspect="1"/>
+            </p:cNvPicPr>
+            <p:nvPr/>
+          </p:nvPicPr>
+          <p:blipFill rotWithShape="1">
+            <a:blip r:embed="rId7">
+              <a:extLst>
+                <a:ext uri="{28A0092B-C50C-407E-A947-70E740481C1C}">
+                  <a14:useLocalDpi xmlns:a14="http://schemas.microsoft.com/office/drawing/2010/main" val="0"/>
+                </a:ext>
+              </a:extLst>
+            </a:blip>
+            <a:srcRect l="791" r="24291" b="26358"/>
+            <a:stretch/>
+          </p:blipFill>
+          <p:spPr>
+            <a:xfrm>
+              <a:off x="2898769" y="5057999"/>
+              <a:ext cx="1831159" cy="1800000"/>
+            </a:xfrm>
+            <a:prstGeom prst="rect">
+              <a:avLst/>
+            </a:prstGeom>
+          </p:spPr>
+        </p:pic>
+        <p:sp>
+          <p:nvSpPr>
+            <p:cNvPr id="12" name="文本框 11">
+              <a:extLst>
+                <a:ext uri="{FF2B5EF4-FFF2-40B4-BE49-F238E27FC236}">
+                  <a16:creationId xmlns:a16="http://schemas.microsoft.com/office/drawing/2014/main" id="{A63746A6-34C9-41FB-9F44-27071C592A31}"/>
+                </a:ext>
+              </a:extLst>
+            </p:cNvPr>
+            <p:cNvSpPr txBox="1"/>
+            <p:nvPr/>
+          </p:nvSpPr>
+          <p:spPr>
+            <a:xfrm>
+              <a:off x="3088503" y="5219668"/>
+              <a:ext cx="696024" cy="369332"/>
+            </a:xfrm>
+            <a:prstGeom prst="rect">
+              <a:avLst/>
+            </a:prstGeom>
+            <a:noFill/>
+          </p:spPr>
+          <p:txBody>
+            <a:bodyPr wrap="none" rtlCol="0">
+              <a:spAutoFit/>
+            </a:bodyPr>
+            <a:lstStyle/>
+            <a:p>
+              <a:r>
+                <a:rPr lang="en-US" altLang="zh-CN" dirty="0">
+                  <a:solidFill>
+                    <a:srgbClr val="FF0000"/>
+                  </a:solidFill>
+                </a:rPr>
+                <a:t>open</a:t>
+              </a:r>
+              <a:endParaRPr lang="zh-CN" altLang="en-US" dirty="0">
+                <a:solidFill>
+                  <a:srgbClr val="FF0000"/>
+                </a:solidFill>
+              </a:endParaRPr>
+            </a:p>
+          </p:txBody>
+        </p:sp>
+      </p:grpSp>
+      <p:sp>
+        <p:nvSpPr>
+          <p:cNvPr id="14" name="文本框 13">
+            <a:extLst>
+              <a:ext uri="{FF2B5EF4-FFF2-40B4-BE49-F238E27FC236}">
+                <a16:creationId xmlns:a16="http://schemas.microsoft.com/office/drawing/2014/main" id="{7ACE0A12-72FA-479E-BE66-7736D79EB0F6}"/>
+              </a:ext>
+            </a:extLst>
+          </p:cNvPr>
+          <p:cNvSpPr txBox="1"/>
+          <p:nvPr/>
+        </p:nvSpPr>
+        <p:spPr>
+          <a:xfrm>
+            <a:off x="5209403" y="1690688"/>
+            <a:ext cx="696024" cy="369332"/>
+          </a:xfrm>
+          <a:prstGeom prst="rect">
+            <a:avLst/>
+          </a:prstGeom>
+          <a:noFill/>
+        </p:spPr>
+        <p:txBody>
+          <a:bodyPr wrap="none" rtlCol="0">
+            <a:spAutoFit/>
+          </a:bodyPr>
+          <a:lstStyle/>
+          <a:p>
+            <a:r>
+              <a:rPr lang="en-US" altLang="zh-CN" dirty="0">
+                <a:solidFill>
+                  <a:srgbClr val="FF0000"/>
+                </a:solidFill>
+              </a:rPr>
+              <a:t>open</a:t>
+            </a:r>
+            <a:endParaRPr lang="zh-CN" altLang="en-US" dirty="0">
+              <a:solidFill>
+                <a:srgbClr val="FF0000"/>
+              </a:solidFill>
+            </a:endParaRPr>
+          </a:p>
+        </p:txBody>
+      </p:sp>
+      <p:sp>
+        <p:nvSpPr>
+          <p:cNvPr id="16" name="文本框 15">
+            <a:extLst>
+              <a:ext uri="{FF2B5EF4-FFF2-40B4-BE49-F238E27FC236}">
+                <a16:creationId xmlns:a16="http://schemas.microsoft.com/office/drawing/2014/main" id="{151BD80A-2E10-4164-A374-C8B8BA283716}"/>
+              </a:ext>
+            </a:extLst>
+          </p:cNvPr>
+          <p:cNvSpPr txBox="1"/>
+          <p:nvPr/>
+        </p:nvSpPr>
+        <p:spPr>
+          <a:xfrm>
+            <a:off x="8854303" y="1690688"/>
+            <a:ext cx="696024" cy="369332"/>
+          </a:xfrm>
+          <a:prstGeom prst="rect">
+            <a:avLst/>
+          </a:prstGeom>
+          <a:noFill/>
+        </p:spPr>
+        <p:txBody>
+          <a:bodyPr wrap="none" rtlCol="0">
+            <a:spAutoFit/>
+          </a:bodyPr>
+          <a:lstStyle/>
+          <a:p>
+            <a:r>
+              <a:rPr lang="en-US" altLang="zh-CN" dirty="0">
+                <a:solidFill>
+                  <a:srgbClr val="FF0000"/>
+                </a:solidFill>
+              </a:rPr>
+              <a:t>open</a:t>
+            </a:r>
+            <a:endParaRPr lang="zh-CN" altLang="en-US" dirty="0">
+              <a:solidFill>
+                <a:srgbClr val="FF0000"/>
+              </a:solidFill>
+            </a:endParaRPr>
+          </a:p>
+        </p:txBody>
+      </p:sp>
+      <p:sp>
+        <p:nvSpPr>
+          <p:cNvPr id="19" name="文本框 18">
+            <a:extLst>
+              <a:ext uri="{FF2B5EF4-FFF2-40B4-BE49-F238E27FC236}">
+                <a16:creationId xmlns:a16="http://schemas.microsoft.com/office/drawing/2014/main" id="{5007B1DC-8FE9-405C-AEB2-29B78CD99029}"/>
+              </a:ext>
+            </a:extLst>
+          </p:cNvPr>
+          <p:cNvSpPr txBox="1"/>
+          <p:nvPr/>
+        </p:nvSpPr>
+        <p:spPr>
+          <a:xfrm>
+            <a:off x="5209403" y="4406795"/>
+            <a:ext cx="819455" cy="369332"/>
+          </a:xfrm>
+          <a:prstGeom prst="rect">
+            <a:avLst/>
+          </a:prstGeom>
+          <a:noFill/>
+        </p:spPr>
+        <p:txBody>
+          <a:bodyPr wrap="none" rtlCol="0">
+            <a:spAutoFit/>
+          </a:bodyPr>
+          <a:lstStyle/>
+          <a:p>
+            <a:r>
+              <a:rPr lang="en-US" altLang="zh-CN" dirty="0">
+                <a:solidFill>
+                  <a:srgbClr val="FF0000"/>
+                </a:solidFill>
+              </a:rPr>
+              <a:t>closed</a:t>
+            </a:r>
+            <a:endParaRPr lang="zh-CN" altLang="en-US" dirty="0">
+              <a:solidFill>
+                <a:srgbClr val="FF0000"/>
+              </a:solidFill>
+            </a:endParaRPr>
+          </a:p>
+        </p:txBody>
+      </p:sp>
+      <p:sp>
+        <p:nvSpPr>
+          <p:cNvPr id="20" name="文本框 19">
+            <a:extLst>
+              <a:ext uri="{FF2B5EF4-FFF2-40B4-BE49-F238E27FC236}">
+                <a16:creationId xmlns:a16="http://schemas.microsoft.com/office/drawing/2014/main" id="{1395CAAA-C26F-46CC-92FE-7902C5067891}"/>
+              </a:ext>
+            </a:extLst>
+          </p:cNvPr>
+          <p:cNvSpPr txBox="1"/>
+          <p:nvPr/>
+        </p:nvSpPr>
+        <p:spPr>
+          <a:xfrm>
+            <a:off x="8854303" y="4406795"/>
+            <a:ext cx="819455" cy="369332"/>
+          </a:xfrm>
+          <a:prstGeom prst="rect">
+            <a:avLst/>
+          </a:prstGeom>
+          <a:noFill/>
+        </p:spPr>
+        <p:txBody>
+          <a:bodyPr wrap="none" rtlCol="0">
+            <a:spAutoFit/>
+          </a:bodyPr>
+          <a:lstStyle/>
+          <a:p>
+            <a:r>
+              <a:rPr lang="en-US" altLang="zh-CN" dirty="0">
+                <a:solidFill>
+                  <a:srgbClr val="FF0000"/>
+                </a:solidFill>
+              </a:rPr>
+              <a:t>closed</a:t>
+            </a:r>
+            <a:endParaRPr lang="zh-CN" altLang="en-US" dirty="0">
+              <a:solidFill>
+                <a:srgbClr val="FF0000"/>
+              </a:solidFill>
+            </a:endParaRPr>
+          </a:p>
+        </p:txBody>
+      </p:sp>
+    </p:spTree>
+    <p:extLst>
+      <p:ext uri="{BB962C8B-B14F-4D97-AF65-F5344CB8AC3E}">
+        <p14:creationId xmlns:p14="http://schemas.microsoft.com/office/powerpoint/2010/main" val="1687226865"/>
+      </p:ext>
+    </p:extLst>
+  </p:cSld>
+  <p:clrMapOvr>
+    <a:masterClrMapping/>
+  </p:clrMapOvr>
+</p:sld>
+</file>
+
+<file path=ppt/slides/slide13.xml><?xml version="1.0" encoding="utf-8"?>
+<p:sld xmlns:a="http://schemas.openxmlformats.org/drawingml/2006/main" xmlns:r="http://schemas.openxmlformats.org/officeDocument/2006/relationships" xmlns:p="http://schemas.openxmlformats.org/presentationml/2006/main">
+  <p:cSld>
+    <p:spTree>
+      <p:nvGrpSpPr>
+        <p:cNvPr id="1" name=""/>
+        <p:cNvGrpSpPr/>
+        <p:nvPr/>
+      </p:nvGrpSpPr>
+      <p:grpSpPr>
+        <a:xfrm>
+          <a:off x="0" y="0"/>
+          <a:ext cx="0" cy="0"/>
+          <a:chOff x="0" y="0"/>
+          <a:chExt cx="0" cy="0"/>
+        </a:xfrm>
+      </p:grpSpPr>
+      <p:sp>
+        <p:nvSpPr>
+          <p:cNvPr id="2" name="标题 1">
+            <a:extLst>
+              <a:ext uri="{FF2B5EF4-FFF2-40B4-BE49-F238E27FC236}">
+                <a16:creationId xmlns:a16="http://schemas.microsoft.com/office/drawing/2014/main" id="{A83A6069-F48A-459C-8956-5314C6308FD5}"/>
+              </a:ext>
+            </a:extLst>
+          </p:cNvPr>
+          <p:cNvSpPr>
+            <a:spLocks noGrp="1"/>
+          </p:cNvSpPr>
+          <p:nvPr>
+            <p:ph type="title"/>
+          </p:nvPr>
+        </p:nvSpPr>
+        <p:spPr/>
+        <p:txBody>
+          <a:bodyPr/>
+          <a:lstStyle/>
+          <a:p>
+            <a:r>
+              <a:rPr lang="en-US" altLang="zh-CN" dirty="0"/>
+              <a:t>Full </a:t>
+            </a:r>
+            <a:r>
+              <a:rPr lang="en-US" altLang="zh-CN" dirty="0" err="1"/>
+              <a:t>shapeError</a:t>
+            </a:r>
+            <a:r>
+              <a:rPr lang="en-US" altLang="zh-CN" dirty="0"/>
+              <a:t>, option 1</a:t>
+            </a:r>
+            <a:endParaRPr lang="zh-CN" altLang="en-US" dirty="0"/>
+          </a:p>
+        </p:txBody>
+      </p:sp>
+      <p:pic>
+        <p:nvPicPr>
+          <p:cNvPr id="5" name="图片 4" descr="图片包含 图表&#10;&#10;描述已自动生成">
+            <a:extLst>
+              <a:ext uri="{FF2B5EF4-FFF2-40B4-BE49-F238E27FC236}">
+                <a16:creationId xmlns:a16="http://schemas.microsoft.com/office/drawing/2014/main" id="{14FDF897-1AB5-4EB4-AC0D-899552BD0432}"/>
+              </a:ext>
+            </a:extLst>
+          </p:cNvPr>
+          <p:cNvPicPr>
+            <a:picLocks noChangeAspect="1"/>
+          </p:cNvPicPr>
+          <p:nvPr/>
+        </p:nvPicPr>
+        <p:blipFill>
+          <a:blip r:embed="rId2">
+            <a:extLst>
+              <a:ext uri="{28A0092B-C50C-407E-A947-70E740481C1C}">
+                <a14:useLocalDpi xmlns:a14="http://schemas.microsoft.com/office/drawing/2010/main" val="0"/>
+              </a:ext>
+            </a:extLst>
+          </a:blip>
+          <a:stretch>
+            <a:fillRect/>
+          </a:stretch>
+        </p:blipFill>
+        <p:spPr>
+          <a:xfrm>
+            <a:off x="551999" y="1455717"/>
+            <a:ext cx="11088000" cy="2520000"/>
+          </a:xfrm>
+          <a:prstGeom prst="rect">
+            <a:avLst/>
+          </a:prstGeom>
+        </p:spPr>
+      </p:pic>
+      <p:pic>
+        <p:nvPicPr>
+          <p:cNvPr id="7" name="图片 6" descr="图表, 散点图&#10;&#10;描述已自动生成">
+            <a:extLst>
+              <a:ext uri="{FF2B5EF4-FFF2-40B4-BE49-F238E27FC236}">
+                <a16:creationId xmlns:a16="http://schemas.microsoft.com/office/drawing/2014/main" id="{DB5FBFFD-DE71-4C56-9412-C50707790726}"/>
+              </a:ext>
+            </a:extLst>
+          </p:cNvPr>
+          <p:cNvPicPr>
+            <a:picLocks noChangeAspect="1"/>
+          </p:cNvPicPr>
+          <p:nvPr/>
+        </p:nvPicPr>
+        <p:blipFill>
+          <a:blip r:embed="rId3">
+            <a:extLst>
+              <a:ext uri="{28A0092B-C50C-407E-A947-70E740481C1C}">
+                <a14:useLocalDpi xmlns:a14="http://schemas.microsoft.com/office/drawing/2010/main" val="0"/>
+              </a:ext>
+            </a:extLst>
+          </a:blip>
+          <a:stretch>
+            <a:fillRect/>
+          </a:stretch>
+        </p:blipFill>
+        <p:spPr>
+          <a:xfrm>
+            <a:off x="264000" y="4378267"/>
+            <a:ext cx="11663999" cy="2160000"/>
+          </a:xfrm>
+          <a:prstGeom prst="rect">
+            <a:avLst/>
+          </a:prstGeom>
+        </p:spPr>
+      </p:pic>
+    </p:spTree>
+    <p:extLst>
+      <p:ext uri="{BB962C8B-B14F-4D97-AF65-F5344CB8AC3E}">
+        <p14:creationId xmlns:p14="http://schemas.microsoft.com/office/powerpoint/2010/main" val="1838091453"/>
+      </p:ext>
+    </p:extLst>
+  </p:cSld>
+  <p:clrMapOvr>
+    <a:masterClrMapping/>
+  </p:clrMapOvr>
+</p:sld>
+</file>
+
+<file path=ppt/slides/slide14.xml><?xml version="1.0" encoding="utf-8"?>
+<p:sld xmlns:a="http://schemas.openxmlformats.org/drawingml/2006/main" xmlns:r="http://schemas.openxmlformats.org/officeDocument/2006/relationships" xmlns:p="http://schemas.openxmlformats.org/presentationml/2006/main">
+  <p:cSld>
+    <p:spTree>
+      <p:nvGrpSpPr>
+        <p:cNvPr id="1" name=""/>
+        <p:cNvGrpSpPr/>
+        <p:nvPr/>
+      </p:nvGrpSpPr>
+      <p:grpSpPr>
+        <a:xfrm>
+          <a:off x="0" y="0"/>
+          <a:ext cx="0" cy="0"/>
+          <a:chOff x="0" y="0"/>
+          <a:chExt cx="0" cy="0"/>
+        </a:xfrm>
+      </p:grpSpPr>
+      <p:sp>
+        <p:nvSpPr>
+          <p:cNvPr id="2" name="标题 1">
+            <a:extLst>
+              <a:ext uri="{FF2B5EF4-FFF2-40B4-BE49-F238E27FC236}">
+                <a16:creationId xmlns:a16="http://schemas.microsoft.com/office/drawing/2014/main" id="{E992A8B7-1629-42FE-AA40-407523A09B1A}"/>
+              </a:ext>
+            </a:extLst>
+          </p:cNvPr>
+          <p:cNvSpPr>
+            <a:spLocks noGrp="1"/>
+          </p:cNvSpPr>
+          <p:nvPr>
+            <p:ph type="title"/>
+          </p:nvPr>
+        </p:nvSpPr>
+        <p:spPr/>
+        <p:txBody>
+          <a:bodyPr/>
+          <a:lstStyle/>
+          <a:p>
+            <a:r>
+              <a:rPr lang="en-US" altLang="zh-CN" dirty="0"/>
+              <a:t>Beam profile with perfect optics, focus</a:t>
+            </a:r>
+            <a:endParaRPr lang="zh-CN" altLang="en-US" dirty="0"/>
+          </a:p>
+        </p:txBody>
+      </p:sp>
+      <p:pic>
+        <p:nvPicPr>
+          <p:cNvPr id="7" name="图片 6">
+            <a:extLst>
+              <a:ext uri="{FF2B5EF4-FFF2-40B4-BE49-F238E27FC236}">
+                <a16:creationId xmlns:a16="http://schemas.microsoft.com/office/drawing/2014/main" id="{0695FD20-324B-4EC0-A6C5-FBF4633B6AD7}"/>
+              </a:ext>
+            </a:extLst>
+          </p:cNvPr>
+          <p:cNvPicPr>
+            <a:picLocks noChangeAspect="1"/>
+          </p:cNvPicPr>
+          <p:nvPr/>
+        </p:nvPicPr>
+        <p:blipFill>
+          <a:blip r:embed="rId3">
+            <a:extLst>
+              <a:ext uri="{28A0092B-C50C-407E-A947-70E740481C1C}">
+                <a14:useLocalDpi xmlns:a14="http://schemas.microsoft.com/office/drawing/2010/main" val="0"/>
+              </a:ext>
+            </a:extLst>
+          </a:blip>
+          <a:srcRect/>
+          <a:stretch/>
+        </p:blipFill>
+        <p:spPr>
+          <a:xfrm>
+            <a:off x="143431" y="1466568"/>
+            <a:ext cx="4320000" cy="4320000"/>
+          </a:xfrm>
+          <a:prstGeom prst="rect">
+            <a:avLst/>
+          </a:prstGeom>
+        </p:spPr>
+      </p:pic>
+      <p:pic>
+        <p:nvPicPr>
+          <p:cNvPr id="11" name="图片 10">
+            <a:extLst>
+              <a:ext uri="{FF2B5EF4-FFF2-40B4-BE49-F238E27FC236}">
+                <a16:creationId xmlns:a16="http://schemas.microsoft.com/office/drawing/2014/main" id="{E5628EC7-BA5C-4CB6-9488-0D3B767DE1A7}"/>
+              </a:ext>
+            </a:extLst>
+          </p:cNvPr>
+          <p:cNvPicPr>
+            <a:picLocks noChangeAspect="1"/>
+          </p:cNvPicPr>
+          <p:nvPr/>
+        </p:nvPicPr>
+        <p:blipFill>
+          <a:blip r:embed="rId4">
+            <a:extLst>
+              <a:ext uri="{28A0092B-C50C-407E-A947-70E740481C1C}">
+                <a14:useLocalDpi xmlns:a14="http://schemas.microsoft.com/office/drawing/2010/main" val="0"/>
+              </a:ext>
+            </a:extLst>
+          </a:blip>
+          <a:srcRect/>
+          <a:stretch/>
+        </p:blipFill>
+        <p:spPr>
+          <a:xfrm>
+            <a:off x="4826695" y="1166796"/>
+            <a:ext cx="3240000" cy="3240000"/>
+          </a:xfrm>
+          <a:prstGeom prst="rect">
+            <a:avLst/>
+          </a:prstGeom>
+        </p:spPr>
+      </p:pic>
+      <p:pic>
+        <p:nvPicPr>
+          <p:cNvPr id="13" name="图片 12">
+            <a:extLst>
+              <a:ext uri="{FF2B5EF4-FFF2-40B4-BE49-F238E27FC236}">
+                <a16:creationId xmlns:a16="http://schemas.microsoft.com/office/drawing/2014/main" id="{96DD5AB7-74FD-47AC-98EA-290C937072DC}"/>
+              </a:ext>
+            </a:extLst>
+          </p:cNvPr>
+          <p:cNvPicPr>
+            <a:picLocks noChangeAspect="1"/>
+          </p:cNvPicPr>
+          <p:nvPr/>
+        </p:nvPicPr>
+        <p:blipFill>
+          <a:blip r:embed="rId5">
+            <a:extLst>
+              <a:ext uri="{28A0092B-C50C-407E-A947-70E740481C1C}">
+                <a14:useLocalDpi xmlns:a14="http://schemas.microsoft.com/office/drawing/2010/main" val="0"/>
+              </a:ext>
+            </a:extLst>
+          </a:blip>
+          <a:srcRect/>
+          <a:stretch/>
+        </p:blipFill>
+        <p:spPr>
+          <a:xfrm>
+            <a:off x="4821677" y="3882903"/>
+            <a:ext cx="3240000" cy="3240000"/>
+          </a:xfrm>
+          <a:prstGeom prst="rect">
+            <a:avLst/>
+          </a:prstGeom>
+        </p:spPr>
+      </p:pic>
+      <p:pic>
+        <p:nvPicPr>
+          <p:cNvPr id="15" name="图片 14">
+            <a:extLst>
+              <a:ext uri="{FF2B5EF4-FFF2-40B4-BE49-F238E27FC236}">
+                <a16:creationId xmlns:a16="http://schemas.microsoft.com/office/drawing/2014/main" id="{37D5B7FD-4547-422A-B3A4-F8B9F0FF001D}"/>
+              </a:ext>
+            </a:extLst>
+          </p:cNvPr>
+          <p:cNvPicPr>
+            <a:picLocks noChangeAspect="1"/>
+          </p:cNvPicPr>
+          <p:nvPr/>
+        </p:nvPicPr>
+        <p:blipFill>
+          <a:blip r:embed="rId6">
+            <a:extLst>
+              <a:ext uri="{28A0092B-C50C-407E-A947-70E740481C1C}">
+                <a14:useLocalDpi xmlns:a14="http://schemas.microsoft.com/office/drawing/2010/main" val="0"/>
+              </a:ext>
+            </a:extLst>
+          </a:blip>
+          <a:srcRect/>
+          <a:stretch/>
+        </p:blipFill>
+        <p:spPr>
+          <a:xfrm>
+            <a:off x="8471990" y="1166796"/>
+            <a:ext cx="3240000" cy="3240000"/>
+          </a:xfrm>
+          <a:prstGeom prst="rect">
+            <a:avLst/>
+          </a:prstGeom>
+        </p:spPr>
+      </p:pic>
+      <p:pic>
+        <p:nvPicPr>
+          <p:cNvPr id="17" name="图片 16">
+            <a:extLst>
+              <a:ext uri="{FF2B5EF4-FFF2-40B4-BE49-F238E27FC236}">
+                <a16:creationId xmlns:a16="http://schemas.microsoft.com/office/drawing/2014/main" id="{C9206398-C7CA-4063-8AF7-467401B14B6C}"/>
+              </a:ext>
+            </a:extLst>
+          </p:cNvPr>
+          <p:cNvPicPr>
+            <a:picLocks noChangeAspect="1"/>
+          </p:cNvPicPr>
+          <p:nvPr/>
+        </p:nvPicPr>
+        <p:blipFill>
+          <a:blip r:embed="rId7">
+            <a:extLst>
+              <a:ext uri="{28A0092B-C50C-407E-A947-70E740481C1C}">
+                <a14:useLocalDpi xmlns:a14="http://schemas.microsoft.com/office/drawing/2010/main" val="0"/>
+              </a:ext>
+            </a:extLst>
+          </a:blip>
+          <a:srcRect/>
+          <a:stretch/>
+        </p:blipFill>
+        <p:spPr>
+          <a:xfrm>
+            <a:off x="8471990" y="3882903"/>
+            <a:ext cx="3240000" cy="3240000"/>
+          </a:xfrm>
+          <a:prstGeom prst="rect">
+            <a:avLst/>
+          </a:prstGeom>
+        </p:spPr>
+      </p:pic>
+      <p:sp>
+        <p:nvSpPr>
+          <p:cNvPr id="18" name="文本框 17">
+            <a:extLst>
+              <a:ext uri="{FF2B5EF4-FFF2-40B4-BE49-F238E27FC236}">
+                <a16:creationId xmlns:a16="http://schemas.microsoft.com/office/drawing/2014/main" id="{ECD58FBA-3E13-4416-8A8D-3A5BB1FCF885}"/>
+              </a:ext>
+            </a:extLst>
+          </p:cNvPr>
+          <p:cNvSpPr txBox="1"/>
+          <p:nvPr/>
+        </p:nvSpPr>
+        <p:spPr>
+          <a:xfrm>
+            <a:off x="268945" y="5846544"/>
+            <a:ext cx="4257243" cy="646331"/>
+          </a:xfrm>
+          <a:prstGeom prst="rect">
+            <a:avLst/>
+          </a:prstGeom>
+          <a:noFill/>
+        </p:spPr>
+        <p:txBody>
+          <a:bodyPr wrap="square" rtlCol="0">
+            <a:spAutoFit/>
+          </a:bodyPr>
+          <a:lstStyle/>
+          <a:p>
+            <a:r>
+              <a:rPr lang="en-US" altLang="zh-CN" dirty="0"/>
+              <a:t>Open slit, beam cut off in x due to telescope mirror 2 (1m)</a:t>
+            </a:r>
+            <a:endParaRPr lang="zh-CN" altLang="en-US" dirty="0"/>
+          </a:p>
+        </p:txBody>
+      </p:sp>
+    </p:spTree>
+    <p:extLst>
+      <p:ext uri="{BB962C8B-B14F-4D97-AF65-F5344CB8AC3E}">
+        <p14:creationId xmlns:p14="http://schemas.microsoft.com/office/powerpoint/2010/main" val="2443975983"/>
+      </p:ext>
+    </p:extLst>
+  </p:cSld>
+  <p:clrMapOvr>
+    <a:masterClrMapping/>
+  </p:clrMapOvr>
+</p:sld>
+</file>
+
+<file path=ppt/slides/slide15.xml><?xml version="1.0" encoding="utf-8"?>
+<p:sld xmlns:a="http://schemas.openxmlformats.org/drawingml/2006/main" xmlns:r="http://schemas.openxmlformats.org/officeDocument/2006/relationships" xmlns:p="http://schemas.openxmlformats.org/presentationml/2006/main">
+  <p:cSld>
+    <p:spTree>
+      <p:nvGrpSpPr>
+        <p:cNvPr id="1" name=""/>
+        <p:cNvGrpSpPr/>
+        <p:nvPr/>
+      </p:nvGrpSpPr>
+      <p:grpSpPr>
+        <a:xfrm>
+          <a:off x="0" y="0"/>
+          <a:ext cx="0" cy="0"/>
+          <a:chOff x="0" y="0"/>
+          <a:chExt cx="0" cy="0"/>
+        </a:xfrm>
+      </p:grpSpPr>
+      <p:sp>
+        <p:nvSpPr>
+          <p:cNvPr id="2" name="标题 1">
+            <a:extLst>
+              <a:ext uri="{FF2B5EF4-FFF2-40B4-BE49-F238E27FC236}">
+                <a16:creationId xmlns:a16="http://schemas.microsoft.com/office/drawing/2014/main" id="{E992A8B7-1629-42FE-AA40-407523A09B1A}"/>
+              </a:ext>
+            </a:extLst>
+          </p:cNvPr>
+          <p:cNvSpPr>
+            <a:spLocks noGrp="1"/>
+          </p:cNvSpPr>
+          <p:nvPr>
+            <p:ph type="title"/>
+          </p:nvPr>
+        </p:nvSpPr>
+        <p:spPr/>
+        <p:txBody>
+          <a:bodyPr/>
+          <a:lstStyle/>
+          <a:p>
+            <a:r>
+              <a:rPr lang="en-US" altLang="zh-CN" dirty="0"/>
+              <a:t>Beam profile with perfect optics, output</a:t>
+            </a:r>
+            <a:endParaRPr lang="zh-CN" altLang="en-US" dirty="0"/>
+          </a:p>
+        </p:txBody>
+      </p:sp>
+      <p:pic>
+        <p:nvPicPr>
+          <p:cNvPr id="11" name="图片 10">
+            <a:extLst>
+              <a:ext uri="{FF2B5EF4-FFF2-40B4-BE49-F238E27FC236}">
+                <a16:creationId xmlns:a16="http://schemas.microsoft.com/office/drawing/2014/main" id="{E5628EC7-BA5C-4CB6-9488-0D3B767DE1A7}"/>
+              </a:ext>
+            </a:extLst>
+          </p:cNvPr>
+          <p:cNvPicPr>
+            <a:picLocks noChangeAspect="1"/>
+          </p:cNvPicPr>
+          <p:nvPr/>
+        </p:nvPicPr>
+        <p:blipFill>
+          <a:blip r:embed="rId2">
+            <a:extLst>
+              <a:ext uri="{28A0092B-C50C-407E-A947-70E740481C1C}">
+                <a14:useLocalDpi xmlns:a14="http://schemas.microsoft.com/office/drawing/2010/main" val="0"/>
+              </a:ext>
+            </a:extLst>
+          </a:blip>
+          <a:srcRect/>
+          <a:stretch/>
+        </p:blipFill>
+        <p:spPr>
+          <a:xfrm>
+            <a:off x="4826695" y="1166796"/>
+            <a:ext cx="3240000" cy="3240000"/>
+          </a:xfrm>
+          <a:prstGeom prst="rect">
+            <a:avLst/>
+          </a:prstGeom>
+        </p:spPr>
+      </p:pic>
+      <p:pic>
+        <p:nvPicPr>
+          <p:cNvPr id="13" name="图片 12">
+            <a:extLst>
+              <a:ext uri="{FF2B5EF4-FFF2-40B4-BE49-F238E27FC236}">
+                <a16:creationId xmlns:a16="http://schemas.microsoft.com/office/drawing/2014/main" id="{96DD5AB7-74FD-47AC-98EA-290C937072DC}"/>
+              </a:ext>
+            </a:extLst>
+          </p:cNvPr>
+          <p:cNvPicPr>
+            <a:picLocks noChangeAspect="1"/>
+          </p:cNvPicPr>
+          <p:nvPr/>
+        </p:nvPicPr>
+        <p:blipFill>
+          <a:blip r:embed="rId3">
+            <a:extLst>
+              <a:ext uri="{28A0092B-C50C-407E-A947-70E740481C1C}">
+                <a14:useLocalDpi xmlns:a14="http://schemas.microsoft.com/office/drawing/2010/main" val="0"/>
+              </a:ext>
+            </a:extLst>
+          </a:blip>
+          <a:srcRect/>
+          <a:stretch/>
+        </p:blipFill>
+        <p:spPr>
+          <a:xfrm>
+            <a:off x="4821677" y="3882903"/>
+            <a:ext cx="3240000" cy="3240000"/>
+          </a:xfrm>
+          <a:prstGeom prst="rect">
+            <a:avLst/>
+          </a:prstGeom>
+        </p:spPr>
+      </p:pic>
+      <p:pic>
+        <p:nvPicPr>
+          <p:cNvPr id="15" name="图片 14">
+            <a:extLst>
+              <a:ext uri="{FF2B5EF4-FFF2-40B4-BE49-F238E27FC236}">
+                <a16:creationId xmlns:a16="http://schemas.microsoft.com/office/drawing/2014/main" id="{37D5B7FD-4547-422A-B3A4-F8B9F0FF001D}"/>
+              </a:ext>
+            </a:extLst>
+          </p:cNvPr>
+          <p:cNvPicPr>
+            <a:picLocks noChangeAspect="1"/>
+          </p:cNvPicPr>
+          <p:nvPr/>
+        </p:nvPicPr>
+        <p:blipFill>
+          <a:blip r:embed="rId4">
+            <a:extLst>
+              <a:ext uri="{28A0092B-C50C-407E-A947-70E740481C1C}">
+                <a14:useLocalDpi xmlns:a14="http://schemas.microsoft.com/office/drawing/2010/main" val="0"/>
+              </a:ext>
+            </a:extLst>
+          </a:blip>
+          <a:srcRect/>
+          <a:stretch/>
+        </p:blipFill>
+        <p:spPr>
+          <a:xfrm>
+            <a:off x="8471990" y="1166796"/>
+            <a:ext cx="3240000" cy="3240000"/>
+          </a:xfrm>
+          <a:prstGeom prst="rect">
+            <a:avLst/>
+          </a:prstGeom>
+        </p:spPr>
+      </p:pic>
+      <p:pic>
+        <p:nvPicPr>
+          <p:cNvPr id="17" name="图片 16">
+            <a:extLst>
+              <a:ext uri="{FF2B5EF4-FFF2-40B4-BE49-F238E27FC236}">
+                <a16:creationId xmlns:a16="http://schemas.microsoft.com/office/drawing/2014/main" id="{C9206398-C7CA-4063-8AF7-467401B14B6C}"/>
+              </a:ext>
+            </a:extLst>
+          </p:cNvPr>
+          <p:cNvPicPr>
+            <a:picLocks noChangeAspect="1"/>
+          </p:cNvPicPr>
+          <p:nvPr/>
+        </p:nvPicPr>
+        <p:blipFill>
+          <a:blip r:embed="rId5">
+            <a:extLst>
+              <a:ext uri="{28A0092B-C50C-407E-A947-70E740481C1C}">
+                <a14:useLocalDpi xmlns:a14="http://schemas.microsoft.com/office/drawing/2010/main" val="0"/>
+              </a:ext>
+            </a:extLst>
+          </a:blip>
+          <a:srcRect/>
+          <a:stretch/>
+        </p:blipFill>
+        <p:spPr>
+          <a:xfrm>
+            <a:off x="8471990" y="3882903"/>
+            <a:ext cx="3240000" cy="3240000"/>
+          </a:xfrm>
+          <a:prstGeom prst="rect">
+            <a:avLst/>
+          </a:prstGeom>
+        </p:spPr>
+      </p:pic>
+      <p:grpSp>
+        <p:nvGrpSpPr>
+          <p:cNvPr id="8" name="组合 7">
+            <a:extLst>
+              <a:ext uri="{FF2B5EF4-FFF2-40B4-BE49-F238E27FC236}">
+                <a16:creationId xmlns:a16="http://schemas.microsoft.com/office/drawing/2014/main" id="{95537558-BC43-4BD8-8C06-BA58354EFAE9}"/>
+              </a:ext>
+            </a:extLst>
+          </p:cNvPr>
+          <p:cNvGrpSpPr/>
+          <p:nvPr/>
+        </p:nvGrpSpPr>
+        <p:grpSpPr>
+          <a:xfrm>
+            <a:off x="565268" y="2539907"/>
+            <a:ext cx="4320000" cy="4320000"/>
+            <a:chOff x="3189" y="1269000"/>
+            <a:chExt cx="4320000" cy="4320000"/>
+          </a:xfrm>
+        </p:grpSpPr>
+        <p:pic>
+          <p:nvPicPr>
+            <p:cNvPr id="7" name="图片 6">
+              <a:extLst>
+                <a:ext uri="{FF2B5EF4-FFF2-40B4-BE49-F238E27FC236}">
+                  <a16:creationId xmlns:a16="http://schemas.microsoft.com/office/drawing/2014/main" id="{0695FD20-324B-4EC0-A6C5-FBF4633B6AD7}"/>
+                </a:ext>
+              </a:extLst>
+            </p:cNvPr>
+            <p:cNvPicPr>
+              <a:picLocks noChangeAspect="1"/>
+            </p:cNvPicPr>
+            <p:nvPr/>
+          </p:nvPicPr>
+          <p:blipFill>
+            <a:blip r:embed="rId6">
+              <a:extLst>
+                <a:ext uri="{28A0092B-C50C-407E-A947-70E740481C1C}">
+                  <a14:useLocalDpi xmlns:a14="http://schemas.microsoft.com/office/drawing/2010/main" val="0"/>
+                </a:ext>
+              </a:extLst>
+            </a:blip>
+            <a:srcRect/>
+            <a:stretch/>
+          </p:blipFill>
+          <p:spPr>
+            <a:xfrm>
+              <a:off x="3189" y="1269000"/>
+              <a:ext cx="4320000" cy="4320000"/>
+            </a:xfrm>
+            <a:prstGeom prst="rect">
+              <a:avLst/>
+            </a:prstGeom>
+          </p:spPr>
+        </p:pic>
+        <p:sp>
+          <p:nvSpPr>
+            <p:cNvPr id="5" name="文本框 4">
+              <a:extLst>
+                <a:ext uri="{FF2B5EF4-FFF2-40B4-BE49-F238E27FC236}">
+                  <a16:creationId xmlns:a16="http://schemas.microsoft.com/office/drawing/2014/main" id="{4506AB22-FF2F-4683-ADFE-0CCEFB64CA74}"/>
+                </a:ext>
+              </a:extLst>
+            </p:cNvPr>
+            <p:cNvSpPr txBox="1"/>
+            <p:nvPr/>
+          </p:nvSpPr>
+          <p:spPr>
+            <a:xfrm>
+              <a:off x="480010" y="1576388"/>
+              <a:ext cx="819455" cy="369332"/>
+            </a:xfrm>
+            <a:prstGeom prst="rect">
+              <a:avLst/>
+            </a:prstGeom>
+            <a:noFill/>
+          </p:spPr>
+          <p:txBody>
+            <a:bodyPr wrap="none" rtlCol="0">
+              <a:spAutoFit/>
+            </a:bodyPr>
+            <a:lstStyle/>
+            <a:p>
+              <a:r>
+                <a:rPr lang="en-US" altLang="zh-CN" dirty="0">
+                  <a:solidFill>
+                    <a:srgbClr val="FF0000"/>
+                  </a:solidFill>
+                </a:rPr>
+                <a:t>closed</a:t>
+              </a:r>
+              <a:endParaRPr lang="zh-CN" altLang="en-US" dirty="0">
+                <a:solidFill>
+                  <a:srgbClr val="FF0000"/>
+                </a:solidFill>
+              </a:endParaRPr>
+            </a:p>
+          </p:txBody>
+        </p:sp>
+      </p:grpSp>
+      <p:grpSp>
+        <p:nvGrpSpPr>
+          <p:cNvPr id="6" name="组合 5">
+            <a:extLst>
+              <a:ext uri="{FF2B5EF4-FFF2-40B4-BE49-F238E27FC236}">
+                <a16:creationId xmlns:a16="http://schemas.microsoft.com/office/drawing/2014/main" id="{6C3864CE-9814-40DD-93E5-5795397EDE55}"/>
+              </a:ext>
+            </a:extLst>
+          </p:cNvPr>
+          <p:cNvGrpSpPr/>
+          <p:nvPr/>
+        </p:nvGrpSpPr>
+        <p:grpSpPr>
+          <a:xfrm>
+            <a:off x="0" y="1214343"/>
+            <a:ext cx="1856772" cy="1836000"/>
+            <a:chOff x="2898769" y="5057999"/>
+            <a:chExt cx="1856772" cy="1836000"/>
+          </a:xfrm>
+        </p:grpSpPr>
+        <p:pic>
+          <p:nvPicPr>
+            <p:cNvPr id="4" name="图片 3">
+              <a:extLst>
+                <a:ext uri="{FF2B5EF4-FFF2-40B4-BE49-F238E27FC236}">
+                  <a16:creationId xmlns:a16="http://schemas.microsoft.com/office/drawing/2014/main" id="{3390C116-28D1-41B8-AC87-2CA3B61F025E}"/>
+                </a:ext>
+              </a:extLst>
+            </p:cNvPr>
+            <p:cNvPicPr>
+              <a:picLocks noChangeAspect="1"/>
+            </p:cNvPicPr>
+            <p:nvPr/>
+          </p:nvPicPr>
+          <p:blipFill rotWithShape="1">
+            <a:blip r:embed="rId7">
+              <a:extLst>
+                <a:ext uri="{28A0092B-C50C-407E-A947-70E740481C1C}">
+                  <a14:useLocalDpi xmlns:a14="http://schemas.microsoft.com/office/drawing/2010/main" val="0"/>
+                </a:ext>
+              </a:extLst>
+            </a:blip>
+            <a:srcRect t="850" r="24340" b="24336"/>
+            <a:stretch/>
+          </p:blipFill>
+          <p:spPr>
+            <a:xfrm>
+              <a:off x="2898769" y="5057999"/>
+              <a:ext cx="1856772" cy="1836000"/>
+            </a:xfrm>
+            <a:prstGeom prst="rect">
+              <a:avLst/>
+            </a:prstGeom>
+          </p:spPr>
+        </p:pic>
+        <p:sp>
+          <p:nvSpPr>
+            <p:cNvPr id="12" name="文本框 11">
+              <a:extLst>
+                <a:ext uri="{FF2B5EF4-FFF2-40B4-BE49-F238E27FC236}">
+                  <a16:creationId xmlns:a16="http://schemas.microsoft.com/office/drawing/2014/main" id="{A63746A6-34C9-41FB-9F44-27071C592A31}"/>
+                </a:ext>
+              </a:extLst>
+            </p:cNvPr>
+            <p:cNvSpPr txBox="1"/>
+            <p:nvPr/>
+          </p:nvSpPr>
+          <p:spPr>
+            <a:xfrm>
+              <a:off x="3088503" y="5219668"/>
+              <a:ext cx="696024" cy="369332"/>
+            </a:xfrm>
+            <a:prstGeom prst="rect">
+              <a:avLst/>
+            </a:prstGeom>
+            <a:noFill/>
+          </p:spPr>
+          <p:txBody>
+            <a:bodyPr wrap="none" rtlCol="0">
+              <a:spAutoFit/>
+            </a:bodyPr>
+            <a:lstStyle/>
+            <a:p>
+              <a:r>
+                <a:rPr lang="en-US" altLang="zh-CN" dirty="0">
+                  <a:solidFill>
+                    <a:srgbClr val="FF0000"/>
+                  </a:solidFill>
+                </a:rPr>
+                <a:t>open</a:t>
+              </a:r>
+              <a:endParaRPr lang="zh-CN" altLang="en-US" dirty="0">
+                <a:solidFill>
+                  <a:srgbClr val="FF0000"/>
+                </a:solidFill>
+              </a:endParaRPr>
+            </a:p>
+          </p:txBody>
+        </p:sp>
+      </p:grpSp>
+      <p:sp>
+        <p:nvSpPr>
+          <p:cNvPr id="14" name="文本框 13">
+            <a:extLst>
+              <a:ext uri="{FF2B5EF4-FFF2-40B4-BE49-F238E27FC236}">
+                <a16:creationId xmlns:a16="http://schemas.microsoft.com/office/drawing/2014/main" id="{7ACE0A12-72FA-479E-BE66-7736D79EB0F6}"/>
+              </a:ext>
+            </a:extLst>
+          </p:cNvPr>
+          <p:cNvSpPr txBox="1"/>
+          <p:nvPr/>
+        </p:nvSpPr>
+        <p:spPr>
+          <a:xfrm>
+            <a:off x="5209403" y="1690688"/>
+            <a:ext cx="696024" cy="369332"/>
+          </a:xfrm>
+          <a:prstGeom prst="rect">
+            <a:avLst/>
+          </a:prstGeom>
+          <a:noFill/>
+        </p:spPr>
+        <p:txBody>
+          <a:bodyPr wrap="none" rtlCol="0">
+            <a:spAutoFit/>
+          </a:bodyPr>
+          <a:lstStyle/>
+          <a:p>
+            <a:r>
+              <a:rPr lang="en-US" altLang="zh-CN" dirty="0">
+                <a:solidFill>
+                  <a:srgbClr val="FF0000"/>
+                </a:solidFill>
+              </a:rPr>
+              <a:t>open</a:t>
+            </a:r>
+            <a:endParaRPr lang="zh-CN" altLang="en-US" dirty="0">
+              <a:solidFill>
+                <a:srgbClr val="FF0000"/>
+              </a:solidFill>
+            </a:endParaRPr>
+          </a:p>
+        </p:txBody>
+      </p:sp>
+      <p:sp>
+        <p:nvSpPr>
+          <p:cNvPr id="16" name="文本框 15">
+            <a:extLst>
+              <a:ext uri="{FF2B5EF4-FFF2-40B4-BE49-F238E27FC236}">
+                <a16:creationId xmlns:a16="http://schemas.microsoft.com/office/drawing/2014/main" id="{151BD80A-2E10-4164-A374-C8B8BA283716}"/>
+              </a:ext>
+            </a:extLst>
+          </p:cNvPr>
+          <p:cNvSpPr txBox="1"/>
+          <p:nvPr/>
+        </p:nvSpPr>
+        <p:spPr>
+          <a:xfrm>
+            <a:off x="8854303" y="1690688"/>
+            <a:ext cx="696024" cy="369332"/>
+          </a:xfrm>
+          <a:prstGeom prst="rect">
+            <a:avLst/>
+          </a:prstGeom>
+          <a:noFill/>
+        </p:spPr>
+        <p:txBody>
+          <a:bodyPr wrap="none" rtlCol="0">
+            <a:spAutoFit/>
+          </a:bodyPr>
+          <a:lstStyle/>
+          <a:p>
+            <a:r>
+              <a:rPr lang="en-US" altLang="zh-CN" dirty="0">
+                <a:solidFill>
+                  <a:srgbClr val="FF0000"/>
+                </a:solidFill>
+              </a:rPr>
+              <a:t>open</a:t>
+            </a:r>
+            <a:endParaRPr lang="zh-CN" altLang="en-US" dirty="0">
+              <a:solidFill>
+                <a:srgbClr val="FF0000"/>
+              </a:solidFill>
+            </a:endParaRPr>
+          </a:p>
+        </p:txBody>
+      </p:sp>
+      <p:sp>
+        <p:nvSpPr>
+          <p:cNvPr id="19" name="文本框 18">
+            <a:extLst>
+              <a:ext uri="{FF2B5EF4-FFF2-40B4-BE49-F238E27FC236}">
+                <a16:creationId xmlns:a16="http://schemas.microsoft.com/office/drawing/2014/main" id="{5007B1DC-8FE9-405C-AEB2-29B78CD99029}"/>
+              </a:ext>
+            </a:extLst>
+          </p:cNvPr>
+          <p:cNvSpPr txBox="1"/>
+          <p:nvPr/>
+        </p:nvSpPr>
+        <p:spPr>
+          <a:xfrm>
+            <a:off x="5209403" y="4406795"/>
+            <a:ext cx="819455" cy="369332"/>
+          </a:xfrm>
+          <a:prstGeom prst="rect">
+            <a:avLst/>
+          </a:prstGeom>
+          <a:noFill/>
+        </p:spPr>
+        <p:txBody>
+          <a:bodyPr wrap="none" rtlCol="0">
+            <a:spAutoFit/>
+          </a:bodyPr>
+          <a:lstStyle/>
+          <a:p>
+            <a:r>
+              <a:rPr lang="en-US" altLang="zh-CN" dirty="0">
+                <a:solidFill>
+                  <a:srgbClr val="FF0000"/>
+                </a:solidFill>
+              </a:rPr>
+              <a:t>closed</a:t>
+            </a:r>
+            <a:endParaRPr lang="zh-CN" altLang="en-US" dirty="0">
+              <a:solidFill>
+                <a:srgbClr val="FF0000"/>
+              </a:solidFill>
+            </a:endParaRPr>
+          </a:p>
+        </p:txBody>
+      </p:sp>
+      <p:sp>
+        <p:nvSpPr>
+          <p:cNvPr id="20" name="文本框 19">
+            <a:extLst>
+              <a:ext uri="{FF2B5EF4-FFF2-40B4-BE49-F238E27FC236}">
+                <a16:creationId xmlns:a16="http://schemas.microsoft.com/office/drawing/2014/main" id="{1395CAAA-C26F-46CC-92FE-7902C5067891}"/>
+              </a:ext>
+            </a:extLst>
+          </p:cNvPr>
+          <p:cNvSpPr txBox="1"/>
+          <p:nvPr/>
+        </p:nvSpPr>
+        <p:spPr>
+          <a:xfrm>
+            <a:off x="8854303" y="4406795"/>
+            <a:ext cx="819455" cy="369332"/>
+          </a:xfrm>
+          <a:prstGeom prst="rect">
+            <a:avLst/>
+          </a:prstGeom>
+          <a:noFill/>
+        </p:spPr>
+        <p:txBody>
+          <a:bodyPr wrap="none" rtlCol="0">
+            <a:spAutoFit/>
+          </a:bodyPr>
+          <a:lstStyle/>
+          <a:p>
+            <a:r>
+              <a:rPr lang="en-US" altLang="zh-CN" dirty="0">
+                <a:solidFill>
+                  <a:srgbClr val="FF0000"/>
+                </a:solidFill>
+              </a:rPr>
+              <a:t>closed</a:t>
+            </a:r>
+            <a:endParaRPr lang="zh-CN" altLang="en-US" dirty="0">
+              <a:solidFill>
+                <a:srgbClr val="FF0000"/>
+              </a:solidFill>
+            </a:endParaRPr>
+          </a:p>
+        </p:txBody>
+      </p:sp>
+    </p:spTree>
+    <p:extLst>
+      <p:ext uri="{BB962C8B-B14F-4D97-AF65-F5344CB8AC3E}">
+        <p14:creationId xmlns:p14="http://schemas.microsoft.com/office/powerpoint/2010/main" val="2189159483"/>
+      </p:ext>
+    </p:extLst>
+  </p:cSld>
+  <p:clrMapOvr>
+    <a:masterClrMapping/>
+  </p:clrMapOvr>
+</p:sld>
+</file>
+
+<file path=ppt/slides/slide16.xml><?xml version="1.0" encoding="utf-8"?>
+<p:sld xmlns:a="http://schemas.openxmlformats.org/drawingml/2006/main" xmlns:r="http://schemas.openxmlformats.org/officeDocument/2006/relationships" xmlns:p="http://schemas.openxmlformats.org/presentationml/2006/main">
+  <p:cSld>
+    <p:spTree>
+      <p:nvGrpSpPr>
+        <p:cNvPr id="1" name=""/>
+        <p:cNvGrpSpPr/>
+        <p:nvPr/>
+      </p:nvGrpSpPr>
+      <p:grpSpPr>
+        <a:xfrm>
+          <a:off x="0" y="0"/>
+          <a:ext cx="0" cy="0"/>
+          <a:chOff x="0" y="0"/>
+          <a:chExt cx="0" cy="0"/>
+        </a:xfrm>
+      </p:grpSpPr>
+      <p:sp>
+        <p:nvSpPr>
+          <p:cNvPr id="2" name="标题 1">
+            <a:extLst>
+              <a:ext uri="{FF2B5EF4-FFF2-40B4-BE49-F238E27FC236}">
+                <a16:creationId xmlns:a16="http://schemas.microsoft.com/office/drawing/2014/main" id="{A83A6069-F48A-459C-8956-5314C6308FD5}"/>
+              </a:ext>
+            </a:extLst>
+          </p:cNvPr>
+          <p:cNvSpPr>
+            <a:spLocks noGrp="1"/>
+          </p:cNvSpPr>
+          <p:nvPr>
+            <p:ph type="title"/>
+          </p:nvPr>
+        </p:nvSpPr>
+        <p:spPr/>
+        <p:txBody>
+          <a:bodyPr/>
+          <a:lstStyle/>
+          <a:p>
+            <a:r>
+              <a:rPr lang="en-US" altLang="zh-CN" dirty="0"/>
+              <a:t>Full </a:t>
+            </a:r>
+            <a:r>
+              <a:rPr lang="en-US" altLang="zh-CN" dirty="0" err="1"/>
+              <a:t>shapeError</a:t>
+            </a:r>
+            <a:r>
+              <a:rPr lang="en-US" altLang="zh-CN" dirty="0"/>
+              <a:t>, option 2</a:t>
+            </a:r>
+            <a:endParaRPr lang="zh-CN" altLang="en-US" dirty="0"/>
+          </a:p>
+        </p:txBody>
+      </p:sp>
+      <p:pic>
+        <p:nvPicPr>
+          <p:cNvPr id="5" name="图片 4">
+            <a:extLst>
+              <a:ext uri="{FF2B5EF4-FFF2-40B4-BE49-F238E27FC236}">
+                <a16:creationId xmlns:a16="http://schemas.microsoft.com/office/drawing/2014/main" id="{14FDF897-1AB5-4EB4-AC0D-899552BD0432}"/>
+              </a:ext>
+            </a:extLst>
+          </p:cNvPr>
+          <p:cNvPicPr>
+            <a:picLocks noChangeAspect="1"/>
+          </p:cNvPicPr>
+          <p:nvPr/>
+        </p:nvPicPr>
+        <p:blipFill>
+          <a:blip r:embed="rId2">
+            <a:extLst>
+              <a:ext uri="{28A0092B-C50C-407E-A947-70E740481C1C}">
+                <a14:useLocalDpi xmlns:a14="http://schemas.microsoft.com/office/drawing/2010/main" val="0"/>
+              </a:ext>
+            </a:extLst>
+          </a:blip>
+          <a:srcRect/>
+          <a:stretch/>
+        </p:blipFill>
+        <p:spPr>
+          <a:xfrm>
+            <a:off x="551999" y="1455717"/>
+            <a:ext cx="11088000" cy="2519999"/>
+          </a:xfrm>
+          <a:prstGeom prst="rect">
+            <a:avLst/>
+          </a:prstGeom>
+        </p:spPr>
+      </p:pic>
+      <p:pic>
+        <p:nvPicPr>
+          <p:cNvPr id="7" name="图片 6">
+            <a:extLst>
+              <a:ext uri="{FF2B5EF4-FFF2-40B4-BE49-F238E27FC236}">
+                <a16:creationId xmlns:a16="http://schemas.microsoft.com/office/drawing/2014/main" id="{DB5FBFFD-DE71-4C56-9412-C50707790726}"/>
+              </a:ext>
+            </a:extLst>
+          </p:cNvPr>
+          <p:cNvPicPr>
+            <a:picLocks noChangeAspect="1"/>
+          </p:cNvPicPr>
+          <p:nvPr/>
+        </p:nvPicPr>
+        <p:blipFill>
+          <a:blip r:embed="rId3">
+            <a:extLst>
+              <a:ext uri="{28A0092B-C50C-407E-A947-70E740481C1C}">
+                <a14:useLocalDpi xmlns:a14="http://schemas.microsoft.com/office/drawing/2010/main" val="0"/>
+              </a:ext>
+            </a:extLst>
+          </a:blip>
+          <a:srcRect/>
+          <a:stretch/>
+        </p:blipFill>
+        <p:spPr>
+          <a:xfrm>
+            <a:off x="264000" y="4378267"/>
+            <a:ext cx="11663999" cy="2159999"/>
+          </a:xfrm>
+          <a:prstGeom prst="rect">
+            <a:avLst/>
+          </a:prstGeom>
+        </p:spPr>
+      </p:pic>
+    </p:spTree>
+    <p:extLst>
+      <p:ext uri="{BB962C8B-B14F-4D97-AF65-F5344CB8AC3E}">
+        <p14:creationId xmlns:p14="http://schemas.microsoft.com/office/powerpoint/2010/main" val="2054666817"/>
+      </p:ext>
+    </p:extLst>
+  </p:cSld>
+  <p:clrMapOvr>
+    <a:masterClrMapping/>
+  </p:clrMapOvr>
+</p:sld>
+</file>
+
+<file path=ppt/slides/slide2.xml><?xml version="1.0" encoding="utf-8"?>
+<p:sld xmlns:a="http://schemas.openxmlformats.org/drawingml/2006/main" xmlns:r="http://schemas.openxmlformats.org/officeDocument/2006/relationships" xmlns:p="http://schemas.openxmlformats.org/presentationml/2006/main">
+  <p:cSld>
+    <p:spTree>
+      <p:nvGrpSpPr>
+        <p:cNvPr id="1" name=""/>
+        <p:cNvGrpSpPr/>
+        <p:nvPr/>
+      </p:nvGrpSpPr>
+      <p:grpSpPr>
+        <a:xfrm>
+          <a:off x="0" y="0"/>
+          <a:ext cx="0" cy="0"/>
+          <a:chOff x="0" y="0"/>
+          <a:chExt cx="0" cy="0"/>
+        </a:xfrm>
+      </p:grpSpPr>
+      <p:sp>
+        <p:nvSpPr>
+          <p:cNvPr id="2" name="标题 1">
+            <a:extLst>
+              <a:ext uri="{FF2B5EF4-FFF2-40B4-BE49-F238E27FC236}">
+                <a16:creationId xmlns:a16="http://schemas.microsoft.com/office/drawing/2014/main" id="{F908C6EE-D5B7-4F48-93CB-4506A050410E}"/>
+              </a:ext>
+            </a:extLst>
+          </p:cNvPr>
+          <p:cNvSpPr>
+            <a:spLocks noGrp="1"/>
+          </p:cNvSpPr>
+          <p:nvPr>
+            <p:ph type="title"/>
+          </p:nvPr>
+        </p:nvSpPr>
+        <p:spPr/>
+        <p:txBody>
+          <a:bodyPr/>
+          <a:lstStyle/>
+          <a:p>
+            <a:r>
+              <a:rPr lang="en-US" altLang="zh-CN" dirty="0"/>
+              <a:t>Telescope mirror optimization</a:t>
+            </a:r>
+            <a:endParaRPr lang="zh-CN" altLang="en-US" dirty="0"/>
+          </a:p>
+        </p:txBody>
+      </p:sp>
+      <p:pic>
+        <p:nvPicPr>
+          <p:cNvPr id="5" name="内容占位符 4" descr="图形用户界面&#10;&#10;低可信度描述已自动生成">
+            <a:extLst>
+              <a:ext uri="{FF2B5EF4-FFF2-40B4-BE49-F238E27FC236}">
+                <a16:creationId xmlns:a16="http://schemas.microsoft.com/office/drawing/2014/main" id="{6248DB74-BF71-4039-A471-B727AAD8018E}"/>
+              </a:ext>
+            </a:extLst>
+          </p:cNvPr>
+          <p:cNvPicPr>
+            <a:picLocks noGrp="1" noChangeAspect="1"/>
+          </p:cNvPicPr>
+          <p:nvPr>
+            <p:ph idx="1"/>
+          </p:nvPr>
+        </p:nvPicPr>
+        <p:blipFill>
+          <a:blip r:embed="rId2">
+            <a:extLst>
+              <a:ext uri="{28A0092B-C50C-407E-A947-70E740481C1C}">
+                <a14:useLocalDpi xmlns:a14="http://schemas.microsoft.com/office/drawing/2010/main" val="0"/>
+              </a:ext>
+            </a:extLst>
+          </a:blip>
+          <a:stretch>
+            <a:fillRect/>
+          </a:stretch>
+        </p:blipFill>
+        <p:spPr>
+          <a:xfrm>
+            <a:off x="838200" y="2806340"/>
+            <a:ext cx="10515600" cy="2389908"/>
+          </a:xfrm>
+        </p:spPr>
+      </p:pic>
+    </p:spTree>
+    <p:extLst>
+      <p:ext uri="{BB962C8B-B14F-4D97-AF65-F5344CB8AC3E}">
+        <p14:creationId xmlns:p14="http://schemas.microsoft.com/office/powerpoint/2010/main" val="3357739531"/>
+      </p:ext>
+    </p:extLst>
+  </p:cSld>
+  <p:clrMapOvr>
+    <a:masterClrMapping/>
+  </p:clrMapOvr>
+</p:sld>
+</file>
+
+<file path=ppt/slides/slide3.xml><?xml version="1.0" encoding="utf-8"?>
+<p:sld xmlns:a="http://schemas.openxmlformats.org/drawingml/2006/main" xmlns:r="http://schemas.openxmlformats.org/officeDocument/2006/relationships" xmlns:p="http://schemas.openxmlformats.org/presentationml/2006/main">
+  <p:cSld>
+    <p:spTree>
+      <p:nvGrpSpPr>
+        <p:cNvPr id="1" name=""/>
+        <p:cNvGrpSpPr/>
+        <p:nvPr/>
+      </p:nvGrpSpPr>
+      <p:grpSpPr>
+        <a:xfrm>
+          <a:off x="0" y="0"/>
+          <a:ext cx="0" cy="0"/>
+          <a:chOff x="0" y="0"/>
+          <a:chExt cx="0" cy="0"/>
+        </a:xfrm>
+      </p:grpSpPr>
+      <p:sp>
+        <p:nvSpPr>
+          <p:cNvPr id="2" name="标题 1">
+            <a:extLst>
+              <a:ext uri="{FF2B5EF4-FFF2-40B4-BE49-F238E27FC236}">
+                <a16:creationId xmlns:a16="http://schemas.microsoft.com/office/drawing/2014/main" id="{E992A8B7-1629-42FE-AA40-407523A09B1A}"/>
+              </a:ext>
+            </a:extLst>
+          </p:cNvPr>
+          <p:cNvSpPr>
+            <a:spLocks noGrp="1"/>
+          </p:cNvSpPr>
+          <p:nvPr>
+            <p:ph type="title"/>
+          </p:nvPr>
+        </p:nvSpPr>
+        <p:spPr/>
+        <p:txBody>
+          <a:bodyPr/>
+          <a:lstStyle/>
+          <a:p>
+            <a:r>
+              <a:rPr lang="en-US" altLang="zh-CN" dirty="0"/>
+              <a:t>Beam profile with perfect optics, focus</a:t>
+            </a:r>
+            <a:endParaRPr lang="zh-CN" altLang="en-US" dirty="0"/>
+          </a:p>
+        </p:txBody>
+      </p:sp>
+      <p:pic>
+        <p:nvPicPr>
+          <p:cNvPr id="7" name="图片 6" descr="图片包含 徽标&#10;&#10;描述已自动生成">
+            <a:extLst>
+              <a:ext uri="{FF2B5EF4-FFF2-40B4-BE49-F238E27FC236}">
+                <a16:creationId xmlns:a16="http://schemas.microsoft.com/office/drawing/2014/main" id="{0695FD20-324B-4EC0-A6C5-FBF4633B6AD7}"/>
+              </a:ext>
+            </a:extLst>
+          </p:cNvPr>
+          <p:cNvPicPr>
+            <a:picLocks noChangeAspect="1"/>
+          </p:cNvPicPr>
+          <p:nvPr/>
+        </p:nvPicPr>
+        <p:blipFill>
+          <a:blip r:embed="rId2">
+            <a:extLst>
+              <a:ext uri="{28A0092B-C50C-407E-A947-70E740481C1C}">
+                <a14:useLocalDpi xmlns:a14="http://schemas.microsoft.com/office/drawing/2010/main" val="0"/>
+              </a:ext>
+            </a:extLst>
+          </a:blip>
+          <a:stretch>
+            <a:fillRect/>
+          </a:stretch>
+        </p:blipFill>
+        <p:spPr>
+          <a:xfrm>
+            <a:off x="143431" y="1466568"/>
+            <a:ext cx="4320000" cy="4320000"/>
+          </a:xfrm>
+          <a:prstGeom prst="rect">
+            <a:avLst/>
+          </a:prstGeom>
+        </p:spPr>
+      </p:pic>
+      <p:pic>
+        <p:nvPicPr>
+          <p:cNvPr id="11" name="图片 10" descr="黑暗中亮着灯&#10;&#10;低可信度描述已自动生成">
+            <a:extLst>
+              <a:ext uri="{FF2B5EF4-FFF2-40B4-BE49-F238E27FC236}">
+                <a16:creationId xmlns:a16="http://schemas.microsoft.com/office/drawing/2014/main" id="{E5628EC7-BA5C-4CB6-9488-0D3B767DE1A7}"/>
+              </a:ext>
+            </a:extLst>
+          </p:cNvPr>
+          <p:cNvPicPr>
+            <a:picLocks noChangeAspect="1"/>
+          </p:cNvPicPr>
+          <p:nvPr/>
+        </p:nvPicPr>
+        <p:blipFill>
+          <a:blip r:embed="rId3">
+            <a:extLst>
+              <a:ext uri="{28A0092B-C50C-407E-A947-70E740481C1C}">
+                <a14:useLocalDpi xmlns:a14="http://schemas.microsoft.com/office/drawing/2010/main" val="0"/>
+              </a:ext>
+            </a:extLst>
+          </a:blip>
+          <a:stretch>
+            <a:fillRect/>
+          </a:stretch>
+        </p:blipFill>
+        <p:spPr>
+          <a:xfrm>
+            <a:off x="4826695" y="1166796"/>
+            <a:ext cx="3240000" cy="3240000"/>
+          </a:xfrm>
+          <a:prstGeom prst="rect">
+            <a:avLst/>
+          </a:prstGeom>
+        </p:spPr>
+      </p:pic>
+      <p:pic>
+        <p:nvPicPr>
+          <p:cNvPr id="13" name="图片 12" descr="黑暗中的灯光&#10;&#10;中度可信度描述已自动生成">
+            <a:extLst>
+              <a:ext uri="{FF2B5EF4-FFF2-40B4-BE49-F238E27FC236}">
+                <a16:creationId xmlns:a16="http://schemas.microsoft.com/office/drawing/2014/main" id="{96DD5AB7-74FD-47AC-98EA-290C937072DC}"/>
+              </a:ext>
+            </a:extLst>
+          </p:cNvPr>
+          <p:cNvPicPr>
+            <a:picLocks noChangeAspect="1"/>
+          </p:cNvPicPr>
+          <p:nvPr/>
+        </p:nvPicPr>
+        <p:blipFill>
+          <a:blip r:embed="rId4">
+            <a:extLst>
+              <a:ext uri="{28A0092B-C50C-407E-A947-70E740481C1C}">
+                <a14:useLocalDpi xmlns:a14="http://schemas.microsoft.com/office/drawing/2010/main" val="0"/>
+              </a:ext>
+            </a:extLst>
+          </a:blip>
+          <a:stretch>
+            <a:fillRect/>
+          </a:stretch>
+        </p:blipFill>
+        <p:spPr>
+          <a:xfrm>
+            <a:off x="4821677" y="3882903"/>
+            <a:ext cx="3240000" cy="3240000"/>
+          </a:xfrm>
+          <a:prstGeom prst="rect">
+            <a:avLst/>
+          </a:prstGeom>
+        </p:spPr>
+      </p:pic>
+      <p:pic>
+        <p:nvPicPr>
+          <p:cNvPr id="15" name="图片 14" descr="黑暗中的灯光&#10;&#10;中度可信度描述已自动生成">
+            <a:extLst>
+              <a:ext uri="{FF2B5EF4-FFF2-40B4-BE49-F238E27FC236}">
+                <a16:creationId xmlns:a16="http://schemas.microsoft.com/office/drawing/2014/main" id="{37D5B7FD-4547-422A-B3A4-F8B9F0FF001D}"/>
+              </a:ext>
+            </a:extLst>
+          </p:cNvPr>
+          <p:cNvPicPr>
+            <a:picLocks noChangeAspect="1"/>
+          </p:cNvPicPr>
+          <p:nvPr/>
+        </p:nvPicPr>
+        <p:blipFill>
+          <a:blip r:embed="rId5">
+            <a:extLst>
+              <a:ext uri="{28A0092B-C50C-407E-A947-70E740481C1C}">
+                <a14:useLocalDpi xmlns:a14="http://schemas.microsoft.com/office/drawing/2010/main" val="0"/>
+              </a:ext>
+            </a:extLst>
+          </a:blip>
+          <a:stretch>
+            <a:fillRect/>
+          </a:stretch>
+        </p:blipFill>
+        <p:spPr>
+          <a:xfrm>
+            <a:off x="8471990" y="1166796"/>
+            <a:ext cx="3240000" cy="3240000"/>
+          </a:xfrm>
+          <a:prstGeom prst="rect">
+            <a:avLst/>
+          </a:prstGeom>
+        </p:spPr>
+      </p:pic>
+      <p:pic>
+        <p:nvPicPr>
+          <p:cNvPr id="17" name="图片 16" descr="黑暗中亮着灯&#10;&#10;低可信度描述已自动生成">
+            <a:extLst>
+              <a:ext uri="{FF2B5EF4-FFF2-40B4-BE49-F238E27FC236}">
+                <a16:creationId xmlns:a16="http://schemas.microsoft.com/office/drawing/2014/main" id="{C9206398-C7CA-4063-8AF7-467401B14B6C}"/>
+              </a:ext>
+            </a:extLst>
+          </p:cNvPr>
+          <p:cNvPicPr>
+            <a:picLocks noChangeAspect="1"/>
+          </p:cNvPicPr>
+          <p:nvPr/>
+        </p:nvPicPr>
+        <p:blipFill>
+          <a:blip r:embed="rId6">
+            <a:extLst>
+              <a:ext uri="{28A0092B-C50C-407E-A947-70E740481C1C}">
+                <a14:useLocalDpi xmlns:a14="http://schemas.microsoft.com/office/drawing/2010/main" val="0"/>
+              </a:ext>
+            </a:extLst>
+          </a:blip>
+          <a:stretch>
+            <a:fillRect/>
+          </a:stretch>
+        </p:blipFill>
+        <p:spPr>
+          <a:xfrm>
+            <a:off x="8471990" y="3882903"/>
+            <a:ext cx="3240000" cy="3240000"/>
+          </a:xfrm>
+          <a:prstGeom prst="rect">
+            <a:avLst/>
+          </a:prstGeom>
+        </p:spPr>
+      </p:pic>
+      <p:sp>
+        <p:nvSpPr>
+          <p:cNvPr id="18" name="文本框 17">
+            <a:extLst>
+              <a:ext uri="{FF2B5EF4-FFF2-40B4-BE49-F238E27FC236}">
+                <a16:creationId xmlns:a16="http://schemas.microsoft.com/office/drawing/2014/main" id="{ECD58FBA-3E13-4416-8A8D-3A5BB1FCF885}"/>
+              </a:ext>
+            </a:extLst>
+          </p:cNvPr>
+          <p:cNvSpPr txBox="1"/>
+          <p:nvPr/>
+        </p:nvSpPr>
+        <p:spPr>
+          <a:xfrm>
+            <a:off x="268945" y="5846544"/>
+            <a:ext cx="4257243" cy="646331"/>
+          </a:xfrm>
+          <a:prstGeom prst="rect">
+            <a:avLst/>
+          </a:prstGeom>
+          <a:noFill/>
+        </p:spPr>
+        <p:txBody>
+          <a:bodyPr wrap="square" rtlCol="0">
+            <a:spAutoFit/>
+          </a:bodyPr>
+          <a:lstStyle/>
+          <a:p>
+            <a:r>
+              <a:rPr lang="en-US" altLang="zh-CN" dirty="0"/>
+              <a:t>Open slit, beam cut off in x due to telescope mirror 2 (1m)</a:t>
+            </a:r>
+            <a:endParaRPr lang="zh-CN" altLang="en-US" dirty="0"/>
+          </a:p>
+        </p:txBody>
+      </p:sp>
+    </p:spTree>
+    <p:extLst>
+      <p:ext uri="{BB962C8B-B14F-4D97-AF65-F5344CB8AC3E}">
+        <p14:creationId xmlns:p14="http://schemas.microsoft.com/office/powerpoint/2010/main" val="1960242697"/>
+      </p:ext>
+    </p:extLst>
+  </p:cSld>
+  <p:clrMapOvr>
+    <a:masterClrMapping/>
+  </p:clrMapOvr>
+</p:sld>
+</file>
+
+<file path=ppt/slides/slide4.xml><?xml version="1.0" encoding="utf-8"?>
+<p:sld xmlns:a="http://schemas.openxmlformats.org/drawingml/2006/main" xmlns:r="http://schemas.openxmlformats.org/officeDocument/2006/relationships" xmlns:p="http://schemas.openxmlformats.org/presentationml/2006/main">
+  <p:cSld>
+    <p:spTree>
+      <p:nvGrpSpPr>
+        <p:cNvPr id="1" name=""/>
+        <p:cNvGrpSpPr/>
+        <p:nvPr/>
+      </p:nvGrpSpPr>
+      <p:grpSpPr>
+        <a:xfrm>
+          <a:off x="0" y="0"/>
+          <a:ext cx="0" cy="0"/>
+          <a:chOff x="0" y="0"/>
+          <a:chExt cx="0" cy="0"/>
+        </a:xfrm>
+      </p:grpSpPr>
+      <p:sp>
+        <p:nvSpPr>
+          <p:cNvPr id="2" name="标题 1">
+            <a:extLst>
+              <a:ext uri="{FF2B5EF4-FFF2-40B4-BE49-F238E27FC236}">
+                <a16:creationId xmlns:a16="http://schemas.microsoft.com/office/drawing/2014/main" id="{E992A8B7-1629-42FE-AA40-407523A09B1A}"/>
+              </a:ext>
+            </a:extLst>
+          </p:cNvPr>
+          <p:cNvSpPr>
+            <a:spLocks noGrp="1"/>
+          </p:cNvSpPr>
+          <p:nvPr>
+            <p:ph type="title"/>
+          </p:nvPr>
+        </p:nvSpPr>
+        <p:spPr/>
+        <p:txBody>
+          <a:bodyPr/>
+          <a:lstStyle/>
+          <a:p>
+            <a:r>
+              <a:rPr lang="en-US" altLang="zh-CN" dirty="0"/>
+              <a:t>Beam profile with perfect optics, output</a:t>
+            </a:r>
+            <a:endParaRPr lang="zh-CN" altLang="en-US" dirty="0"/>
+          </a:p>
+        </p:txBody>
+      </p:sp>
+      <p:pic>
+        <p:nvPicPr>
+          <p:cNvPr id="11" name="图片 10">
+            <a:extLst>
+              <a:ext uri="{FF2B5EF4-FFF2-40B4-BE49-F238E27FC236}">
+                <a16:creationId xmlns:a16="http://schemas.microsoft.com/office/drawing/2014/main" id="{E5628EC7-BA5C-4CB6-9488-0D3B767DE1A7}"/>
+              </a:ext>
+            </a:extLst>
+          </p:cNvPr>
+          <p:cNvPicPr>
+            <a:picLocks noChangeAspect="1"/>
+          </p:cNvPicPr>
+          <p:nvPr/>
+        </p:nvPicPr>
+        <p:blipFill>
+          <a:blip r:embed="rId2">
+            <a:extLst>
+              <a:ext uri="{28A0092B-C50C-407E-A947-70E740481C1C}">
+                <a14:useLocalDpi xmlns:a14="http://schemas.microsoft.com/office/drawing/2010/main" val="0"/>
+              </a:ext>
+            </a:extLst>
+          </a:blip>
+          <a:srcRect/>
+          <a:stretch/>
+        </p:blipFill>
+        <p:spPr>
+          <a:xfrm>
+            <a:off x="4826695" y="1166796"/>
+            <a:ext cx="3240000" cy="3240000"/>
+          </a:xfrm>
+          <a:prstGeom prst="rect">
+            <a:avLst/>
+          </a:prstGeom>
+        </p:spPr>
+      </p:pic>
+      <p:pic>
+        <p:nvPicPr>
+          <p:cNvPr id="13" name="图片 12">
+            <a:extLst>
+              <a:ext uri="{FF2B5EF4-FFF2-40B4-BE49-F238E27FC236}">
+                <a16:creationId xmlns:a16="http://schemas.microsoft.com/office/drawing/2014/main" id="{96DD5AB7-74FD-47AC-98EA-290C937072DC}"/>
+              </a:ext>
+            </a:extLst>
+          </p:cNvPr>
+          <p:cNvPicPr>
+            <a:picLocks noChangeAspect="1"/>
+          </p:cNvPicPr>
+          <p:nvPr/>
+        </p:nvPicPr>
+        <p:blipFill>
+          <a:blip r:embed="rId3">
+            <a:extLst>
+              <a:ext uri="{28A0092B-C50C-407E-A947-70E740481C1C}">
+                <a14:useLocalDpi xmlns:a14="http://schemas.microsoft.com/office/drawing/2010/main" val="0"/>
+              </a:ext>
+            </a:extLst>
+          </a:blip>
+          <a:srcRect/>
+          <a:stretch/>
+        </p:blipFill>
+        <p:spPr>
+          <a:xfrm>
+            <a:off x="4821677" y="3882903"/>
+            <a:ext cx="3240000" cy="3240000"/>
+          </a:xfrm>
+          <a:prstGeom prst="rect">
+            <a:avLst/>
+          </a:prstGeom>
+        </p:spPr>
+      </p:pic>
+      <p:pic>
+        <p:nvPicPr>
+          <p:cNvPr id="15" name="图片 14">
+            <a:extLst>
+              <a:ext uri="{FF2B5EF4-FFF2-40B4-BE49-F238E27FC236}">
+                <a16:creationId xmlns:a16="http://schemas.microsoft.com/office/drawing/2014/main" id="{37D5B7FD-4547-422A-B3A4-F8B9F0FF001D}"/>
+              </a:ext>
+            </a:extLst>
+          </p:cNvPr>
+          <p:cNvPicPr>
+            <a:picLocks noChangeAspect="1"/>
+          </p:cNvPicPr>
+          <p:nvPr/>
+        </p:nvPicPr>
+        <p:blipFill>
+          <a:blip r:embed="rId4">
+            <a:extLst>
+              <a:ext uri="{28A0092B-C50C-407E-A947-70E740481C1C}">
+                <a14:useLocalDpi xmlns:a14="http://schemas.microsoft.com/office/drawing/2010/main" val="0"/>
+              </a:ext>
+            </a:extLst>
+          </a:blip>
+          <a:srcRect/>
+          <a:stretch/>
+        </p:blipFill>
+        <p:spPr>
+          <a:xfrm>
+            <a:off x="8471990" y="1166796"/>
+            <a:ext cx="3240000" cy="3240000"/>
+          </a:xfrm>
+          <a:prstGeom prst="rect">
+            <a:avLst/>
+          </a:prstGeom>
+        </p:spPr>
+      </p:pic>
+      <p:pic>
+        <p:nvPicPr>
+          <p:cNvPr id="17" name="图片 16">
+            <a:extLst>
+              <a:ext uri="{FF2B5EF4-FFF2-40B4-BE49-F238E27FC236}">
+                <a16:creationId xmlns:a16="http://schemas.microsoft.com/office/drawing/2014/main" id="{C9206398-C7CA-4063-8AF7-467401B14B6C}"/>
+              </a:ext>
+            </a:extLst>
+          </p:cNvPr>
+          <p:cNvPicPr>
+            <a:picLocks noChangeAspect="1"/>
+          </p:cNvPicPr>
+          <p:nvPr/>
+        </p:nvPicPr>
+        <p:blipFill>
+          <a:blip r:embed="rId5">
+            <a:extLst>
+              <a:ext uri="{28A0092B-C50C-407E-A947-70E740481C1C}">
+                <a14:useLocalDpi xmlns:a14="http://schemas.microsoft.com/office/drawing/2010/main" val="0"/>
+              </a:ext>
+            </a:extLst>
+          </a:blip>
+          <a:srcRect/>
+          <a:stretch/>
+        </p:blipFill>
+        <p:spPr>
+          <a:xfrm>
+            <a:off x="8471990" y="3882903"/>
+            <a:ext cx="3240000" cy="3240000"/>
+          </a:xfrm>
+          <a:prstGeom prst="rect">
+            <a:avLst/>
+          </a:prstGeom>
+        </p:spPr>
+      </p:pic>
+      <p:grpSp>
+        <p:nvGrpSpPr>
+          <p:cNvPr id="8" name="组合 7">
+            <a:extLst>
+              <a:ext uri="{FF2B5EF4-FFF2-40B4-BE49-F238E27FC236}">
+                <a16:creationId xmlns:a16="http://schemas.microsoft.com/office/drawing/2014/main" id="{95537558-BC43-4BD8-8C06-BA58354EFAE9}"/>
+              </a:ext>
+            </a:extLst>
+          </p:cNvPr>
+          <p:cNvGrpSpPr/>
+          <p:nvPr/>
+        </p:nvGrpSpPr>
+        <p:grpSpPr>
+          <a:xfrm>
+            <a:off x="565268" y="2539907"/>
+            <a:ext cx="4320000" cy="4320000"/>
+            <a:chOff x="3189" y="1269000"/>
+            <a:chExt cx="4320000" cy="4320000"/>
+          </a:xfrm>
+        </p:grpSpPr>
+        <p:pic>
+          <p:nvPicPr>
+            <p:cNvPr id="7" name="图片 6">
+              <a:extLst>
+                <a:ext uri="{FF2B5EF4-FFF2-40B4-BE49-F238E27FC236}">
+                  <a16:creationId xmlns:a16="http://schemas.microsoft.com/office/drawing/2014/main" id="{0695FD20-324B-4EC0-A6C5-FBF4633B6AD7}"/>
+                </a:ext>
+              </a:extLst>
+            </p:cNvPr>
+            <p:cNvPicPr>
+              <a:picLocks noChangeAspect="1"/>
+            </p:cNvPicPr>
+            <p:nvPr/>
+          </p:nvPicPr>
+          <p:blipFill>
+            <a:blip r:embed="rId6">
+              <a:extLst>
+                <a:ext uri="{28A0092B-C50C-407E-A947-70E740481C1C}">
+                  <a14:useLocalDpi xmlns:a14="http://schemas.microsoft.com/office/drawing/2010/main" val="0"/>
+                </a:ext>
+              </a:extLst>
+            </a:blip>
+            <a:srcRect/>
+            <a:stretch/>
+          </p:blipFill>
+          <p:spPr>
+            <a:xfrm>
+              <a:off x="3189" y="1269000"/>
+              <a:ext cx="4320000" cy="4320000"/>
+            </a:xfrm>
+            <a:prstGeom prst="rect">
+              <a:avLst/>
+            </a:prstGeom>
+          </p:spPr>
+        </p:pic>
+        <p:sp>
+          <p:nvSpPr>
+            <p:cNvPr id="5" name="文本框 4">
+              <a:extLst>
+                <a:ext uri="{FF2B5EF4-FFF2-40B4-BE49-F238E27FC236}">
+                  <a16:creationId xmlns:a16="http://schemas.microsoft.com/office/drawing/2014/main" id="{4506AB22-FF2F-4683-ADFE-0CCEFB64CA74}"/>
+                </a:ext>
+              </a:extLst>
+            </p:cNvPr>
+            <p:cNvSpPr txBox="1"/>
+            <p:nvPr/>
+          </p:nvSpPr>
+          <p:spPr>
+            <a:xfrm>
+              <a:off x="480010" y="1576388"/>
+              <a:ext cx="819455" cy="369332"/>
+            </a:xfrm>
+            <a:prstGeom prst="rect">
+              <a:avLst/>
+            </a:prstGeom>
+            <a:noFill/>
+          </p:spPr>
+          <p:txBody>
+            <a:bodyPr wrap="none" rtlCol="0">
+              <a:spAutoFit/>
+            </a:bodyPr>
+            <a:lstStyle/>
+            <a:p>
+              <a:r>
+                <a:rPr lang="en-US" altLang="zh-CN" dirty="0">
+                  <a:solidFill>
+                    <a:srgbClr val="FF0000"/>
+                  </a:solidFill>
+                </a:rPr>
+                <a:t>closed</a:t>
+              </a:r>
+              <a:endParaRPr lang="zh-CN" altLang="en-US" dirty="0">
+                <a:solidFill>
+                  <a:srgbClr val="FF0000"/>
+                </a:solidFill>
+              </a:endParaRPr>
+            </a:p>
+          </p:txBody>
+        </p:sp>
+      </p:grpSp>
+      <p:grpSp>
+        <p:nvGrpSpPr>
+          <p:cNvPr id="6" name="组合 5">
+            <a:extLst>
+              <a:ext uri="{FF2B5EF4-FFF2-40B4-BE49-F238E27FC236}">
+                <a16:creationId xmlns:a16="http://schemas.microsoft.com/office/drawing/2014/main" id="{6C3864CE-9814-40DD-93E5-5795397EDE55}"/>
+              </a:ext>
+            </a:extLst>
+          </p:cNvPr>
+          <p:cNvGrpSpPr/>
+          <p:nvPr/>
+        </p:nvGrpSpPr>
+        <p:grpSpPr>
+          <a:xfrm>
             <a:off x="0" y="1214344"/>
             <a:ext cx="1771516" cy="1800000"/>
             <a:chOff x="2898769" y="5058000"/>
@@ -4821,7 +7089,7 @@
       </p:sp>
       <p:pic>
         <p:nvPicPr>
-          <p:cNvPr id="5" name="内容占位符 4" descr="图表, 散点图&#10;&#10;描述已自动生成">
+          <p:cNvPr id="5" name="内容占位符 4">
             <a:extLst>
               <a:ext uri="{FF2B5EF4-FFF2-40B4-BE49-F238E27FC236}">
                 <a16:creationId xmlns:a16="http://schemas.microsoft.com/office/drawing/2014/main" id="{1CF807EE-C2A0-4724-A68D-0433F7E67EB5}"/>
@@ -4843,20 +7111,19 @@
               </a:ext>
             </a:extLst>
           </a:blip>
-          <a:stretch>
-            <a:fillRect/>
-          </a:stretch>
+          <a:srcRect/>
+          <a:stretch/>
         </p:blipFill>
         <p:spPr>
           <a:xfrm>
-            <a:off x="1235999" y="1458000"/>
-            <a:ext cx="9720002" cy="1800000"/>
+            <a:off x="1236000" y="1458000"/>
+            <a:ext cx="9720000" cy="1800000"/>
           </a:xfrm>
         </p:spPr>
       </p:pic>
       <p:pic>
         <p:nvPicPr>
-          <p:cNvPr id="7" name="图片 6" descr="图表&#10;&#10;中度可信度描述已自动生成">
+          <p:cNvPr id="7" name="图片 6">
             <a:extLst>
               <a:ext uri="{FF2B5EF4-FFF2-40B4-BE49-F238E27FC236}">
                 <a16:creationId xmlns:a16="http://schemas.microsoft.com/office/drawing/2014/main" id="{C041E97F-8B69-40E7-BE34-FF89C9184E8A}"/>
@@ -4876,14 +7143,13 @@
               </a:ext>
             </a:extLst>
           </a:blip>
-          <a:stretch>
-            <a:fillRect/>
-          </a:stretch>
+          <a:srcRect/>
+          <a:stretch/>
         </p:blipFill>
         <p:spPr>
           <a:xfrm>
             <a:off x="1235999" y="3258000"/>
-            <a:ext cx="9719999" cy="1800000"/>
+            <a:ext cx="9719999" cy="1799999"/>
           </a:xfrm>
           <a:prstGeom prst="rect">
             <a:avLst/>
@@ -4892,7 +7158,7 @@
       </p:pic>
       <p:pic>
         <p:nvPicPr>
-          <p:cNvPr id="9" name="图片 8" descr="图表, 散点图&#10;&#10;描述已自动生成">
+          <p:cNvPr id="9" name="图片 8">
             <a:extLst>
               <a:ext uri="{FF2B5EF4-FFF2-40B4-BE49-F238E27FC236}">
                 <a16:creationId xmlns:a16="http://schemas.microsoft.com/office/drawing/2014/main" id="{440FF8D1-69A3-4DD5-8E2F-89F7A8DEFD94}"/>
@@ -4912,14 +7178,13 @@
               </a:ext>
             </a:extLst>
           </a:blip>
-          <a:stretch>
-            <a:fillRect/>
-          </a:stretch>
+          <a:srcRect/>
+          <a:stretch/>
         </p:blipFill>
         <p:spPr>
           <a:xfrm>
             <a:off x="1235999" y="5058000"/>
-            <a:ext cx="9719999" cy="1800000"/>
+            <a:ext cx="9719999" cy="1799999"/>
           </a:xfrm>
           <a:prstGeom prst="rect">
             <a:avLst/>
@@ -4941,9 +7206,9 @@
         <p:grpSpPr>
           <a:xfrm>
             <a:off x="-8060" y="1542210"/>
-            <a:ext cx="1364797" cy="5122327"/>
+            <a:ext cx="809837" cy="2416548"/>
             <a:chOff x="-8060" y="1542210"/>
-            <a:chExt cx="1364797" cy="5122327"/>
+            <a:chExt cx="809837" cy="2416548"/>
           </a:xfrm>
         </p:grpSpPr>
         <p:cxnSp>
@@ -5031,138 +7296,6 @@
             </a:p>
           </p:txBody>
         </p:sp>
-        <p:sp>
-          <p:nvSpPr>
-            <p:cNvPr id="13" name="文本框 12">
-              <a:extLst>
-                <a:ext uri="{FF2B5EF4-FFF2-40B4-BE49-F238E27FC236}">
-                  <a16:creationId xmlns:a16="http://schemas.microsoft.com/office/drawing/2014/main" id="{71A0394D-82C1-4F0C-8037-B43C798F0522}"/>
-                </a:ext>
-              </a:extLst>
-            </p:cNvPr>
-            <p:cNvSpPr txBox="1"/>
-            <p:nvPr/>
-          </p:nvSpPr>
-          <p:spPr>
-            <a:xfrm>
-              <a:off x="801777" y="2616755"/>
-              <a:ext cx="407484" cy="369332"/>
-            </a:xfrm>
-            <a:prstGeom prst="rect">
-              <a:avLst/>
-            </a:prstGeom>
-            <a:noFill/>
-          </p:spPr>
-          <p:txBody>
-            <a:bodyPr wrap="none" rtlCol="0">
-              <a:spAutoFit/>
-            </a:bodyPr>
-            <a:lstStyle/>
-            <a:p>
-              <a:r>
-                <a:rPr lang="en-US" altLang="zh-CN" dirty="0">
-                  <a:solidFill>
-                    <a:schemeClr val="accent2"/>
-                  </a:solidFill>
-                </a:rPr>
-                <a:t>1x</a:t>
-              </a:r>
-              <a:endParaRPr lang="zh-CN" altLang="en-US" dirty="0">
-                <a:solidFill>
-                  <a:schemeClr val="accent2"/>
-                </a:solidFill>
-              </a:endParaRPr>
-            </a:p>
-          </p:txBody>
-        </p:sp>
-        <p:sp>
-          <p:nvSpPr>
-            <p:cNvPr id="14" name="文本框 13">
-              <a:extLst>
-                <a:ext uri="{FF2B5EF4-FFF2-40B4-BE49-F238E27FC236}">
-                  <a16:creationId xmlns:a16="http://schemas.microsoft.com/office/drawing/2014/main" id="{1164D047-1062-4C10-B613-4F974008BFD5}"/>
-                </a:ext>
-              </a:extLst>
-            </p:cNvPr>
-            <p:cNvSpPr txBox="1"/>
-            <p:nvPr/>
-          </p:nvSpPr>
-          <p:spPr>
-            <a:xfrm>
-              <a:off x="715215" y="4455980"/>
-              <a:ext cx="580608" cy="369332"/>
-            </a:xfrm>
-            <a:prstGeom prst="rect">
-              <a:avLst/>
-            </a:prstGeom>
-            <a:noFill/>
-          </p:spPr>
-          <p:txBody>
-            <a:bodyPr wrap="none" rtlCol="0">
-              <a:spAutoFit/>
-            </a:bodyPr>
-            <a:lstStyle/>
-            <a:p>
-              <a:r>
-                <a:rPr lang="en-US" altLang="zh-CN" dirty="0">
-                  <a:solidFill>
-                    <a:schemeClr val="accent2"/>
-                  </a:solidFill>
-                </a:rPr>
-                <a:t>0.5x</a:t>
-              </a:r>
-              <a:endParaRPr lang="zh-CN" altLang="en-US" dirty="0">
-                <a:solidFill>
-                  <a:schemeClr val="accent2"/>
-                </a:solidFill>
-              </a:endParaRPr>
-            </a:p>
-          </p:txBody>
-        </p:sp>
-        <p:sp>
-          <p:nvSpPr>
-            <p:cNvPr id="15" name="文本框 14">
-              <a:extLst>
-                <a:ext uri="{FF2B5EF4-FFF2-40B4-BE49-F238E27FC236}">
-                  <a16:creationId xmlns:a16="http://schemas.microsoft.com/office/drawing/2014/main" id="{3D7C14E0-CD04-4EE5-881A-41CEE1F8E0D7}"/>
-                </a:ext>
-              </a:extLst>
-            </p:cNvPr>
-            <p:cNvSpPr txBox="1"/>
-            <p:nvPr/>
-          </p:nvSpPr>
-          <p:spPr>
-            <a:xfrm>
-              <a:off x="654301" y="6295205"/>
-              <a:ext cx="702436" cy="369332"/>
-            </a:xfrm>
-            <a:prstGeom prst="rect">
-              <a:avLst/>
-            </a:prstGeom>
-            <a:noFill/>
-          </p:spPr>
-          <p:txBody>
-            <a:bodyPr wrap="none" rtlCol="0">
-              <a:spAutoFit/>
-            </a:bodyPr>
-            <a:lstStyle/>
-            <a:p>
-              <a:r>
-                <a:rPr lang="en-US" altLang="zh-CN" dirty="0">
-                  <a:solidFill>
-                    <a:schemeClr val="accent2"/>
-                  </a:solidFill>
-                </a:rPr>
-                <a:t>0.25x</a:t>
-              </a:r>
-              <a:endParaRPr lang="zh-CN" altLang="en-US" dirty="0">
-                <a:solidFill>
-                  <a:schemeClr val="accent2"/>
-                </a:solidFill>
-              </a:endParaRPr>
-            </a:p>
-          </p:txBody>
-        </p:sp>
       </p:grpSp>
     </p:spTree>
     <p:extLst>
@@ -5284,8 +7417,8 @@
         </p:blipFill>
         <p:spPr>
           <a:xfrm>
-            <a:off x="1235999" y="3258000"/>
-            <a:ext cx="9719999" cy="1799999"/>
+            <a:off x="1236001" y="3258000"/>
+            <a:ext cx="9719995" cy="1799999"/>
           </a:xfrm>
           <a:prstGeom prst="rect">
             <a:avLst/>
@@ -5342,9 +7475,9 @@
         <p:grpSpPr>
           <a:xfrm>
             <a:off x="-8060" y="1542210"/>
-            <a:ext cx="1347164" cy="5122327"/>
+            <a:ext cx="809837" cy="2416548"/>
             <a:chOff x="-8060" y="1542210"/>
-            <a:chExt cx="1347164" cy="5122327"/>
+            <a:chExt cx="809837" cy="2416548"/>
           </a:xfrm>
         </p:grpSpPr>
         <p:cxnSp>
@@ -5432,138 +7565,6 @@
             </a:p>
           </p:txBody>
         </p:sp>
-        <p:sp>
-          <p:nvSpPr>
-            <p:cNvPr id="11" name="文本框 10">
-              <a:extLst>
-                <a:ext uri="{FF2B5EF4-FFF2-40B4-BE49-F238E27FC236}">
-                  <a16:creationId xmlns:a16="http://schemas.microsoft.com/office/drawing/2014/main" id="{AABAB3C0-51B0-49B6-9905-96DF024EDD68}"/>
-                </a:ext>
-              </a:extLst>
-            </p:cNvPr>
-            <p:cNvSpPr txBox="1"/>
-            <p:nvPr/>
-          </p:nvSpPr>
-          <p:spPr>
-            <a:xfrm>
-              <a:off x="801777" y="2616755"/>
-              <a:ext cx="407484" cy="369332"/>
-            </a:xfrm>
-            <a:prstGeom prst="rect">
-              <a:avLst/>
-            </a:prstGeom>
-            <a:noFill/>
-          </p:spPr>
-          <p:txBody>
-            <a:bodyPr wrap="none" rtlCol="0">
-              <a:spAutoFit/>
-            </a:bodyPr>
-            <a:lstStyle/>
-            <a:p>
-              <a:r>
-                <a:rPr lang="en-US" altLang="zh-CN" dirty="0">
-                  <a:solidFill>
-                    <a:schemeClr val="accent2"/>
-                  </a:solidFill>
-                </a:rPr>
-                <a:t>1x</a:t>
-              </a:r>
-              <a:endParaRPr lang="zh-CN" altLang="en-US" dirty="0">
-                <a:solidFill>
-                  <a:schemeClr val="accent2"/>
-                </a:solidFill>
-              </a:endParaRPr>
-            </a:p>
-          </p:txBody>
-        </p:sp>
-        <p:sp>
-          <p:nvSpPr>
-            <p:cNvPr id="12" name="文本框 11">
-              <a:extLst>
-                <a:ext uri="{FF2B5EF4-FFF2-40B4-BE49-F238E27FC236}">
-                  <a16:creationId xmlns:a16="http://schemas.microsoft.com/office/drawing/2014/main" id="{9E7439B1-D0A1-4852-86A2-93B9E383488B}"/>
-                </a:ext>
-              </a:extLst>
-            </p:cNvPr>
-            <p:cNvSpPr txBox="1"/>
-            <p:nvPr/>
-          </p:nvSpPr>
-          <p:spPr>
-            <a:xfrm>
-              <a:off x="715215" y="4455980"/>
-              <a:ext cx="580608" cy="369332"/>
-            </a:xfrm>
-            <a:prstGeom prst="rect">
-              <a:avLst/>
-            </a:prstGeom>
-            <a:noFill/>
-          </p:spPr>
-          <p:txBody>
-            <a:bodyPr wrap="none" rtlCol="0">
-              <a:spAutoFit/>
-            </a:bodyPr>
-            <a:lstStyle/>
-            <a:p>
-              <a:r>
-                <a:rPr lang="en-US" altLang="zh-CN" dirty="0">
-                  <a:solidFill>
-                    <a:schemeClr val="accent2"/>
-                  </a:solidFill>
-                </a:rPr>
-                <a:t>0.5x</a:t>
-              </a:r>
-              <a:endParaRPr lang="zh-CN" altLang="en-US" dirty="0">
-                <a:solidFill>
-                  <a:schemeClr val="accent2"/>
-                </a:solidFill>
-              </a:endParaRPr>
-            </a:p>
-          </p:txBody>
-        </p:sp>
-        <p:sp>
-          <p:nvSpPr>
-            <p:cNvPr id="13" name="文本框 12">
-              <a:extLst>
-                <a:ext uri="{FF2B5EF4-FFF2-40B4-BE49-F238E27FC236}">
-                  <a16:creationId xmlns:a16="http://schemas.microsoft.com/office/drawing/2014/main" id="{D20ECAC2-F85A-4D63-A660-0ABC688B271F}"/>
-                </a:ext>
-              </a:extLst>
-            </p:cNvPr>
-            <p:cNvSpPr txBox="1"/>
-            <p:nvPr/>
-          </p:nvSpPr>
-          <p:spPr>
-            <a:xfrm>
-              <a:off x="654301" y="6295205"/>
-              <a:ext cx="684803" cy="369332"/>
-            </a:xfrm>
-            <a:prstGeom prst="rect">
-              <a:avLst/>
-            </a:prstGeom>
-            <a:noFill/>
-          </p:spPr>
-          <p:txBody>
-            <a:bodyPr wrap="none" rtlCol="0">
-              <a:spAutoFit/>
-            </a:bodyPr>
-            <a:lstStyle/>
-            <a:p>
-              <a:r>
-                <a:rPr lang="en-US" altLang="zh-CN" dirty="0">
-                  <a:solidFill>
-                    <a:schemeClr val="accent2"/>
-                  </a:solidFill>
-                </a:rPr>
-                <a:t>SASE</a:t>
-              </a:r>
-              <a:endParaRPr lang="zh-CN" altLang="en-US" dirty="0">
-                <a:solidFill>
-                  <a:schemeClr val="accent2"/>
-                </a:solidFill>
-              </a:endParaRPr>
-            </a:p>
-          </p:txBody>
-        </p:sp>
       </p:grpSp>
     </p:spTree>
     <p:extLst>
@@ -5686,7 +7687,7 @@
         <p:spPr>
           <a:xfrm>
             <a:off x="1236001" y="3258000"/>
-            <a:ext cx="9719995" cy="1799999"/>
+            <a:ext cx="9719995" cy="1799998"/>
           </a:xfrm>
           <a:prstGeom prst="rect">
             <a:avLst/>
@@ -5721,7 +7722,7 @@
         <p:spPr>
           <a:xfrm>
             <a:off x="1236001" y="5058000"/>
-            <a:ext cx="9719995" cy="1799999"/>
+            <a:ext cx="9719995" cy="1799998"/>
           </a:xfrm>
           <a:prstGeom prst="rect">
             <a:avLst/>
@@ -5743,9 +7744,9 @@
         <p:grpSpPr>
           <a:xfrm>
             <a:off x="-8060" y="1542210"/>
-            <a:ext cx="1217321" cy="5122327"/>
+            <a:ext cx="809837" cy="2416548"/>
             <a:chOff x="-8060" y="1542210"/>
-            <a:chExt cx="1217321" cy="5122327"/>
+            <a:chExt cx="809837" cy="2416548"/>
           </a:xfrm>
         </p:grpSpPr>
         <p:cxnSp>
@@ -5833,138 +7834,6 @@
             </a:p>
           </p:txBody>
         </p:sp>
-        <p:sp>
-          <p:nvSpPr>
-            <p:cNvPr id="11" name="文本框 10">
-              <a:extLst>
-                <a:ext uri="{FF2B5EF4-FFF2-40B4-BE49-F238E27FC236}">
-                  <a16:creationId xmlns:a16="http://schemas.microsoft.com/office/drawing/2014/main" id="{5CF1B0F3-55D2-4251-A827-F380378E0517}"/>
-                </a:ext>
-              </a:extLst>
-            </p:cNvPr>
-            <p:cNvSpPr txBox="1"/>
-            <p:nvPr/>
-          </p:nvSpPr>
-          <p:spPr>
-            <a:xfrm>
-              <a:off x="801777" y="2616755"/>
-              <a:ext cx="407484" cy="369332"/>
-            </a:xfrm>
-            <a:prstGeom prst="rect">
-              <a:avLst/>
-            </a:prstGeom>
-            <a:noFill/>
-          </p:spPr>
-          <p:txBody>
-            <a:bodyPr wrap="none" rtlCol="0">
-              <a:spAutoFit/>
-            </a:bodyPr>
-            <a:lstStyle/>
-            <a:p>
-              <a:r>
-                <a:rPr lang="en-US" altLang="zh-CN" dirty="0">
-                  <a:solidFill>
-                    <a:schemeClr val="accent2"/>
-                  </a:solidFill>
-                </a:rPr>
-                <a:t>1x</a:t>
-              </a:r>
-              <a:endParaRPr lang="zh-CN" altLang="en-US" dirty="0">
-                <a:solidFill>
-                  <a:schemeClr val="accent2"/>
-                </a:solidFill>
-              </a:endParaRPr>
-            </a:p>
-          </p:txBody>
-        </p:sp>
-        <p:sp>
-          <p:nvSpPr>
-            <p:cNvPr id="12" name="文本框 11">
-              <a:extLst>
-                <a:ext uri="{FF2B5EF4-FFF2-40B4-BE49-F238E27FC236}">
-                  <a16:creationId xmlns:a16="http://schemas.microsoft.com/office/drawing/2014/main" id="{1EC7A53D-6377-483E-A9F8-E8B30D306D1C}"/>
-                </a:ext>
-              </a:extLst>
-            </p:cNvPr>
-            <p:cNvSpPr txBox="1"/>
-            <p:nvPr/>
-          </p:nvSpPr>
-          <p:spPr>
-            <a:xfrm>
-              <a:off x="801777" y="4455980"/>
-              <a:ext cx="407484" cy="369332"/>
-            </a:xfrm>
-            <a:prstGeom prst="rect">
-              <a:avLst/>
-            </a:prstGeom>
-            <a:noFill/>
-          </p:spPr>
-          <p:txBody>
-            <a:bodyPr wrap="none" rtlCol="0">
-              <a:spAutoFit/>
-            </a:bodyPr>
-            <a:lstStyle/>
-            <a:p>
-              <a:r>
-                <a:rPr lang="en-US" altLang="zh-CN" dirty="0">
-                  <a:solidFill>
-                    <a:schemeClr val="accent2"/>
-                  </a:solidFill>
-                </a:rPr>
-                <a:t>3x</a:t>
-              </a:r>
-              <a:endParaRPr lang="zh-CN" altLang="en-US" dirty="0">
-                <a:solidFill>
-                  <a:schemeClr val="accent2"/>
-                </a:solidFill>
-              </a:endParaRPr>
-            </a:p>
-          </p:txBody>
-        </p:sp>
-        <p:sp>
-          <p:nvSpPr>
-            <p:cNvPr id="13" name="文本框 12">
-              <a:extLst>
-                <a:ext uri="{FF2B5EF4-FFF2-40B4-BE49-F238E27FC236}">
-                  <a16:creationId xmlns:a16="http://schemas.microsoft.com/office/drawing/2014/main" id="{AA58A1AA-31FC-454D-92DB-64980CE465EA}"/>
-                </a:ext>
-              </a:extLst>
-            </p:cNvPr>
-            <p:cNvSpPr txBox="1"/>
-            <p:nvPr/>
-          </p:nvSpPr>
-          <p:spPr>
-            <a:xfrm>
-              <a:off x="801777" y="6295205"/>
-              <a:ext cx="407484" cy="369332"/>
-            </a:xfrm>
-            <a:prstGeom prst="rect">
-              <a:avLst/>
-            </a:prstGeom>
-            <a:noFill/>
-          </p:spPr>
-          <p:txBody>
-            <a:bodyPr wrap="none" rtlCol="0">
-              <a:spAutoFit/>
-            </a:bodyPr>
-            <a:lstStyle/>
-            <a:p>
-              <a:r>
-                <a:rPr lang="en-US" altLang="zh-CN" dirty="0">
-                  <a:solidFill>
-                    <a:schemeClr val="accent2"/>
-                  </a:solidFill>
-                </a:rPr>
-                <a:t>5x</a:t>
-              </a:r>
-              <a:endParaRPr lang="zh-CN" altLang="en-US" dirty="0">
-                <a:solidFill>
-                  <a:schemeClr val="accent2"/>
-                </a:solidFill>
-              </a:endParaRPr>
-            </a:p>
-          </p:txBody>
-        </p:sp>
       </p:grpSp>
     </p:spTree>
     <p:extLst>
@@ -6086,8 +7955,8 @@
         </p:blipFill>
         <p:spPr>
           <a:xfrm>
-            <a:off x="1236001" y="3258000"/>
-            <a:ext cx="9719995" cy="1799998"/>
+            <a:off x="1236004" y="3258000"/>
+            <a:ext cx="9719989" cy="1799998"/>
           </a:xfrm>
           <a:prstGeom prst="rect">
             <a:avLst/>
@@ -6121,252 +7990,14 @@
         </p:blipFill>
         <p:spPr>
           <a:xfrm>
-            <a:off x="1236001" y="5058000"/>
-            <a:ext cx="9719995" cy="1799998"/>
+            <a:off x="1236004" y="5058000"/>
+            <a:ext cx="9719989" cy="1799998"/>
           </a:xfrm>
           <a:prstGeom prst="rect">
             <a:avLst/>
           </a:prstGeom>
         </p:spPr>
       </p:pic>
-      <p:grpSp>
-        <p:nvGrpSpPr>
-          <p:cNvPr id="6" name="组合 5">
-            <a:extLst>
-              <a:ext uri="{FF2B5EF4-FFF2-40B4-BE49-F238E27FC236}">
-                <a16:creationId xmlns:a16="http://schemas.microsoft.com/office/drawing/2014/main" id="{F99FC1C1-5BEA-44C7-ABE0-1955E0182768}"/>
-              </a:ext>
-            </a:extLst>
-          </p:cNvPr>
-          <p:cNvGrpSpPr/>
-          <p:nvPr/>
-        </p:nvGrpSpPr>
-        <p:grpSpPr>
-          <a:xfrm>
-            <a:off x="-8060" y="1542210"/>
-            <a:ext cx="1217321" cy="5122327"/>
-            <a:chOff x="-8060" y="1542210"/>
-            <a:chExt cx="1217321" cy="5122327"/>
-          </a:xfrm>
-        </p:grpSpPr>
-        <p:cxnSp>
-          <p:nvCxnSpPr>
-            <p:cNvPr id="8" name="直接箭头连接符 7">
-              <a:extLst>
-                <a:ext uri="{FF2B5EF4-FFF2-40B4-BE49-F238E27FC236}">
-                  <a16:creationId xmlns:a16="http://schemas.microsoft.com/office/drawing/2014/main" id="{D4E11F3E-8CA7-43B3-B95F-3FF8100F16B9}"/>
-                </a:ext>
-              </a:extLst>
-            </p:cNvPr>
-            <p:cNvCxnSpPr>
-              <a:cxnSpLocks/>
-            </p:cNvCxnSpPr>
-            <p:nvPr/>
-          </p:nvCxnSpPr>
-          <p:spPr>
-            <a:xfrm>
-              <a:off x="396858" y="2013417"/>
-              <a:ext cx="0" cy="1945341"/>
-            </a:xfrm>
-            <a:prstGeom prst="straightConnector1">
-              <a:avLst/>
-            </a:prstGeom>
-            <a:ln w="76200">
-              <a:tailEnd type="triangle"/>
-            </a:ln>
-          </p:spPr>
-          <p:style>
-            <a:lnRef idx="2">
-              <a:schemeClr val="accent2"/>
-            </a:lnRef>
-            <a:fillRef idx="0">
-              <a:schemeClr val="accent2"/>
-            </a:fillRef>
-            <a:effectRef idx="1">
-              <a:schemeClr val="accent2"/>
-            </a:effectRef>
-            <a:fontRef idx="minor">
-              <a:schemeClr val="tx1"/>
-            </a:fontRef>
-          </p:style>
-        </p:cxnSp>
-        <p:sp>
-          <p:nvSpPr>
-            <p:cNvPr id="10" name="文本框 9">
-              <a:extLst>
-                <a:ext uri="{FF2B5EF4-FFF2-40B4-BE49-F238E27FC236}">
-                  <a16:creationId xmlns:a16="http://schemas.microsoft.com/office/drawing/2014/main" id="{F39C8B7A-E793-4962-85F0-FF1E1AD48EDF}"/>
-                </a:ext>
-              </a:extLst>
-            </p:cNvPr>
-            <p:cNvSpPr txBox="1"/>
-            <p:nvPr/>
-          </p:nvSpPr>
-          <p:spPr>
-            <a:xfrm>
-              <a:off x="-8060" y="1542210"/>
-              <a:ext cx="809837" cy="369332"/>
-            </a:xfrm>
-            <a:prstGeom prst="rect">
-              <a:avLst/>
-            </a:prstGeom>
-            <a:noFill/>
-          </p:spPr>
-          <p:txBody>
-            <a:bodyPr wrap="none" rtlCol="0">
-              <a:spAutoFit/>
-            </a:bodyPr>
-            <a:lstStyle/>
-            <a:p>
-              <a:r>
-                <a:rPr lang="en-US" altLang="zh-CN" dirty="0">
-                  <a:solidFill>
-                    <a:schemeClr val="accent2"/>
-                  </a:solidFill>
-                </a:rPr>
-                <a:t>power</a:t>
-              </a:r>
-              <a:endParaRPr lang="zh-CN" altLang="en-US" dirty="0">
-                <a:solidFill>
-                  <a:schemeClr val="accent2"/>
-                </a:solidFill>
-              </a:endParaRPr>
-            </a:p>
-          </p:txBody>
-        </p:sp>
-        <p:sp>
-          <p:nvSpPr>
-            <p:cNvPr id="11" name="文本框 10">
-              <a:extLst>
-                <a:ext uri="{FF2B5EF4-FFF2-40B4-BE49-F238E27FC236}">
-                  <a16:creationId xmlns:a16="http://schemas.microsoft.com/office/drawing/2014/main" id="{DCE35316-8BEB-4FE7-BE82-E6DF890887D6}"/>
-                </a:ext>
-              </a:extLst>
-            </p:cNvPr>
-            <p:cNvSpPr txBox="1"/>
-            <p:nvPr/>
-          </p:nvSpPr>
-          <p:spPr>
-            <a:xfrm>
-              <a:off x="801777" y="2616755"/>
-              <a:ext cx="407484" cy="369332"/>
-            </a:xfrm>
-            <a:prstGeom prst="rect">
-              <a:avLst/>
-            </a:prstGeom>
-            <a:noFill/>
-          </p:spPr>
-          <p:txBody>
-            <a:bodyPr wrap="none" rtlCol="0">
-              <a:spAutoFit/>
-            </a:bodyPr>
-            <a:lstStyle/>
-            <a:p>
-              <a:r>
-                <a:rPr lang="en-US" altLang="zh-CN" dirty="0">
-                  <a:solidFill>
-                    <a:schemeClr val="accent2"/>
-                  </a:solidFill>
-                </a:rPr>
-                <a:t>1x</a:t>
-              </a:r>
-              <a:endParaRPr lang="zh-CN" altLang="en-US" dirty="0">
-                <a:solidFill>
-                  <a:schemeClr val="accent2"/>
-                </a:solidFill>
-              </a:endParaRPr>
-            </a:p>
-          </p:txBody>
-        </p:sp>
-        <p:sp>
-          <p:nvSpPr>
-            <p:cNvPr id="12" name="文本框 11">
-              <a:extLst>
-                <a:ext uri="{FF2B5EF4-FFF2-40B4-BE49-F238E27FC236}">
-                  <a16:creationId xmlns:a16="http://schemas.microsoft.com/office/drawing/2014/main" id="{6CCACF1C-924A-4903-9FD0-316B6BC92B83}"/>
-                </a:ext>
-              </a:extLst>
-            </p:cNvPr>
-            <p:cNvSpPr txBox="1"/>
-            <p:nvPr/>
-          </p:nvSpPr>
-          <p:spPr>
-            <a:xfrm>
-              <a:off x="801777" y="4455980"/>
-              <a:ext cx="407484" cy="369332"/>
-            </a:xfrm>
-            <a:prstGeom prst="rect">
-              <a:avLst/>
-            </a:prstGeom>
-            <a:noFill/>
-          </p:spPr>
-          <p:txBody>
-            <a:bodyPr wrap="none" rtlCol="0">
-              <a:spAutoFit/>
-            </a:bodyPr>
-            <a:lstStyle/>
-            <a:p>
-              <a:r>
-                <a:rPr lang="en-US" altLang="zh-CN" dirty="0">
-                  <a:solidFill>
-                    <a:schemeClr val="accent2"/>
-                  </a:solidFill>
-                </a:rPr>
-                <a:t>3x</a:t>
-              </a:r>
-              <a:endParaRPr lang="zh-CN" altLang="en-US" dirty="0">
-                <a:solidFill>
-                  <a:schemeClr val="accent2"/>
-                </a:solidFill>
-              </a:endParaRPr>
-            </a:p>
-          </p:txBody>
-        </p:sp>
-        <p:sp>
-          <p:nvSpPr>
-            <p:cNvPr id="13" name="文本框 12">
-              <a:extLst>
-                <a:ext uri="{FF2B5EF4-FFF2-40B4-BE49-F238E27FC236}">
-                  <a16:creationId xmlns:a16="http://schemas.microsoft.com/office/drawing/2014/main" id="{395C4C68-2AF0-4F36-8EEB-EC44F2EB9AE3}"/>
-                </a:ext>
-              </a:extLst>
-            </p:cNvPr>
-            <p:cNvSpPr txBox="1"/>
-            <p:nvPr/>
-          </p:nvSpPr>
-          <p:spPr>
-            <a:xfrm>
-              <a:off x="801777" y="6295205"/>
-              <a:ext cx="407484" cy="369332"/>
-            </a:xfrm>
-            <a:prstGeom prst="rect">
-              <a:avLst/>
-            </a:prstGeom>
-            <a:noFill/>
-          </p:spPr>
-          <p:txBody>
-            <a:bodyPr wrap="none" rtlCol="0">
-              <a:spAutoFit/>
-            </a:bodyPr>
-            <a:lstStyle/>
-            <a:p>
-              <a:r>
-                <a:rPr lang="en-US" altLang="zh-CN" dirty="0">
-                  <a:solidFill>
-                    <a:schemeClr val="accent2"/>
-                  </a:solidFill>
-                </a:rPr>
-                <a:t>5x</a:t>
-              </a:r>
-              <a:endParaRPr lang="zh-CN" altLang="en-US" dirty="0">
-                <a:solidFill>
-                  <a:schemeClr val="accent2"/>
-                </a:solidFill>
-              </a:endParaRPr>
-            </a:p>
-          </p:txBody>
-        </p:sp>
-      </p:grpSp>
     </p:spTree>
     <p:extLst>
       <p:ext uri="{BB962C8B-B14F-4D97-AF65-F5344CB8AC3E}">
@@ -6488,7 +8119,7 @@
         <p:spPr>
           <a:xfrm>
             <a:off x="1236004" y="3258000"/>
-            <a:ext cx="9719989" cy="1799998"/>
+            <a:ext cx="9719989" cy="1799997"/>
           </a:xfrm>
           <a:prstGeom prst="rect">
             <a:avLst/>
@@ -6523,251 +8154,13 @@
         <p:spPr>
           <a:xfrm>
             <a:off x="1236004" y="5058000"/>
-            <a:ext cx="9719989" cy="1799998"/>
+            <a:ext cx="9719989" cy="1799997"/>
           </a:xfrm>
           <a:prstGeom prst="rect">
             <a:avLst/>
           </a:prstGeom>
         </p:spPr>
       </p:pic>
-      <p:grpSp>
-        <p:nvGrpSpPr>
-          <p:cNvPr id="6" name="组合 5">
-            <a:extLst>
-              <a:ext uri="{FF2B5EF4-FFF2-40B4-BE49-F238E27FC236}">
-                <a16:creationId xmlns:a16="http://schemas.microsoft.com/office/drawing/2014/main" id="{50E982B1-350B-49AB-B0AC-64FCF4687D8E}"/>
-              </a:ext>
-            </a:extLst>
-          </p:cNvPr>
-          <p:cNvGrpSpPr/>
-          <p:nvPr/>
-        </p:nvGrpSpPr>
-        <p:grpSpPr>
-          <a:xfrm>
-            <a:off x="-8060" y="1542210"/>
-            <a:ext cx="1217321" cy="5122327"/>
-            <a:chOff x="-8060" y="1542210"/>
-            <a:chExt cx="1217321" cy="5122327"/>
-          </a:xfrm>
-        </p:grpSpPr>
-        <p:cxnSp>
-          <p:nvCxnSpPr>
-            <p:cNvPr id="8" name="直接箭头连接符 7">
-              <a:extLst>
-                <a:ext uri="{FF2B5EF4-FFF2-40B4-BE49-F238E27FC236}">
-                  <a16:creationId xmlns:a16="http://schemas.microsoft.com/office/drawing/2014/main" id="{CFDB204E-E45B-4AB4-AE50-F43F6C13EA12}"/>
-                </a:ext>
-              </a:extLst>
-            </p:cNvPr>
-            <p:cNvCxnSpPr>
-              <a:cxnSpLocks/>
-            </p:cNvCxnSpPr>
-            <p:nvPr/>
-          </p:nvCxnSpPr>
-          <p:spPr>
-            <a:xfrm>
-              <a:off x="396858" y="2013417"/>
-              <a:ext cx="0" cy="1945341"/>
-            </a:xfrm>
-            <a:prstGeom prst="straightConnector1">
-              <a:avLst/>
-            </a:prstGeom>
-            <a:ln w="76200">
-              <a:tailEnd type="triangle"/>
-            </a:ln>
-          </p:spPr>
-          <p:style>
-            <a:lnRef idx="2">
-              <a:schemeClr val="accent2"/>
-            </a:lnRef>
-            <a:fillRef idx="0">
-              <a:schemeClr val="accent2"/>
-            </a:fillRef>
-            <a:effectRef idx="1">
-              <a:schemeClr val="accent2"/>
-            </a:effectRef>
-            <a:fontRef idx="minor">
-              <a:schemeClr val="tx1"/>
-            </a:fontRef>
-          </p:style>
-        </p:cxnSp>
-        <p:sp>
-          <p:nvSpPr>
-            <p:cNvPr id="10" name="文本框 9">
-              <a:extLst>
-                <a:ext uri="{FF2B5EF4-FFF2-40B4-BE49-F238E27FC236}">
-                  <a16:creationId xmlns:a16="http://schemas.microsoft.com/office/drawing/2014/main" id="{05B47778-4D20-45B2-8D47-10AA0AEC8CA0}"/>
-                </a:ext>
-              </a:extLst>
-            </p:cNvPr>
-            <p:cNvSpPr txBox="1"/>
-            <p:nvPr/>
-          </p:nvSpPr>
-          <p:spPr>
-            <a:xfrm>
-              <a:off x="-8060" y="1542210"/>
-              <a:ext cx="809837" cy="369332"/>
-            </a:xfrm>
-            <a:prstGeom prst="rect">
-              <a:avLst/>
-            </a:prstGeom>
-            <a:noFill/>
-          </p:spPr>
-          <p:txBody>
-            <a:bodyPr wrap="none" rtlCol="0">
-              <a:spAutoFit/>
-            </a:bodyPr>
-            <a:lstStyle/>
-            <a:p>
-              <a:r>
-                <a:rPr lang="en-US" altLang="zh-CN" dirty="0">
-                  <a:solidFill>
-                    <a:schemeClr val="accent2"/>
-                  </a:solidFill>
-                </a:rPr>
-                <a:t>power</a:t>
-              </a:r>
-              <a:endParaRPr lang="zh-CN" altLang="en-US" dirty="0">
-                <a:solidFill>
-                  <a:schemeClr val="accent2"/>
-                </a:solidFill>
-              </a:endParaRPr>
-            </a:p>
-          </p:txBody>
-        </p:sp>
-        <p:sp>
-          <p:nvSpPr>
-            <p:cNvPr id="11" name="文本框 10">
-              <a:extLst>
-                <a:ext uri="{FF2B5EF4-FFF2-40B4-BE49-F238E27FC236}">
-                  <a16:creationId xmlns:a16="http://schemas.microsoft.com/office/drawing/2014/main" id="{D0606304-C244-4D06-BACA-A0B2090E65CC}"/>
-                </a:ext>
-              </a:extLst>
-            </p:cNvPr>
-            <p:cNvSpPr txBox="1"/>
-            <p:nvPr/>
-          </p:nvSpPr>
-          <p:spPr>
-            <a:xfrm>
-              <a:off x="801777" y="2616755"/>
-              <a:ext cx="407484" cy="369332"/>
-            </a:xfrm>
-            <a:prstGeom prst="rect">
-              <a:avLst/>
-            </a:prstGeom>
-            <a:noFill/>
-          </p:spPr>
-          <p:txBody>
-            <a:bodyPr wrap="none" rtlCol="0">
-              <a:spAutoFit/>
-            </a:bodyPr>
-            <a:lstStyle/>
-            <a:p>
-              <a:r>
-                <a:rPr lang="en-US" altLang="zh-CN" dirty="0">
-                  <a:solidFill>
-                    <a:schemeClr val="accent2"/>
-                  </a:solidFill>
-                </a:rPr>
-                <a:t>1x</a:t>
-              </a:r>
-              <a:endParaRPr lang="zh-CN" altLang="en-US" dirty="0">
-                <a:solidFill>
-                  <a:schemeClr val="accent2"/>
-                </a:solidFill>
-              </a:endParaRPr>
-            </a:p>
-          </p:txBody>
-        </p:sp>
-        <p:sp>
-          <p:nvSpPr>
-            <p:cNvPr id="12" name="文本框 11">
-              <a:extLst>
-                <a:ext uri="{FF2B5EF4-FFF2-40B4-BE49-F238E27FC236}">
-                  <a16:creationId xmlns:a16="http://schemas.microsoft.com/office/drawing/2014/main" id="{270DF998-9B63-4AED-B951-03A66AB5BF1E}"/>
-                </a:ext>
-              </a:extLst>
-            </p:cNvPr>
-            <p:cNvSpPr txBox="1"/>
-            <p:nvPr/>
-          </p:nvSpPr>
-          <p:spPr>
-            <a:xfrm>
-              <a:off x="801777" y="4455980"/>
-              <a:ext cx="407484" cy="369332"/>
-            </a:xfrm>
-            <a:prstGeom prst="rect">
-              <a:avLst/>
-            </a:prstGeom>
-            <a:noFill/>
-          </p:spPr>
-          <p:txBody>
-            <a:bodyPr wrap="none" rtlCol="0">
-              <a:spAutoFit/>
-            </a:bodyPr>
-            <a:lstStyle/>
-            <a:p>
-              <a:r>
-                <a:rPr lang="en-US" altLang="zh-CN" dirty="0">
-                  <a:solidFill>
-                    <a:schemeClr val="accent2"/>
-                  </a:solidFill>
-                </a:rPr>
-                <a:t>3x</a:t>
-              </a:r>
-              <a:endParaRPr lang="zh-CN" altLang="en-US" dirty="0">
-                <a:solidFill>
-                  <a:schemeClr val="accent2"/>
-                </a:solidFill>
-              </a:endParaRPr>
-            </a:p>
-          </p:txBody>
-        </p:sp>
-        <p:sp>
-          <p:nvSpPr>
-            <p:cNvPr id="13" name="文本框 12">
-              <a:extLst>
-                <a:ext uri="{FF2B5EF4-FFF2-40B4-BE49-F238E27FC236}">
-                  <a16:creationId xmlns:a16="http://schemas.microsoft.com/office/drawing/2014/main" id="{C5A22143-DCD5-4EE0-94CD-DBF95AC90C32}"/>
-                </a:ext>
-              </a:extLst>
-            </p:cNvPr>
-            <p:cNvSpPr txBox="1"/>
-            <p:nvPr/>
-          </p:nvSpPr>
-          <p:spPr>
-            <a:xfrm>
-              <a:off x="801777" y="6295205"/>
-              <a:ext cx="407484" cy="369332"/>
-            </a:xfrm>
-            <a:prstGeom prst="rect">
-              <a:avLst/>
-            </a:prstGeom>
-            <a:noFill/>
-          </p:spPr>
-          <p:txBody>
-            <a:bodyPr wrap="none" rtlCol="0">
-              <a:spAutoFit/>
-            </a:bodyPr>
-            <a:lstStyle/>
-            <a:p>
-              <a:r>
-                <a:rPr lang="en-US" altLang="zh-CN" dirty="0">
-                  <a:solidFill>
-                    <a:schemeClr val="accent2"/>
-                  </a:solidFill>
-                </a:rPr>
-                <a:t>5x</a:t>
-              </a:r>
-              <a:endParaRPr lang="zh-CN" altLang="en-US" dirty="0">
-                <a:solidFill>
-                  <a:schemeClr val="accent2"/>
-                </a:solidFill>
-              </a:endParaRPr>
-            </a:p>
-          </p:txBody>
-        </p:sp>
-      </p:grpSp>
     </p:spTree>
     <p:extLst>
       <p:ext uri="{BB962C8B-B14F-4D97-AF65-F5344CB8AC3E}">
@@ -7074,4 +8467,299 @@
     </a:ext>
   </a:extLst>
 </a:theme>
+</file>
+
+<file path=ppt/theme/theme2.xml><?xml version="1.0" encoding="utf-8"?>
+<a:theme xmlns:a="http://schemas.openxmlformats.org/drawingml/2006/main" name="Office 主题​​">
+  <a:themeElements>
+    <a:clrScheme name="Office">
+      <a:dk1>
+        <a:sysClr val="windowText" lastClr="000000"/>
+      </a:dk1>
+      <a:lt1>
+        <a:sysClr val="window" lastClr="FFFFFF"/>
+      </a:lt1>
+      <a:dk2>
+        <a:srgbClr val="44546A"/>
+      </a:dk2>
+      <a:lt2>
+        <a:srgbClr val="E7E6E6"/>
+      </a:lt2>
+      <a:accent1>
+        <a:srgbClr val="4472C4"/>
+      </a:accent1>
+      <a:accent2>
+        <a:srgbClr val="ED7D31"/>
+      </a:accent2>
+      <a:accent3>
+        <a:srgbClr val="A5A5A5"/>
+      </a:accent3>
+      <a:accent4>
+        <a:srgbClr val="FFC000"/>
+      </a:accent4>
+      <a:accent5>
+        <a:srgbClr val="5B9BD5"/>
+      </a:accent5>
+      <a:accent6>
+        <a:srgbClr val="70AD47"/>
+      </a:accent6>
+      <a:hlink>
+        <a:srgbClr val="0563C1"/>
+      </a:hlink>
+      <a:folHlink>
+        <a:srgbClr val="954F72"/>
+      </a:folHlink>
+    </a:clrScheme>
+    <a:fontScheme name="Office">
+      <a:majorFont>
+        <a:latin typeface="等线 Light" panose="020F0302020204030204"/>
+        <a:ea typeface=""/>
+        <a:cs typeface=""/>
+        <a:font script="Jpan" typeface="游ゴシック Light"/>
+        <a:font script="Hang" typeface="맑은 고딕"/>
+        <a:font script="Hans" typeface="等线 Light"/>
+        <a:font script="Hant" typeface="新細明體"/>
+        <a:font script="Arab" typeface="Times New Roman"/>
+        <a:font script="Hebr" typeface="Times New Roman"/>
+        <a:font script="Thai" typeface="Angsana New"/>
+        <a:font script="Ethi" typeface="Nyala"/>
+        <a:font script="Beng" typeface="Vrinda"/>
+        <a:font script="Gujr" typeface="Shruti"/>
+        <a:font script="Khmr" typeface="MoolBoran"/>
+        <a:font script="Knda" typeface="Tunga"/>
+        <a:font script="Guru" typeface="Raavi"/>
+        <a:font script="Cans" typeface="Euphemia"/>
+        <a:font script="Cher" typeface="Plantagenet Cherokee"/>
+        <a:font script="Yiii" typeface="Microsoft Yi Baiti"/>
+        <a:font script="Tibt" typeface="Microsoft Himalaya"/>
+        <a:font script="Thaa" typeface="MV Boli"/>
+        <a:font script="Deva" typeface="Mangal"/>
+        <a:font script="Telu" typeface="Gautami"/>
+        <a:font script="Taml" typeface="Latha"/>
+        <a:font script="Syrc" typeface="Estrangelo Edessa"/>
+        <a:font script="Orya" typeface="Kalinga"/>
+        <a:font script="Mlym" typeface="Kartika"/>
+        <a:font script="Laoo" typeface="DokChampa"/>
+        <a:font script="Sinh" typeface="Iskoola Pota"/>
+        <a:font script="Mong" typeface="Mongolian Baiti"/>
+        <a:font script="Viet" typeface="Times New Roman"/>
+        <a:font script="Uigh" typeface="Microsoft Uighur"/>
+        <a:font script="Geor" typeface="Sylfaen"/>
+        <a:font script="Armn" typeface="Arial"/>
+        <a:font script="Bugi" typeface="Leelawadee UI"/>
+        <a:font script="Bopo" typeface="Microsoft JhengHei"/>
+        <a:font script="Java" typeface="Javanese Text"/>
+        <a:font script="Lisu" typeface="Segoe UI"/>
+        <a:font script="Mymr" typeface="Myanmar Text"/>
+        <a:font script="Nkoo" typeface="Ebrima"/>
+        <a:font script="Olck" typeface="Nirmala UI"/>
+        <a:font script="Osma" typeface="Ebrima"/>
+        <a:font script="Phag" typeface="Phagspa"/>
+        <a:font script="Syrn" typeface="Estrangelo Edessa"/>
+        <a:font script="Syrj" typeface="Estrangelo Edessa"/>
+        <a:font script="Syre" typeface="Estrangelo Edessa"/>
+        <a:font script="Sora" typeface="Nirmala UI"/>
+        <a:font script="Tale" typeface="Microsoft Tai Le"/>
+        <a:font script="Talu" typeface="Microsoft New Tai Lue"/>
+        <a:font script="Tfng" typeface="Ebrima"/>
+      </a:majorFont>
+      <a:minorFont>
+        <a:latin typeface="等线" panose="020F0502020204030204"/>
+        <a:ea typeface=""/>
+        <a:cs typeface=""/>
+        <a:font script="Jpan" typeface="游ゴシック"/>
+        <a:font script="Hang" typeface="맑은 고딕"/>
+        <a:font script="Hans" typeface="等线"/>
+        <a:font script="Hant" typeface="新細明體"/>
+        <a:font script="Arab" typeface="Arial"/>
+        <a:font script="Hebr" typeface="Arial"/>
+        <a:font script="Thai" typeface="Cordia New"/>
+        <a:font script="Ethi" typeface="Nyala"/>
+        <a:font script="Beng" typeface="Vrinda"/>
+        <a:font script="Gujr" typeface="Shruti"/>
+        <a:font script="Khmr" typeface="DaunPenh"/>
+        <a:font script="Knda" typeface="Tunga"/>
+        <a:font script="Guru" typeface="Raavi"/>
+        <a:font script="Cans" typeface="Euphemia"/>
+        <a:font script="Cher" typeface="Plantagenet Cherokee"/>
+        <a:font script="Yiii" typeface="Microsoft Yi Baiti"/>
+        <a:font script="Tibt" typeface="Microsoft Himalaya"/>
+        <a:font script="Thaa" typeface="MV Boli"/>
+        <a:font script="Deva" typeface="Mangal"/>
+        <a:font script="Telu" typeface="Gautami"/>
+        <a:font script="Taml" typeface="Latha"/>
+        <a:font script="Syrc" typeface="Estrangelo Edessa"/>
+        <a:font script="Orya" typeface="Kalinga"/>
+        <a:font script="Mlym" typeface="Kartika"/>
+        <a:font script="Laoo" typeface="DokChampa"/>
+        <a:font script="Sinh" typeface="Iskoola Pota"/>
+        <a:font script="Mong" typeface="Mongolian Baiti"/>
+        <a:font script="Viet" typeface="Arial"/>
+        <a:font script="Uigh" typeface="Microsoft Uighur"/>
+        <a:font script="Geor" typeface="Sylfaen"/>
+        <a:font script="Armn" typeface="Arial"/>
+        <a:font script="Bugi" typeface="Leelawadee UI"/>
+        <a:font script="Bopo" typeface="Microsoft JhengHei"/>
+        <a:font script="Java" typeface="Javanese Text"/>
+        <a:font script="Lisu" typeface="Segoe UI"/>
+        <a:font script="Mymr" typeface="Myanmar Text"/>
+        <a:font script="Nkoo" typeface="Ebrima"/>
+        <a:font script="Olck" typeface="Nirmala UI"/>
+        <a:font script="Osma" typeface="Ebrima"/>
+        <a:font script="Phag" typeface="Phagspa"/>
+        <a:font script="Syrn" typeface="Estrangelo Edessa"/>
+        <a:font script="Syrj" typeface="Estrangelo Edessa"/>
+        <a:font script="Syre" typeface="Estrangelo Edessa"/>
+        <a:font script="Sora" typeface="Nirmala UI"/>
+        <a:font script="Tale" typeface="Microsoft Tai Le"/>
+        <a:font script="Talu" typeface="Microsoft New Tai Lue"/>
+        <a:font script="Tfng" typeface="Ebrima"/>
+      </a:minorFont>
+    </a:fontScheme>
+    <a:fmtScheme name="Office">
+      <a:fillStyleLst>
+        <a:solidFill>
+          <a:schemeClr val="phClr"/>
+        </a:solidFill>
+        <a:gradFill rotWithShape="1">
+          <a:gsLst>
+            <a:gs pos="0">
+              <a:schemeClr val="phClr">
+                <a:lumMod val="110000"/>
+                <a:satMod val="105000"/>
+                <a:tint val="67000"/>
+              </a:schemeClr>
+            </a:gs>
+            <a:gs pos="50000">
+              <a:schemeClr val="phClr">
+                <a:lumMod val="105000"/>
+                <a:satMod val="103000"/>
+                <a:tint val="73000"/>
+              </a:schemeClr>
+            </a:gs>
+            <a:gs pos="100000">
+              <a:schemeClr val="phClr">
+                <a:lumMod val="105000"/>
+                <a:satMod val="109000"/>
+                <a:tint val="81000"/>
+              </a:schemeClr>
+            </a:gs>
+          </a:gsLst>
+          <a:lin ang="5400000" scaled="0"/>
+        </a:gradFill>
+        <a:gradFill rotWithShape="1">
+          <a:gsLst>
+            <a:gs pos="0">
+              <a:schemeClr val="phClr">
+                <a:satMod val="103000"/>
+                <a:lumMod val="102000"/>
+                <a:tint val="94000"/>
+              </a:schemeClr>
+            </a:gs>
+            <a:gs pos="50000">
+              <a:schemeClr val="phClr">
+                <a:satMod val="110000"/>
+                <a:lumMod val="100000"/>
+                <a:shade val="100000"/>
+              </a:schemeClr>
+            </a:gs>
+            <a:gs pos="100000">
+              <a:schemeClr val="phClr">
+                <a:lumMod val="99000"/>
+                <a:satMod val="120000"/>
+                <a:shade val="78000"/>
+              </a:schemeClr>
+            </a:gs>
+          </a:gsLst>
+          <a:lin ang="5400000" scaled="0"/>
+        </a:gradFill>
+      </a:fillStyleLst>
+      <a:lnStyleLst>
+        <a:ln w="6350" cap="flat" cmpd="sng" algn="ctr">
+          <a:solidFill>
+            <a:schemeClr val="phClr"/>
+          </a:solidFill>
+          <a:prstDash val="solid"/>
+          <a:miter lim="800000"/>
+        </a:ln>
+        <a:ln w="12700" cap="flat" cmpd="sng" algn="ctr">
+          <a:solidFill>
+            <a:schemeClr val="phClr"/>
+          </a:solidFill>
+          <a:prstDash val="solid"/>
+          <a:miter lim="800000"/>
+        </a:ln>
+        <a:ln w="19050" cap="flat" cmpd="sng" algn="ctr">
+          <a:solidFill>
+            <a:schemeClr val="phClr"/>
+          </a:solidFill>
+          <a:prstDash val="solid"/>
+          <a:miter lim="800000"/>
+        </a:ln>
+      </a:lnStyleLst>
+      <a:effectStyleLst>
+        <a:effectStyle>
+          <a:effectLst/>
+        </a:effectStyle>
+        <a:effectStyle>
+          <a:effectLst/>
+        </a:effectStyle>
+        <a:effectStyle>
+          <a:effectLst>
+            <a:outerShdw blurRad="57150" dist="19050" dir="5400000" algn="ctr" rotWithShape="0">
+              <a:srgbClr val="000000">
+                <a:alpha val="63000"/>
+              </a:srgbClr>
+            </a:outerShdw>
+          </a:effectLst>
+        </a:effectStyle>
+      </a:effectStyleLst>
+      <a:bgFillStyleLst>
+        <a:solidFill>
+          <a:schemeClr val="phClr"/>
+        </a:solidFill>
+        <a:solidFill>
+          <a:schemeClr val="phClr">
+            <a:tint val="95000"/>
+            <a:satMod val="170000"/>
+          </a:schemeClr>
+        </a:solidFill>
+        <a:gradFill rotWithShape="1">
+          <a:gsLst>
+            <a:gs pos="0">
+              <a:schemeClr val="phClr">
+                <a:tint val="93000"/>
+                <a:satMod val="150000"/>
+                <a:shade val="98000"/>
+                <a:lumMod val="102000"/>
+              </a:schemeClr>
+            </a:gs>
+            <a:gs pos="50000">
+              <a:schemeClr val="phClr">
+                <a:tint val="98000"/>
+                <a:satMod val="130000"/>
+                <a:shade val="90000"/>
+                <a:lumMod val="103000"/>
+              </a:schemeClr>
+            </a:gs>
+            <a:gs pos="100000">
+              <a:schemeClr val="phClr">
+                <a:shade val="63000"/>
+                <a:satMod val="120000"/>
+              </a:schemeClr>
+            </a:gs>
+          </a:gsLst>
+          <a:lin ang="5400000" scaled="0"/>
+        </a:gradFill>
+      </a:bgFillStyleLst>
+    </a:fmtScheme>
+  </a:themeElements>
+  <a:objectDefaults/>
+  <a:extraClrSchemeLst/>
+  <a:extLst>
+    <a:ext uri="{05A4C25C-085E-4340-85A3-A5531E510DB2}">
+      <thm15:themeFamily xmlns:thm15="http://schemas.microsoft.com/office/thememl/2012/main" name="Office Theme" id="{62F939B6-93AF-4DB8-9C6B-D6C7DFDC589F}" vid="{4A3C46E8-61CC-4603-A589-7422A47A8E4A}"/>
+    </a:ext>
+  </a:extLst>
+</a:theme>
 </file>
</xml_diff>

<commit_message>
Update: shapeError with increased slit width
</commit_message>
<xml_diff>
--- a/06-25-21_Meeting.pptx
+++ b/06-25-21_Meeting.pptx
@@ -4118,6 +4118,112 @@
           </a:prstGeom>
         </p:spPr>
       </p:pic>
+      <p:grpSp>
+        <p:nvGrpSpPr>
+          <p:cNvPr id="6" name="组合 5">
+            <a:extLst>
+              <a:ext uri="{FF2B5EF4-FFF2-40B4-BE49-F238E27FC236}">
+                <a16:creationId xmlns:a16="http://schemas.microsoft.com/office/drawing/2014/main" id="{3AF70EAA-FC00-48C1-8E97-ABC7F0B47C8C}"/>
+              </a:ext>
+            </a:extLst>
+          </p:cNvPr>
+          <p:cNvGrpSpPr/>
+          <p:nvPr/>
+        </p:nvGrpSpPr>
+        <p:grpSpPr>
+          <a:xfrm>
+            <a:off x="-8060" y="1542210"/>
+            <a:ext cx="809837" cy="2416548"/>
+            <a:chOff x="-8060" y="1542210"/>
+            <a:chExt cx="809837" cy="2416548"/>
+          </a:xfrm>
+        </p:grpSpPr>
+        <p:cxnSp>
+          <p:nvCxnSpPr>
+            <p:cNvPr id="8" name="直接箭头连接符 7">
+              <a:extLst>
+                <a:ext uri="{FF2B5EF4-FFF2-40B4-BE49-F238E27FC236}">
+                  <a16:creationId xmlns:a16="http://schemas.microsoft.com/office/drawing/2014/main" id="{A3324DE4-4089-495B-A113-A6D27BC7B916}"/>
+                </a:ext>
+              </a:extLst>
+            </p:cNvPr>
+            <p:cNvCxnSpPr>
+              <a:cxnSpLocks/>
+            </p:cNvCxnSpPr>
+            <p:nvPr/>
+          </p:nvCxnSpPr>
+          <p:spPr>
+            <a:xfrm>
+              <a:off x="396858" y="2013417"/>
+              <a:ext cx="0" cy="1945341"/>
+            </a:xfrm>
+            <a:prstGeom prst="straightConnector1">
+              <a:avLst/>
+            </a:prstGeom>
+            <a:ln w="76200">
+              <a:tailEnd type="triangle"/>
+            </a:ln>
+          </p:spPr>
+          <p:style>
+            <a:lnRef idx="2">
+              <a:schemeClr val="accent2"/>
+            </a:lnRef>
+            <a:fillRef idx="0">
+              <a:schemeClr val="accent2"/>
+            </a:fillRef>
+            <a:effectRef idx="1">
+              <a:schemeClr val="accent2"/>
+            </a:effectRef>
+            <a:fontRef idx="minor">
+              <a:schemeClr val="tx1"/>
+            </a:fontRef>
+          </p:style>
+        </p:cxnSp>
+        <p:sp>
+          <p:nvSpPr>
+            <p:cNvPr id="10" name="文本框 9">
+              <a:extLst>
+                <a:ext uri="{FF2B5EF4-FFF2-40B4-BE49-F238E27FC236}">
+                  <a16:creationId xmlns:a16="http://schemas.microsoft.com/office/drawing/2014/main" id="{B2097560-8EA3-4798-8706-227A4434AEDD}"/>
+                </a:ext>
+              </a:extLst>
+            </p:cNvPr>
+            <p:cNvSpPr txBox="1"/>
+            <p:nvPr/>
+          </p:nvSpPr>
+          <p:spPr>
+            <a:xfrm>
+              <a:off x="-8060" y="1542210"/>
+              <a:ext cx="809837" cy="369332"/>
+            </a:xfrm>
+            <a:prstGeom prst="rect">
+              <a:avLst/>
+            </a:prstGeom>
+            <a:noFill/>
+          </p:spPr>
+          <p:txBody>
+            <a:bodyPr wrap="none" rtlCol="0">
+              <a:spAutoFit/>
+            </a:bodyPr>
+            <a:lstStyle/>
+            <a:p>
+              <a:r>
+                <a:rPr lang="en-US" altLang="zh-CN" dirty="0">
+                  <a:solidFill>
+                    <a:schemeClr val="accent2"/>
+                  </a:solidFill>
+                </a:rPr>
+                <a:t>power</a:t>
+              </a:r>
+              <a:endParaRPr lang="zh-CN" altLang="en-US" dirty="0">
+                <a:solidFill>
+                  <a:schemeClr val="accent2"/>
+                </a:solidFill>
+              </a:endParaRPr>
+            </a:p>
+          </p:txBody>
+        </p:sp>
+      </p:grpSp>
     </p:spTree>
     <p:extLst>
       <p:ext uri="{BB962C8B-B14F-4D97-AF65-F5344CB8AC3E}">
@@ -7998,6 +8104,112 @@
           </a:prstGeom>
         </p:spPr>
       </p:pic>
+      <p:grpSp>
+        <p:nvGrpSpPr>
+          <p:cNvPr id="6" name="组合 5">
+            <a:extLst>
+              <a:ext uri="{FF2B5EF4-FFF2-40B4-BE49-F238E27FC236}">
+                <a16:creationId xmlns:a16="http://schemas.microsoft.com/office/drawing/2014/main" id="{4CFC6C8C-D9E0-46FA-914C-62DAF4484202}"/>
+              </a:ext>
+            </a:extLst>
+          </p:cNvPr>
+          <p:cNvGrpSpPr/>
+          <p:nvPr/>
+        </p:nvGrpSpPr>
+        <p:grpSpPr>
+          <a:xfrm>
+            <a:off x="-8060" y="1542210"/>
+            <a:ext cx="809837" cy="2416548"/>
+            <a:chOff x="-8060" y="1542210"/>
+            <a:chExt cx="809837" cy="2416548"/>
+          </a:xfrm>
+        </p:grpSpPr>
+        <p:cxnSp>
+          <p:nvCxnSpPr>
+            <p:cNvPr id="8" name="直接箭头连接符 7">
+              <a:extLst>
+                <a:ext uri="{FF2B5EF4-FFF2-40B4-BE49-F238E27FC236}">
+                  <a16:creationId xmlns:a16="http://schemas.microsoft.com/office/drawing/2014/main" id="{543C0D24-9E0E-4704-AC50-5FD78913707D}"/>
+                </a:ext>
+              </a:extLst>
+            </p:cNvPr>
+            <p:cNvCxnSpPr>
+              <a:cxnSpLocks/>
+            </p:cNvCxnSpPr>
+            <p:nvPr/>
+          </p:nvCxnSpPr>
+          <p:spPr>
+            <a:xfrm>
+              <a:off x="396858" y="2013417"/>
+              <a:ext cx="0" cy="1945341"/>
+            </a:xfrm>
+            <a:prstGeom prst="straightConnector1">
+              <a:avLst/>
+            </a:prstGeom>
+            <a:ln w="76200">
+              <a:tailEnd type="triangle"/>
+            </a:ln>
+          </p:spPr>
+          <p:style>
+            <a:lnRef idx="2">
+              <a:schemeClr val="accent2"/>
+            </a:lnRef>
+            <a:fillRef idx="0">
+              <a:schemeClr val="accent2"/>
+            </a:fillRef>
+            <a:effectRef idx="1">
+              <a:schemeClr val="accent2"/>
+            </a:effectRef>
+            <a:fontRef idx="minor">
+              <a:schemeClr val="tx1"/>
+            </a:fontRef>
+          </p:style>
+        </p:cxnSp>
+        <p:sp>
+          <p:nvSpPr>
+            <p:cNvPr id="10" name="文本框 9">
+              <a:extLst>
+                <a:ext uri="{FF2B5EF4-FFF2-40B4-BE49-F238E27FC236}">
+                  <a16:creationId xmlns:a16="http://schemas.microsoft.com/office/drawing/2014/main" id="{EE9AAF07-C5E9-4C92-9641-1CEAF40CF111}"/>
+                </a:ext>
+              </a:extLst>
+            </p:cNvPr>
+            <p:cNvSpPr txBox="1"/>
+            <p:nvPr/>
+          </p:nvSpPr>
+          <p:spPr>
+            <a:xfrm>
+              <a:off x="-8060" y="1542210"/>
+              <a:ext cx="809837" cy="369332"/>
+            </a:xfrm>
+            <a:prstGeom prst="rect">
+              <a:avLst/>
+            </a:prstGeom>
+            <a:noFill/>
+          </p:spPr>
+          <p:txBody>
+            <a:bodyPr wrap="none" rtlCol="0">
+              <a:spAutoFit/>
+            </a:bodyPr>
+            <a:lstStyle/>
+            <a:p>
+              <a:r>
+                <a:rPr lang="en-US" altLang="zh-CN" dirty="0">
+                  <a:solidFill>
+                    <a:schemeClr val="accent2"/>
+                  </a:solidFill>
+                </a:rPr>
+                <a:t>power</a:t>
+              </a:r>
+              <a:endParaRPr lang="zh-CN" altLang="en-US" dirty="0">
+                <a:solidFill>
+                  <a:schemeClr val="accent2"/>
+                </a:solidFill>
+              </a:endParaRPr>
+            </a:p>
+          </p:txBody>
+        </p:sp>
+      </p:grpSp>
     </p:spTree>
     <p:extLst>
       <p:ext uri="{BB962C8B-B14F-4D97-AF65-F5344CB8AC3E}">
@@ -8161,6 +8373,112 @@
           </a:prstGeom>
         </p:spPr>
       </p:pic>
+      <p:grpSp>
+        <p:nvGrpSpPr>
+          <p:cNvPr id="6" name="组合 5">
+            <a:extLst>
+              <a:ext uri="{FF2B5EF4-FFF2-40B4-BE49-F238E27FC236}">
+                <a16:creationId xmlns:a16="http://schemas.microsoft.com/office/drawing/2014/main" id="{54D26561-CE3E-46A7-A64F-C96EC151DABE}"/>
+              </a:ext>
+            </a:extLst>
+          </p:cNvPr>
+          <p:cNvGrpSpPr/>
+          <p:nvPr/>
+        </p:nvGrpSpPr>
+        <p:grpSpPr>
+          <a:xfrm>
+            <a:off x="-8060" y="1542210"/>
+            <a:ext cx="809837" cy="2416548"/>
+            <a:chOff x="-8060" y="1542210"/>
+            <a:chExt cx="809837" cy="2416548"/>
+          </a:xfrm>
+        </p:grpSpPr>
+        <p:cxnSp>
+          <p:nvCxnSpPr>
+            <p:cNvPr id="8" name="直接箭头连接符 7">
+              <a:extLst>
+                <a:ext uri="{FF2B5EF4-FFF2-40B4-BE49-F238E27FC236}">
+                  <a16:creationId xmlns:a16="http://schemas.microsoft.com/office/drawing/2014/main" id="{EAE72E42-4398-4610-8C59-D2E39814CEE6}"/>
+                </a:ext>
+              </a:extLst>
+            </p:cNvPr>
+            <p:cNvCxnSpPr>
+              <a:cxnSpLocks/>
+            </p:cNvCxnSpPr>
+            <p:nvPr/>
+          </p:nvCxnSpPr>
+          <p:spPr>
+            <a:xfrm>
+              <a:off x="396858" y="2013417"/>
+              <a:ext cx="0" cy="1945341"/>
+            </a:xfrm>
+            <a:prstGeom prst="straightConnector1">
+              <a:avLst/>
+            </a:prstGeom>
+            <a:ln w="76200">
+              <a:tailEnd type="triangle"/>
+            </a:ln>
+          </p:spPr>
+          <p:style>
+            <a:lnRef idx="2">
+              <a:schemeClr val="accent2"/>
+            </a:lnRef>
+            <a:fillRef idx="0">
+              <a:schemeClr val="accent2"/>
+            </a:fillRef>
+            <a:effectRef idx="1">
+              <a:schemeClr val="accent2"/>
+            </a:effectRef>
+            <a:fontRef idx="minor">
+              <a:schemeClr val="tx1"/>
+            </a:fontRef>
+          </p:style>
+        </p:cxnSp>
+        <p:sp>
+          <p:nvSpPr>
+            <p:cNvPr id="10" name="文本框 9">
+              <a:extLst>
+                <a:ext uri="{FF2B5EF4-FFF2-40B4-BE49-F238E27FC236}">
+                  <a16:creationId xmlns:a16="http://schemas.microsoft.com/office/drawing/2014/main" id="{0DA02CD9-7D45-41BD-9939-9FC1DED7F3F4}"/>
+                </a:ext>
+              </a:extLst>
+            </p:cNvPr>
+            <p:cNvSpPr txBox="1"/>
+            <p:nvPr/>
+          </p:nvSpPr>
+          <p:spPr>
+            <a:xfrm>
+              <a:off x="-8060" y="1542210"/>
+              <a:ext cx="809837" cy="369332"/>
+            </a:xfrm>
+            <a:prstGeom prst="rect">
+              <a:avLst/>
+            </a:prstGeom>
+            <a:noFill/>
+          </p:spPr>
+          <p:txBody>
+            <a:bodyPr wrap="none" rtlCol="0">
+              <a:spAutoFit/>
+            </a:bodyPr>
+            <a:lstStyle/>
+            <a:p>
+              <a:r>
+                <a:rPr lang="en-US" altLang="zh-CN" dirty="0">
+                  <a:solidFill>
+                    <a:schemeClr val="accent2"/>
+                  </a:solidFill>
+                </a:rPr>
+                <a:t>power</a:t>
+              </a:r>
+              <a:endParaRPr lang="zh-CN" altLang="en-US" dirty="0">
+                <a:solidFill>
+                  <a:schemeClr val="accent2"/>
+                </a:solidFill>
+              </a:endParaRPr>
+            </a:p>
+          </p:txBody>
+        </p:sp>
+      </p:grpSp>
     </p:spTree>
     <p:extLst>
       <p:ext uri="{BB962C8B-B14F-4D97-AF65-F5344CB8AC3E}">

</xml_diff>

<commit_message>
Update: xtal thermal deformation with smaller fitting range
</commit_message>
<xml_diff>
--- a/06-25-21_Meeting.pptx
+++ b/06-25-21_Meeting.pptx
@@ -5,7 +5,7 @@
     <p:sldMasterId id="2147483648" r:id="rId1"/>
   </p:sldMasterIdLst>
   <p:notesMasterIdLst>
-    <p:notesMasterId r:id="rId18"/>
+    <p:notesMasterId r:id="rId19"/>
   </p:notesMasterIdLst>
   <p:sldIdLst>
     <p:sldId id="256" r:id="rId2"/>
@@ -21,9 +21,10 @@
     <p:sldId id="269" r:id="rId12"/>
     <p:sldId id="270" r:id="rId13"/>
     <p:sldId id="266" r:id="rId14"/>
-    <p:sldId id="271" r:id="rId15"/>
-    <p:sldId id="272" r:id="rId16"/>
-    <p:sldId id="267" r:id="rId17"/>
+    <p:sldId id="273" r:id="rId15"/>
+    <p:sldId id="271" r:id="rId16"/>
+    <p:sldId id="272" r:id="rId17"/>
+    <p:sldId id="267" r:id="rId18"/>
   </p:sldIdLst>
   <p:sldSz cx="12192000" cy="6858000"/>
   <p:notesSz cx="6858000" cy="9144000"/>
@@ -148,6 +149,7 @@
             <p14:sldId id="269"/>
             <p14:sldId id="270"/>
             <p14:sldId id="266"/>
+            <p14:sldId id="273"/>
           </p14:sldIdLst>
         </p14:section>
         <p14:section name="full-option2" id="{5E4261CB-BE16-4402-A487-14300437F034}">
@@ -248,7 +250,7 @@
           <a:p>
             <a:fld id="{0CEEE009-7277-4A06-BBBC-24F6D41C1EA5}" type="datetimeFigureOut">
               <a:rPr lang="zh-CN" altLang="en-US" smtClean="0"/>
-              <a:t>2021/6/26</a:t>
+              <a:t>2021/6/29</a:t>
             </a:fld>
             <a:endParaRPr lang="zh-CN" altLang="en-US"/>
           </a:p>
@@ -664,7 +666,259 @@
           <a:p>
             <a:fld id="{5020031F-FCA8-49D6-95C1-FC62A29DDECE}" type="slidenum">
               <a:rPr lang="zh-CN" altLang="en-US" smtClean="0"/>
+              <a:t>12</a:t>
+            </a:fld>
+            <a:endParaRPr lang="zh-CN" altLang="en-US"/>
+          </a:p>
+        </p:txBody>
+      </p:sp>
+    </p:spTree>
+    <p:extLst>
+      <p:ext uri="{BB962C8B-B14F-4D97-AF65-F5344CB8AC3E}">
+        <p14:creationId xmlns:p14="http://schemas.microsoft.com/office/powerpoint/2010/main" val="727872738"/>
+      </p:ext>
+    </p:extLst>
+  </p:cSld>
+  <p:clrMapOvr>
+    <a:masterClrMapping/>
+  </p:clrMapOvr>
+</p:notes>
+</file>
+
+<file path=ppt/notesSlides/notesSlide3.xml><?xml version="1.0" encoding="utf-8"?>
+<p:notes xmlns:a="http://schemas.openxmlformats.org/drawingml/2006/main" xmlns:r="http://schemas.openxmlformats.org/officeDocument/2006/relationships" xmlns:p="http://schemas.openxmlformats.org/presentationml/2006/main">
+  <p:cSld>
+    <p:spTree>
+      <p:nvGrpSpPr>
+        <p:cNvPr id="1" name=""/>
+        <p:cNvGrpSpPr/>
+        <p:nvPr/>
+      </p:nvGrpSpPr>
+      <p:grpSpPr>
+        <a:xfrm>
+          <a:off x="0" y="0"/>
+          <a:ext cx="0" cy="0"/>
+          <a:chOff x="0" y="0"/>
+          <a:chExt cx="0" cy="0"/>
+        </a:xfrm>
+      </p:grpSpPr>
+      <p:sp>
+        <p:nvSpPr>
+          <p:cNvPr id="2" name="幻灯片图像占位符 1"/>
+          <p:cNvSpPr>
+            <a:spLocks noGrp="1" noRot="1" noChangeAspect="1"/>
+          </p:cNvSpPr>
+          <p:nvPr>
+            <p:ph type="sldImg"/>
+          </p:nvPr>
+        </p:nvSpPr>
+        <p:spPr/>
+      </p:sp>
+      <p:sp>
+        <p:nvSpPr>
+          <p:cNvPr id="3" name="备注占位符 2"/>
+          <p:cNvSpPr>
+            <a:spLocks noGrp="1"/>
+          </p:cNvSpPr>
+          <p:nvPr>
+            <p:ph type="body" idx="1"/>
+          </p:nvPr>
+        </p:nvSpPr>
+        <p:spPr/>
+        <p:txBody>
+          <a:bodyPr/>
+          <a:lstStyle/>
+          <a:p>
+            <a:endParaRPr lang="zh-CN" altLang="en-US" dirty="0"/>
+          </a:p>
+        </p:txBody>
+      </p:sp>
+      <p:sp>
+        <p:nvSpPr>
+          <p:cNvPr id="4" name="灯片编号占位符 3"/>
+          <p:cNvSpPr>
+            <a:spLocks noGrp="1"/>
+          </p:cNvSpPr>
+          <p:nvPr>
+            <p:ph type="sldNum" sz="quarter" idx="5"/>
+          </p:nvPr>
+        </p:nvSpPr>
+        <p:spPr/>
+        <p:txBody>
+          <a:bodyPr/>
+          <a:lstStyle/>
+          <a:p>
+            <a:fld id="{5020031F-FCA8-49D6-95C1-FC62A29DDECE}" type="slidenum">
+              <a:rPr lang="zh-CN" altLang="en-US" smtClean="0"/>
+              <a:t>13</a:t>
+            </a:fld>
+            <a:endParaRPr lang="zh-CN" altLang="en-US"/>
+          </a:p>
+        </p:txBody>
+      </p:sp>
+    </p:spTree>
+    <p:extLst>
+      <p:ext uri="{BB962C8B-B14F-4D97-AF65-F5344CB8AC3E}">
+        <p14:creationId xmlns:p14="http://schemas.microsoft.com/office/powerpoint/2010/main" val="1879484614"/>
+      </p:ext>
+    </p:extLst>
+  </p:cSld>
+  <p:clrMapOvr>
+    <a:masterClrMapping/>
+  </p:clrMapOvr>
+</p:notes>
+</file>
+
+<file path=ppt/notesSlides/notesSlide4.xml><?xml version="1.0" encoding="utf-8"?>
+<p:notes xmlns:a="http://schemas.openxmlformats.org/drawingml/2006/main" xmlns:r="http://schemas.openxmlformats.org/officeDocument/2006/relationships" xmlns:p="http://schemas.openxmlformats.org/presentationml/2006/main">
+  <p:cSld>
+    <p:spTree>
+      <p:nvGrpSpPr>
+        <p:cNvPr id="1" name=""/>
+        <p:cNvGrpSpPr/>
+        <p:nvPr/>
+      </p:nvGrpSpPr>
+      <p:grpSpPr>
+        <a:xfrm>
+          <a:off x="0" y="0"/>
+          <a:ext cx="0" cy="0"/>
+          <a:chOff x="0" y="0"/>
+          <a:chExt cx="0" cy="0"/>
+        </a:xfrm>
+      </p:grpSpPr>
+      <p:sp>
+        <p:nvSpPr>
+          <p:cNvPr id="2" name="幻灯片图像占位符 1"/>
+          <p:cNvSpPr>
+            <a:spLocks noGrp="1" noRot="1" noChangeAspect="1"/>
+          </p:cNvSpPr>
+          <p:nvPr>
+            <p:ph type="sldImg"/>
+          </p:nvPr>
+        </p:nvSpPr>
+        <p:spPr/>
+      </p:sp>
+      <p:sp>
+        <p:nvSpPr>
+          <p:cNvPr id="3" name="备注占位符 2"/>
+          <p:cNvSpPr>
+            <a:spLocks noGrp="1"/>
+          </p:cNvSpPr>
+          <p:nvPr>
+            <p:ph type="body" idx="1"/>
+          </p:nvPr>
+        </p:nvSpPr>
+        <p:spPr/>
+        <p:txBody>
+          <a:bodyPr/>
+          <a:lstStyle/>
+          <a:p>
+            <a:endParaRPr lang="zh-CN" altLang="en-US" dirty="0"/>
+          </a:p>
+        </p:txBody>
+      </p:sp>
+      <p:sp>
+        <p:nvSpPr>
+          <p:cNvPr id="4" name="灯片编号占位符 3"/>
+          <p:cNvSpPr>
+            <a:spLocks noGrp="1"/>
+          </p:cNvSpPr>
+          <p:nvPr>
+            <p:ph type="sldNum" sz="quarter" idx="5"/>
+          </p:nvPr>
+        </p:nvSpPr>
+        <p:spPr/>
+        <p:txBody>
+          <a:bodyPr/>
+          <a:lstStyle/>
+          <a:p>
+            <a:fld id="{5020031F-FCA8-49D6-95C1-FC62A29DDECE}" type="slidenum">
+              <a:rPr lang="zh-CN" altLang="en-US" smtClean="0"/>
               <a:t>14</a:t>
+            </a:fld>
+            <a:endParaRPr lang="zh-CN" altLang="en-US"/>
+          </a:p>
+        </p:txBody>
+      </p:sp>
+    </p:spTree>
+    <p:extLst>
+      <p:ext uri="{BB962C8B-B14F-4D97-AF65-F5344CB8AC3E}">
+        <p14:creationId xmlns:p14="http://schemas.microsoft.com/office/powerpoint/2010/main" val="2636144012"/>
+      </p:ext>
+    </p:extLst>
+  </p:cSld>
+  <p:clrMapOvr>
+    <a:masterClrMapping/>
+  </p:clrMapOvr>
+</p:notes>
+</file>
+
+<file path=ppt/notesSlides/notesSlide5.xml><?xml version="1.0" encoding="utf-8"?>
+<p:notes xmlns:a="http://schemas.openxmlformats.org/drawingml/2006/main" xmlns:r="http://schemas.openxmlformats.org/officeDocument/2006/relationships" xmlns:p="http://schemas.openxmlformats.org/presentationml/2006/main">
+  <p:cSld>
+    <p:spTree>
+      <p:nvGrpSpPr>
+        <p:cNvPr id="1" name=""/>
+        <p:cNvGrpSpPr/>
+        <p:nvPr/>
+      </p:nvGrpSpPr>
+      <p:grpSpPr>
+        <a:xfrm>
+          <a:off x="0" y="0"/>
+          <a:ext cx="0" cy="0"/>
+          <a:chOff x="0" y="0"/>
+          <a:chExt cx="0" cy="0"/>
+        </a:xfrm>
+      </p:grpSpPr>
+      <p:sp>
+        <p:nvSpPr>
+          <p:cNvPr id="2" name="幻灯片图像占位符 1"/>
+          <p:cNvSpPr>
+            <a:spLocks noGrp="1" noRot="1" noChangeAspect="1"/>
+          </p:cNvSpPr>
+          <p:nvPr>
+            <p:ph type="sldImg"/>
+          </p:nvPr>
+        </p:nvSpPr>
+        <p:spPr/>
+      </p:sp>
+      <p:sp>
+        <p:nvSpPr>
+          <p:cNvPr id="3" name="备注占位符 2"/>
+          <p:cNvSpPr>
+            <a:spLocks noGrp="1"/>
+          </p:cNvSpPr>
+          <p:nvPr>
+            <p:ph type="body" idx="1"/>
+          </p:nvPr>
+        </p:nvSpPr>
+        <p:spPr/>
+        <p:txBody>
+          <a:bodyPr/>
+          <a:lstStyle/>
+          <a:p>
+            <a:endParaRPr lang="zh-CN" altLang="en-US" dirty="0"/>
+          </a:p>
+        </p:txBody>
+      </p:sp>
+      <p:sp>
+        <p:nvSpPr>
+          <p:cNvPr id="4" name="灯片编号占位符 3"/>
+          <p:cNvSpPr>
+            <a:spLocks noGrp="1"/>
+          </p:cNvSpPr>
+          <p:nvPr>
+            <p:ph type="sldNum" sz="quarter" idx="5"/>
+          </p:nvPr>
+        </p:nvSpPr>
+        <p:spPr/>
+        <p:txBody>
+          <a:bodyPr/>
+          <a:lstStyle/>
+          <a:p>
+            <a:fld id="{5020031F-FCA8-49D6-95C1-FC62A29DDECE}" type="slidenum">
+              <a:rPr lang="zh-CN" altLang="en-US" smtClean="0"/>
+              <a:t>15</a:t>
             </a:fld>
             <a:endParaRPr lang="zh-CN" altLang="en-US"/>
           </a:p>
@@ -674,6 +928,90 @@
     <p:extLst>
       <p:ext uri="{BB962C8B-B14F-4D97-AF65-F5344CB8AC3E}">
         <p14:creationId xmlns:p14="http://schemas.microsoft.com/office/powerpoint/2010/main" val="4227952875"/>
+      </p:ext>
+    </p:extLst>
+  </p:cSld>
+  <p:clrMapOvr>
+    <a:masterClrMapping/>
+  </p:clrMapOvr>
+</p:notes>
+</file>
+
+<file path=ppt/notesSlides/notesSlide6.xml><?xml version="1.0" encoding="utf-8"?>
+<p:notes xmlns:a="http://schemas.openxmlformats.org/drawingml/2006/main" xmlns:r="http://schemas.openxmlformats.org/officeDocument/2006/relationships" xmlns:p="http://schemas.openxmlformats.org/presentationml/2006/main">
+  <p:cSld>
+    <p:spTree>
+      <p:nvGrpSpPr>
+        <p:cNvPr id="1" name=""/>
+        <p:cNvGrpSpPr/>
+        <p:nvPr/>
+      </p:nvGrpSpPr>
+      <p:grpSpPr>
+        <a:xfrm>
+          <a:off x="0" y="0"/>
+          <a:ext cx="0" cy="0"/>
+          <a:chOff x="0" y="0"/>
+          <a:chExt cx="0" cy="0"/>
+        </a:xfrm>
+      </p:grpSpPr>
+      <p:sp>
+        <p:nvSpPr>
+          <p:cNvPr id="2" name="幻灯片图像占位符 1"/>
+          <p:cNvSpPr>
+            <a:spLocks noGrp="1" noRot="1" noChangeAspect="1"/>
+          </p:cNvSpPr>
+          <p:nvPr>
+            <p:ph type="sldImg"/>
+          </p:nvPr>
+        </p:nvSpPr>
+        <p:spPr/>
+      </p:sp>
+      <p:sp>
+        <p:nvSpPr>
+          <p:cNvPr id="3" name="备注占位符 2"/>
+          <p:cNvSpPr>
+            <a:spLocks noGrp="1"/>
+          </p:cNvSpPr>
+          <p:nvPr>
+            <p:ph type="body" idx="1"/>
+          </p:nvPr>
+        </p:nvSpPr>
+        <p:spPr/>
+        <p:txBody>
+          <a:bodyPr/>
+          <a:lstStyle/>
+          <a:p>
+            <a:endParaRPr lang="zh-CN" altLang="en-US" dirty="0"/>
+          </a:p>
+        </p:txBody>
+      </p:sp>
+      <p:sp>
+        <p:nvSpPr>
+          <p:cNvPr id="4" name="灯片编号占位符 3"/>
+          <p:cNvSpPr>
+            <a:spLocks noGrp="1"/>
+          </p:cNvSpPr>
+          <p:nvPr>
+            <p:ph type="sldNum" sz="quarter" idx="5"/>
+          </p:nvPr>
+        </p:nvSpPr>
+        <p:spPr/>
+        <p:txBody>
+          <a:bodyPr/>
+          <a:lstStyle/>
+          <a:p>
+            <a:fld id="{5020031F-FCA8-49D6-95C1-FC62A29DDECE}" type="slidenum">
+              <a:rPr lang="zh-CN" altLang="en-US" smtClean="0"/>
+              <a:t>16</a:t>
+            </a:fld>
+            <a:endParaRPr lang="zh-CN" altLang="en-US"/>
+          </a:p>
+        </p:txBody>
+      </p:sp>
+    </p:spTree>
+    <p:extLst>
+      <p:ext uri="{BB962C8B-B14F-4D97-AF65-F5344CB8AC3E}">
+        <p14:creationId xmlns:p14="http://schemas.microsoft.com/office/powerpoint/2010/main" val="2149446929"/>
       </p:ext>
     </p:extLst>
   </p:cSld>
@@ -830,7 +1168,7 @@
           <a:p>
             <a:fld id="{06161B35-A5D1-400A-97A7-7B15B42727C3}" type="datetimeFigureOut">
               <a:rPr lang="zh-CN" altLang="en-US" smtClean="0"/>
-              <a:t>2021/6/26</a:t>
+              <a:t>2021/6/29</a:t>
             </a:fld>
             <a:endParaRPr lang="zh-CN" altLang="en-US"/>
           </a:p>
@@ -1028,7 +1366,7 @@
           <a:p>
             <a:fld id="{06161B35-A5D1-400A-97A7-7B15B42727C3}" type="datetimeFigureOut">
               <a:rPr lang="zh-CN" altLang="en-US" smtClean="0"/>
-              <a:t>2021/6/26</a:t>
+              <a:t>2021/6/29</a:t>
             </a:fld>
             <a:endParaRPr lang="zh-CN" altLang="en-US"/>
           </a:p>
@@ -1236,7 +1574,7 @@
           <a:p>
             <a:fld id="{06161B35-A5D1-400A-97A7-7B15B42727C3}" type="datetimeFigureOut">
               <a:rPr lang="zh-CN" altLang="en-US" smtClean="0"/>
-              <a:t>2021/6/26</a:t>
+              <a:t>2021/6/29</a:t>
             </a:fld>
             <a:endParaRPr lang="zh-CN" altLang="en-US"/>
           </a:p>
@@ -1434,7 +1772,7 @@
           <a:p>
             <a:fld id="{06161B35-A5D1-400A-97A7-7B15B42727C3}" type="datetimeFigureOut">
               <a:rPr lang="zh-CN" altLang="en-US" smtClean="0"/>
-              <a:t>2021/6/26</a:t>
+              <a:t>2021/6/29</a:t>
             </a:fld>
             <a:endParaRPr lang="zh-CN" altLang="en-US"/>
           </a:p>
@@ -1709,7 +2047,7 @@
           <a:p>
             <a:fld id="{06161B35-A5D1-400A-97A7-7B15B42727C3}" type="datetimeFigureOut">
               <a:rPr lang="zh-CN" altLang="en-US" smtClean="0"/>
-              <a:t>2021/6/26</a:t>
+              <a:t>2021/6/29</a:t>
             </a:fld>
             <a:endParaRPr lang="zh-CN" altLang="en-US"/>
           </a:p>
@@ -1974,7 +2312,7 @@
           <a:p>
             <a:fld id="{06161B35-A5D1-400A-97A7-7B15B42727C3}" type="datetimeFigureOut">
               <a:rPr lang="zh-CN" altLang="en-US" smtClean="0"/>
-              <a:t>2021/6/26</a:t>
+              <a:t>2021/6/29</a:t>
             </a:fld>
             <a:endParaRPr lang="zh-CN" altLang="en-US"/>
           </a:p>
@@ -2386,7 +2724,7 @@
           <a:p>
             <a:fld id="{06161B35-A5D1-400A-97A7-7B15B42727C3}" type="datetimeFigureOut">
               <a:rPr lang="zh-CN" altLang="en-US" smtClean="0"/>
-              <a:t>2021/6/26</a:t>
+              <a:t>2021/6/29</a:t>
             </a:fld>
             <a:endParaRPr lang="zh-CN" altLang="en-US"/>
           </a:p>
@@ -2527,7 +2865,7 @@
           <a:p>
             <a:fld id="{06161B35-A5D1-400A-97A7-7B15B42727C3}" type="datetimeFigureOut">
               <a:rPr lang="zh-CN" altLang="en-US" smtClean="0"/>
-              <a:t>2021/6/26</a:t>
+              <a:t>2021/6/29</a:t>
             </a:fld>
             <a:endParaRPr lang="zh-CN" altLang="en-US"/>
           </a:p>
@@ -2640,7 +2978,7 @@
           <a:p>
             <a:fld id="{06161B35-A5D1-400A-97A7-7B15B42727C3}" type="datetimeFigureOut">
               <a:rPr lang="zh-CN" altLang="en-US" smtClean="0"/>
-              <a:t>2021/6/26</a:t>
+              <a:t>2021/6/29</a:t>
             </a:fld>
             <a:endParaRPr lang="zh-CN" altLang="en-US"/>
           </a:p>
@@ -2951,7 +3289,7 @@
           <a:p>
             <a:fld id="{06161B35-A5D1-400A-97A7-7B15B42727C3}" type="datetimeFigureOut">
               <a:rPr lang="zh-CN" altLang="en-US" smtClean="0"/>
-              <a:t>2021/6/26</a:t>
+              <a:t>2021/6/29</a:t>
             </a:fld>
             <a:endParaRPr lang="zh-CN" altLang="en-US"/>
           </a:p>
@@ -3239,7 +3577,7 @@
           <a:p>
             <a:fld id="{06161B35-A5D1-400A-97A7-7B15B42727C3}" type="datetimeFigureOut">
               <a:rPr lang="zh-CN" altLang="en-US" smtClean="0"/>
-              <a:t>2021/6/26</a:t>
+              <a:t>2021/6/29</a:t>
             </a:fld>
             <a:endParaRPr lang="zh-CN" altLang="en-US"/>
           </a:p>
@@ -3480,7 +3818,7 @@
           <a:p>
             <a:fld id="{06161B35-A5D1-400A-97A7-7B15B42727C3}" type="datetimeFigureOut">
               <a:rPr lang="zh-CN" altLang="en-US" smtClean="0"/>
-              <a:t>2021/6/26</a:t>
+              <a:t>2021/6/29</a:t>
             </a:fld>
             <a:endParaRPr lang="zh-CN" altLang="en-US"/>
           </a:p>
@@ -4568,7 +4906,7 @@
           <p:nvPr/>
         </p:nvPicPr>
         <p:blipFill>
-          <a:blip r:embed="rId2">
+          <a:blip r:embed="rId3">
             <a:extLst>
               <a:ext uri="{28A0092B-C50C-407E-A947-70E740481C1C}">
                 <a14:useLocalDpi xmlns:a14="http://schemas.microsoft.com/office/drawing/2010/main" val="0"/>
@@ -4594,41 +4932,6 @@
             <a:extLst>
               <a:ext uri="{FF2B5EF4-FFF2-40B4-BE49-F238E27FC236}">
                 <a16:creationId xmlns:a16="http://schemas.microsoft.com/office/drawing/2014/main" id="{96DD5AB7-74FD-47AC-98EA-290C937072DC}"/>
-              </a:ext>
-            </a:extLst>
-          </p:cNvPr>
-          <p:cNvPicPr>
-            <a:picLocks noChangeAspect="1"/>
-          </p:cNvPicPr>
-          <p:nvPr/>
-        </p:nvPicPr>
-        <p:blipFill>
-          <a:blip r:embed="rId3">
-            <a:extLst>
-              <a:ext uri="{28A0092B-C50C-407E-A947-70E740481C1C}">
-                <a14:useLocalDpi xmlns:a14="http://schemas.microsoft.com/office/drawing/2010/main" val="0"/>
-              </a:ext>
-            </a:extLst>
-          </a:blip>
-          <a:srcRect/>
-          <a:stretch/>
-        </p:blipFill>
-        <p:spPr>
-          <a:xfrm>
-            <a:off x="4821677" y="3882903"/>
-            <a:ext cx="3240000" cy="3240000"/>
-          </a:xfrm>
-          <a:prstGeom prst="rect">
-            <a:avLst/>
-          </a:prstGeom>
-        </p:spPr>
-      </p:pic>
-      <p:pic>
-        <p:nvPicPr>
-          <p:cNvPr id="15" name="图片 14">
-            <a:extLst>
-              <a:ext uri="{FF2B5EF4-FFF2-40B4-BE49-F238E27FC236}">
-                <a16:creationId xmlns:a16="http://schemas.microsoft.com/office/drawing/2014/main" id="{37D5B7FD-4547-422A-B3A4-F8B9F0FF001D}"/>
               </a:ext>
             </a:extLst>
           </p:cNvPr>
@@ -4650,7 +4953,7 @@
         </p:blipFill>
         <p:spPr>
           <a:xfrm>
-            <a:off x="8471990" y="1166796"/>
+            <a:off x="4821677" y="3882903"/>
             <a:ext cx="3240000" cy="3240000"/>
           </a:xfrm>
           <a:prstGeom prst="rect">
@@ -4660,10 +4963,10 @@
       </p:pic>
       <p:pic>
         <p:nvPicPr>
-          <p:cNvPr id="17" name="图片 16">
-            <a:extLst>
-              <a:ext uri="{FF2B5EF4-FFF2-40B4-BE49-F238E27FC236}">
-                <a16:creationId xmlns:a16="http://schemas.microsoft.com/office/drawing/2014/main" id="{C9206398-C7CA-4063-8AF7-467401B14B6C}"/>
+          <p:cNvPr id="15" name="图片 14">
+            <a:extLst>
+              <a:ext uri="{FF2B5EF4-FFF2-40B4-BE49-F238E27FC236}">
+                <a16:creationId xmlns:a16="http://schemas.microsoft.com/office/drawing/2014/main" id="{37D5B7FD-4547-422A-B3A4-F8B9F0FF001D}"/>
               </a:ext>
             </a:extLst>
           </p:cNvPr>
@@ -4674,6 +4977,41 @@
         </p:nvPicPr>
         <p:blipFill>
           <a:blip r:embed="rId5">
+            <a:extLst>
+              <a:ext uri="{28A0092B-C50C-407E-A947-70E740481C1C}">
+                <a14:useLocalDpi xmlns:a14="http://schemas.microsoft.com/office/drawing/2010/main" val="0"/>
+              </a:ext>
+            </a:extLst>
+          </a:blip>
+          <a:srcRect/>
+          <a:stretch/>
+        </p:blipFill>
+        <p:spPr>
+          <a:xfrm>
+            <a:off x="8471990" y="1166796"/>
+            <a:ext cx="3240000" cy="3240000"/>
+          </a:xfrm>
+          <a:prstGeom prst="rect">
+            <a:avLst/>
+          </a:prstGeom>
+        </p:spPr>
+      </p:pic>
+      <p:pic>
+        <p:nvPicPr>
+          <p:cNvPr id="17" name="图片 16">
+            <a:extLst>
+              <a:ext uri="{FF2B5EF4-FFF2-40B4-BE49-F238E27FC236}">
+                <a16:creationId xmlns:a16="http://schemas.microsoft.com/office/drawing/2014/main" id="{C9206398-C7CA-4063-8AF7-467401B14B6C}"/>
+              </a:ext>
+            </a:extLst>
+          </p:cNvPr>
+          <p:cNvPicPr>
+            <a:picLocks noChangeAspect="1"/>
+          </p:cNvPicPr>
+          <p:nvPr/>
+        </p:nvPicPr>
+        <p:blipFill>
+          <a:blip r:embed="rId6">
             <a:extLst>
               <a:ext uri="{28A0092B-C50C-407E-A947-70E740481C1C}">
                 <a14:useLocalDpi xmlns:a14="http://schemas.microsoft.com/office/drawing/2010/main" val="0"/>
@@ -4728,7 +5066,7 @@
             <p:nvPr/>
           </p:nvPicPr>
           <p:blipFill>
-            <a:blip r:embed="rId6">
+            <a:blip r:embed="rId7">
               <a:extLst>
                 <a:ext uri="{28A0092B-C50C-407E-A947-70E740481C1C}">
                   <a14:useLocalDpi xmlns:a14="http://schemas.microsoft.com/office/drawing/2010/main" val="0"/>
@@ -4828,7 +5166,7 @@
             <p:nvPr/>
           </p:nvPicPr>
           <p:blipFill rotWithShape="1">
-            <a:blip r:embed="rId7">
+            <a:blip r:embed="rId8">
               <a:extLst>
                 <a:ext uri="{28A0092B-C50C-407E-A947-70E740481C1C}">
                   <a14:useLocalDpi xmlns:a14="http://schemas.microsoft.com/office/drawing/2010/main" val="0"/>
@@ -5138,46 +5476,10 @@
       </p:sp>
       <p:pic>
         <p:nvPicPr>
-          <p:cNvPr id="5" name="图片 4" descr="图片包含 图表&#10;&#10;描述已自动生成">
+          <p:cNvPr id="5" name="图片 4">
             <a:extLst>
               <a:ext uri="{FF2B5EF4-FFF2-40B4-BE49-F238E27FC236}">
                 <a16:creationId xmlns:a16="http://schemas.microsoft.com/office/drawing/2014/main" id="{14FDF897-1AB5-4EB4-AC0D-899552BD0432}"/>
-              </a:ext>
-            </a:extLst>
-          </p:cNvPr>
-          <p:cNvPicPr>
-            <a:picLocks noChangeAspect="1"/>
-          </p:cNvPicPr>
-          <p:nvPr/>
-        </p:nvPicPr>
-        <p:blipFill>
-          <a:blip r:embed="rId2">
-            <a:extLst>
-              <a:ext uri="{28A0092B-C50C-407E-A947-70E740481C1C}">
-                <a14:useLocalDpi xmlns:a14="http://schemas.microsoft.com/office/drawing/2010/main" val="0"/>
-              </a:ext>
-            </a:extLst>
-          </a:blip>
-          <a:stretch>
-            <a:fillRect/>
-          </a:stretch>
-        </p:blipFill>
-        <p:spPr>
-          <a:xfrm>
-            <a:off x="551999" y="1455717"/>
-            <a:ext cx="11088000" cy="2520000"/>
-          </a:xfrm>
-          <a:prstGeom prst="rect">
-            <a:avLst/>
-          </a:prstGeom>
-        </p:spPr>
-      </p:pic>
-      <p:pic>
-        <p:nvPicPr>
-          <p:cNvPr id="7" name="图片 6" descr="图表, 散点图&#10;&#10;描述已自动生成">
-            <a:extLst>
-              <a:ext uri="{FF2B5EF4-FFF2-40B4-BE49-F238E27FC236}">
-                <a16:creationId xmlns:a16="http://schemas.microsoft.com/office/drawing/2014/main" id="{DB5FBFFD-DE71-4C56-9412-C50707790726}"/>
               </a:ext>
             </a:extLst>
           </p:cNvPr>
@@ -5194,14 +5496,48 @@
               </a:ext>
             </a:extLst>
           </a:blip>
-          <a:stretch>
-            <a:fillRect/>
-          </a:stretch>
+          <a:srcRect/>
+          <a:stretch/>
         </p:blipFill>
         <p:spPr>
           <a:xfrm>
+            <a:off x="551999" y="1455717"/>
+            <a:ext cx="11088000" cy="2519999"/>
+          </a:xfrm>
+          <a:prstGeom prst="rect">
+            <a:avLst/>
+          </a:prstGeom>
+        </p:spPr>
+      </p:pic>
+      <p:pic>
+        <p:nvPicPr>
+          <p:cNvPr id="7" name="图片 6">
+            <a:extLst>
+              <a:ext uri="{FF2B5EF4-FFF2-40B4-BE49-F238E27FC236}">
+                <a16:creationId xmlns:a16="http://schemas.microsoft.com/office/drawing/2014/main" id="{DB5FBFFD-DE71-4C56-9412-C50707790726}"/>
+              </a:ext>
+            </a:extLst>
+          </p:cNvPr>
+          <p:cNvPicPr>
+            <a:picLocks noChangeAspect="1"/>
+          </p:cNvPicPr>
+          <p:nvPr/>
+        </p:nvPicPr>
+        <p:blipFill>
+          <a:blip r:embed="rId4">
+            <a:extLst>
+              <a:ext uri="{28A0092B-C50C-407E-A947-70E740481C1C}">
+                <a14:useLocalDpi xmlns:a14="http://schemas.microsoft.com/office/drawing/2010/main" val="0"/>
+              </a:ext>
+            </a:extLst>
+          </a:blip>
+          <a:srcRect/>
+          <a:stretch/>
+        </p:blipFill>
+        <p:spPr>
+          <a:xfrm>
             <a:off x="264000" y="4378267"/>
-            <a:ext cx="11663999" cy="2160000"/>
+            <a:ext cx="11663999" cy="2159999"/>
           </a:xfrm>
           <a:prstGeom prst="rect">
             <a:avLst/>
@@ -5243,7 +5579,7 @@
           <p:cNvPr id="2" name="标题 1">
             <a:extLst>
               <a:ext uri="{FF2B5EF4-FFF2-40B4-BE49-F238E27FC236}">
-                <a16:creationId xmlns:a16="http://schemas.microsoft.com/office/drawing/2014/main" id="{E992A8B7-1629-42FE-AA40-407523A09B1A}"/>
+                <a16:creationId xmlns:a16="http://schemas.microsoft.com/office/drawing/2014/main" id="{A83A6069-F48A-459C-8956-5314C6308FD5}"/>
               </a:ext>
             </a:extLst>
           </p:cNvPr>
@@ -5261,7 +5597,31 @@
           <a:p>
             <a:r>
               <a:rPr lang="en-US" altLang="zh-CN" dirty="0"/>
-              <a:t>Beam profile with perfect optics, focus</a:t>
+              <a:t>Full </a:t>
+            </a:r>
+            <a:r>
+              <a:rPr lang="en-US" altLang="zh-CN" dirty="0" err="1"/>
+              <a:t>shapeError</a:t>
+            </a:r>
+            <a:r>
+              <a:rPr lang="en-US" altLang="zh-CN" dirty="0"/>
+              <a:t>, option 1,</a:t>
+            </a:r>
+            <a:r>
+              <a:rPr lang="zh-CN" altLang="en-US" dirty="0"/>
+              <a:t> </a:t>
+            </a:r>
+            <a:r>
+              <a:rPr lang="en-US" altLang="zh-CN" dirty="0"/>
+              <a:t>reduced</a:t>
+            </a:r>
+            <a:r>
+              <a:rPr lang="zh-CN" altLang="en-US" dirty="0"/>
+              <a:t> </a:t>
+            </a:r>
+            <a:r>
+              <a:rPr lang="en-US" altLang="zh-CN" dirty="0"/>
+              <a:t>power</a:t>
             </a:r>
             <a:endParaRPr lang="zh-CN" altLang="en-US" dirty="0"/>
           </a:p>
@@ -5272,7 +5632,7 @@
           <p:cNvPr id="7" name="图片 6">
             <a:extLst>
               <a:ext uri="{FF2B5EF4-FFF2-40B4-BE49-F238E27FC236}">
-                <a16:creationId xmlns:a16="http://schemas.microsoft.com/office/drawing/2014/main" id="{0695FD20-324B-4EC0-A6C5-FBF4633B6AD7}"/>
+                <a16:creationId xmlns:a16="http://schemas.microsoft.com/office/drawing/2014/main" id="{DB5FBFFD-DE71-4C56-9412-C50707790726}"/>
               </a:ext>
             </a:extLst>
           </p:cNvPr>
@@ -5294,8 +5654,8 @@
         </p:blipFill>
         <p:spPr>
           <a:xfrm>
-            <a:off x="143431" y="1466568"/>
-            <a:ext cx="4320000" cy="4320000"/>
+            <a:off x="264002" y="4378267"/>
+            <a:ext cx="11663995" cy="2159999"/>
           </a:xfrm>
           <a:prstGeom prst="rect">
             <a:avLst/>
@@ -5304,10 +5664,10 @@
       </p:pic>
       <p:pic>
         <p:nvPicPr>
-          <p:cNvPr id="11" name="图片 10">
-            <a:extLst>
-              <a:ext uri="{FF2B5EF4-FFF2-40B4-BE49-F238E27FC236}">
-                <a16:creationId xmlns:a16="http://schemas.microsoft.com/office/drawing/2014/main" id="{E5628EC7-BA5C-4CB6-9488-0D3B767DE1A7}"/>
+          <p:cNvPr id="10" name="图片 9">
+            <a:extLst>
+              <a:ext uri="{FF2B5EF4-FFF2-40B4-BE49-F238E27FC236}">
+                <a16:creationId xmlns:a16="http://schemas.microsoft.com/office/drawing/2014/main" id="{8FB56705-0751-4B8D-9402-1DF1321A5E10}"/>
               </a:ext>
             </a:extLst>
           </p:cNvPr>
@@ -5329,159 +5689,18 @@
         </p:blipFill>
         <p:spPr>
           <a:xfrm>
-            <a:off x="4826695" y="1166796"/>
-            <a:ext cx="3240000" cy="3240000"/>
+            <a:off x="264002" y="1954478"/>
+            <a:ext cx="11663995" cy="2159998"/>
           </a:xfrm>
           <a:prstGeom prst="rect">
             <a:avLst/>
           </a:prstGeom>
         </p:spPr>
       </p:pic>
-      <p:pic>
-        <p:nvPicPr>
-          <p:cNvPr id="13" name="图片 12">
-            <a:extLst>
-              <a:ext uri="{FF2B5EF4-FFF2-40B4-BE49-F238E27FC236}">
-                <a16:creationId xmlns:a16="http://schemas.microsoft.com/office/drawing/2014/main" id="{96DD5AB7-74FD-47AC-98EA-290C937072DC}"/>
-              </a:ext>
-            </a:extLst>
-          </p:cNvPr>
-          <p:cNvPicPr>
-            <a:picLocks noChangeAspect="1"/>
-          </p:cNvPicPr>
-          <p:nvPr/>
-        </p:nvPicPr>
-        <p:blipFill>
-          <a:blip r:embed="rId5">
-            <a:extLst>
-              <a:ext uri="{28A0092B-C50C-407E-A947-70E740481C1C}">
-                <a14:useLocalDpi xmlns:a14="http://schemas.microsoft.com/office/drawing/2010/main" val="0"/>
-              </a:ext>
-            </a:extLst>
-          </a:blip>
-          <a:srcRect/>
-          <a:stretch/>
-        </p:blipFill>
-        <p:spPr>
-          <a:xfrm>
-            <a:off x="4821677" y="3882903"/>
-            <a:ext cx="3240000" cy="3240000"/>
-          </a:xfrm>
-          <a:prstGeom prst="rect">
-            <a:avLst/>
-          </a:prstGeom>
-        </p:spPr>
-      </p:pic>
-      <p:pic>
-        <p:nvPicPr>
-          <p:cNvPr id="15" name="图片 14">
-            <a:extLst>
-              <a:ext uri="{FF2B5EF4-FFF2-40B4-BE49-F238E27FC236}">
-                <a16:creationId xmlns:a16="http://schemas.microsoft.com/office/drawing/2014/main" id="{37D5B7FD-4547-422A-B3A4-F8B9F0FF001D}"/>
-              </a:ext>
-            </a:extLst>
-          </p:cNvPr>
-          <p:cNvPicPr>
-            <a:picLocks noChangeAspect="1"/>
-          </p:cNvPicPr>
-          <p:nvPr/>
-        </p:nvPicPr>
-        <p:blipFill>
-          <a:blip r:embed="rId6">
-            <a:extLst>
-              <a:ext uri="{28A0092B-C50C-407E-A947-70E740481C1C}">
-                <a14:useLocalDpi xmlns:a14="http://schemas.microsoft.com/office/drawing/2010/main" val="0"/>
-              </a:ext>
-            </a:extLst>
-          </a:blip>
-          <a:srcRect/>
-          <a:stretch/>
-        </p:blipFill>
-        <p:spPr>
-          <a:xfrm>
-            <a:off x="8471990" y="1166796"/>
-            <a:ext cx="3240000" cy="3240000"/>
-          </a:xfrm>
-          <a:prstGeom prst="rect">
-            <a:avLst/>
-          </a:prstGeom>
-        </p:spPr>
-      </p:pic>
-      <p:pic>
-        <p:nvPicPr>
-          <p:cNvPr id="17" name="图片 16">
-            <a:extLst>
-              <a:ext uri="{FF2B5EF4-FFF2-40B4-BE49-F238E27FC236}">
-                <a16:creationId xmlns:a16="http://schemas.microsoft.com/office/drawing/2014/main" id="{C9206398-C7CA-4063-8AF7-467401B14B6C}"/>
-              </a:ext>
-            </a:extLst>
-          </p:cNvPr>
-          <p:cNvPicPr>
-            <a:picLocks noChangeAspect="1"/>
-          </p:cNvPicPr>
-          <p:nvPr/>
-        </p:nvPicPr>
-        <p:blipFill>
-          <a:blip r:embed="rId7">
-            <a:extLst>
-              <a:ext uri="{28A0092B-C50C-407E-A947-70E740481C1C}">
-                <a14:useLocalDpi xmlns:a14="http://schemas.microsoft.com/office/drawing/2010/main" val="0"/>
-              </a:ext>
-            </a:extLst>
-          </a:blip>
-          <a:srcRect/>
-          <a:stretch/>
-        </p:blipFill>
-        <p:spPr>
-          <a:xfrm>
-            <a:off x="8471990" y="3882903"/>
-            <a:ext cx="3240000" cy="3240000"/>
-          </a:xfrm>
-          <a:prstGeom prst="rect">
-            <a:avLst/>
-          </a:prstGeom>
-        </p:spPr>
-      </p:pic>
-      <p:sp>
-        <p:nvSpPr>
-          <p:cNvPr id="18" name="文本框 17">
-            <a:extLst>
-              <a:ext uri="{FF2B5EF4-FFF2-40B4-BE49-F238E27FC236}">
-                <a16:creationId xmlns:a16="http://schemas.microsoft.com/office/drawing/2014/main" id="{ECD58FBA-3E13-4416-8A8D-3A5BB1FCF885}"/>
-              </a:ext>
-            </a:extLst>
-          </p:cNvPr>
-          <p:cNvSpPr txBox="1"/>
-          <p:nvPr/>
-        </p:nvSpPr>
-        <p:spPr>
-          <a:xfrm>
-            <a:off x="268945" y="5846544"/>
-            <a:ext cx="4257243" cy="646331"/>
-          </a:xfrm>
-          <a:prstGeom prst="rect">
-            <a:avLst/>
-          </a:prstGeom>
-          <a:noFill/>
-        </p:spPr>
-        <p:txBody>
-          <a:bodyPr wrap="square" rtlCol="0">
-            <a:spAutoFit/>
-          </a:bodyPr>
-          <a:lstStyle/>
-          <a:p>
-            <a:r>
-              <a:rPr lang="en-US" altLang="zh-CN" dirty="0"/>
-              <a:t>Open slit, beam cut off in x due to telescope mirror 2 (1m)</a:t>
-            </a:r>
-            <a:endParaRPr lang="zh-CN" altLang="en-US" dirty="0"/>
-          </a:p>
-        </p:txBody>
-      </p:sp>
     </p:spTree>
     <p:extLst>
       <p:ext uri="{BB962C8B-B14F-4D97-AF65-F5344CB8AC3E}">
-        <p14:creationId xmlns:p14="http://schemas.microsoft.com/office/powerpoint/2010/main" val="2443975983"/>
+        <p14:creationId xmlns:p14="http://schemas.microsoft.com/office/powerpoint/2010/main" val="1484673601"/>
       </p:ext>
     </p:extLst>
   </p:cSld>
@@ -5531,7 +5750,7 @@
           <a:p>
             <a:r>
               <a:rPr lang="en-US" altLang="zh-CN" dirty="0"/>
-              <a:t>Beam profile with perfect optics, output</a:t>
+              <a:t>Beam profile with perfect optics, focus</a:t>
             </a:r>
             <a:endParaRPr lang="zh-CN" altLang="en-US" dirty="0"/>
           </a:p>
@@ -5539,45 +5758,10 @@
       </p:sp>
       <p:pic>
         <p:nvPicPr>
-          <p:cNvPr id="11" name="图片 10">
-            <a:extLst>
-              <a:ext uri="{FF2B5EF4-FFF2-40B4-BE49-F238E27FC236}">
-                <a16:creationId xmlns:a16="http://schemas.microsoft.com/office/drawing/2014/main" id="{E5628EC7-BA5C-4CB6-9488-0D3B767DE1A7}"/>
-              </a:ext>
-            </a:extLst>
-          </p:cNvPr>
-          <p:cNvPicPr>
-            <a:picLocks noChangeAspect="1"/>
-          </p:cNvPicPr>
-          <p:nvPr/>
-        </p:nvPicPr>
-        <p:blipFill>
-          <a:blip r:embed="rId2">
-            <a:extLst>
-              <a:ext uri="{28A0092B-C50C-407E-A947-70E740481C1C}">
-                <a14:useLocalDpi xmlns:a14="http://schemas.microsoft.com/office/drawing/2010/main" val="0"/>
-              </a:ext>
-            </a:extLst>
-          </a:blip>
-          <a:srcRect/>
-          <a:stretch/>
-        </p:blipFill>
-        <p:spPr>
-          <a:xfrm>
-            <a:off x="4826695" y="1166796"/>
-            <a:ext cx="3240000" cy="3240000"/>
-          </a:xfrm>
-          <a:prstGeom prst="rect">
-            <a:avLst/>
-          </a:prstGeom>
-        </p:spPr>
-      </p:pic>
-      <p:pic>
-        <p:nvPicPr>
-          <p:cNvPr id="13" name="图片 12">
-            <a:extLst>
-              <a:ext uri="{FF2B5EF4-FFF2-40B4-BE49-F238E27FC236}">
-                <a16:creationId xmlns:a16="http://schemas.microsoft.com/office/drawing/2014/main" id="{96DD5AB7-74FD-47AC-98EA-290C937072DC}"/>
+          <p:cNvPr id="7" name="图片 6">
+            <a:extLst>
+              <a:ext uri="{FF2B5EF4-FFF2-40B4-BE49-F238E27FC236}">
+                <a16:creationId xmlns:a16="http://schemas.microsoft.com/office/drawing/2014/main" id="{0695FD20-324B-4EC0-A6C5-FBF4633B6AD7}"/>
               </a:ext>
             </a:extLst>
           </p:cNvPr>
@@ -5599,8 +5783,8 @@
         </p:blipFill>
         <p:spPr>
           <a:xfrm>
-            <a:off x="4821677" y="3882903"/>
-            <a:ext cx="3240000" cy="3240000"/>
+            <a:off x="143431" y="1466568"/>
+            <a:ext cx="4320000" cy="4320000"/>
           </a:xfrm>
           <a:prstGeom prst="rect">
             <a:avLst/>
@@ -5609,10 +5793,10 @@
       </p:pic>
       <p:pic>
         <p:nvPicPr>
-          <p:cNvPr id="15" name="图片 14">
-            <a:extLst>
-              <a:ext uri="{FF2B5EF4-FFF2-40B4-BE49-F238E27FC236}">
-                <a16:creationId xmlns:a16="http://schemas.microsoft.com/office/drawing/2014/main" id="{37D5B7FD-4547-422A-B3A4-F8B9F0FF001D}"/>
+          <p:cNvPr id="11" name="图片 10">
+            <a:extLst>
+              <a:ext uri="{FF2B5EF4-FFF2-40B4-BE49-F238E27FC236}">
+                <a16:creationId xmlns:a16="http://schemas.microsoft.com/office/drawing/2014/main" id="{E5628EC7-BA5C-4CB6-9488-0D3B767DE1A7}"/>
               </a:ext>
             </a:extLst>
           </p:cNvPr>
@@ -5634,7 +5818,7 @@
         </p:blipFill>
         <p:spPr>
           <a:xfrm>
-            <a:off x="8471990" y="1166796"/>
+            <a:off x="4826695" y="1166796"/>
             <a:ext cx="3240000" cy="3240000"/>
           </a:xfrm>
           <a:prstGeom prst="rect">
@@ -5644,10 +5828,10 @@
       </p:pic>
       <p:pic>
         <p:nvPicPr>
-          <p:cNvPr id="17" name="图片 16">
-            <a:extLst>
-              <a:ext uri="{FF2B5EF4-FFF2-40B4-BE49-F238E27FC236}">
-                <a16:creationId xmlns:a16="http://schemas.microsoft.com/office/drawing/2014/main" id="{C9206398-C7CA-4063-8AF7-467401B14B6C}"/>
+          <p:cNvPr id="13" name="图片 12">
+            <a:extLst>
+              <a:ext uri="{FF2B5EF4-FFF2-40B4-BE49-F238E27FC236}">
+                <a16:creationId xmlns:a16="http://schemas.microsoft.com/office/drawing/2014/main" id="{96DD5AB7-74FD-47AC-98EA-290C937072DC}"/>
               </a:ext>
             </a:extLst>
           </p:cNvPr>
@@ -5658,6 +5842,311 @@
         </p:nvPicPr>
         <p:blipFill>
           <a:blip r:embed="rId5">
+            <a:extLst>
+              <a:ext uri="{28A0092B-C50C-407E-A947-70E740481C1C}">
+                <a14:useLocalDpi xmlns:a14="http://schemas.microsoft.com/office/drawing/2010/main" val="0"/>
+              </a:ext>
+            </a:extLst>
+          </a:blip>
+          <a:srcRect/>
+          <a:stretch/>
+        </p:blipFill>
+        <p:spPr>
+          <a:xfrm>
+            <a:off x="4821677" y="3882903"/>
+            <a:ext cx="3240000" cy="3240000"/>
+          </a:xfrm>
+          <a:prstGeom prst="rect">
+            <a:avLst/>
+          </a:prstGeom>
+        </p:spPr>
+      </p:pic>
+      <p:pic>
+        <p:nvPicPr>
+          <p:cNvPr id="15" name="图片 14">
+            <a:extLst>
+              <a:ext uri="{FF2B5EF4-FFF2-40B4-BE49-F238E27FC236}">
+                <a16:creationId xmlns:a16="http://schemas.microsoft.com/office/drawing/2014/main" id="{37D5B7FD-4547-422A-B3A4-F8B9F0FF001D}"/>
+              </a:ext>
+            </a:extLst>
+          </p:cNvPr>
+          <p:cNvPicPr>
+            <a:picLocks noChangeAspect="1"/>
+          </p:cNvPicPr>
+          <p:nvPr/>
+        </p:nvPicPr>
+        <p:blipFill>
+          <a:blip r:embed="rId6">
+            <a:extLst>
+              <a:ext uri="{28A0092B-C50C-407E-A947-70E740481C1C}">
+                <a14:useLocalDpi xmlns:a14="http://schemas.microsoft.com/office/drawing/2010/main" val="0"/>
+              </a:ext>
+            </a:extLst>
+          </a:blip>
+          <a:srcRect/>
+          <a:stretch/>
+        </p:blipFill>
+        <p:spPr>
+          <a:xfrm>
+            <a:off x="8471990" y="1166796"/>
+            <a:ext cx="3240000" cy="3240000"/>
+          </a:xfrm>
+          <a:prstGeom prst="rect">
+            <a:avLst/>
+          </a:prstGeom>
+        </p:spPr>
+      </p:pic>
+      <p:pic>
+        <p:nvPicPr>
+          <p:cNvPr id="17" name="图片 16">
+            <a:extLst>
+              <a:ext uri="{FF2B5EF4-FFF2-40B4-BE49-F238E27FC236}">
+                <a16:creationId xmlns:a16="http://schemas.microsoft.com/office/drawing/2014/main" id="{C9206398-C7CA-4063-8AF7-467401B14B6C}"/>
+              </a:ext>
+            </a:extLst>
+          </p:cNvPr>
+          <p:cNvPicPr>
+            <a:picLocks noChangeAspect="1"/>
+          </p:cNvPicPr>
+          <p:nvPr/>
+        </p:nvPicPr>
+        <p:blipFill>
+          <a:blip r:embed="rId7">
+            <a:extLst>
+              <a:ext uri="{28A0092B-C50C-407E-A947-70E740481C1C}">
+                <a14:useLocalDpi xmlns:a14="http://schemas.microsoft.com/office/drawing/2010/main" val="0"/>
+              </a:ext>
+            </a:extLst>
+          </a:blip>
+          <a:srcRect/>
+          <a:stretch/>
+        </p:blipFill>
+        <p:spPr>
+          <a:xfrm>
+            <a:off x="8471990" y="3882903"/>
+            <a:ext cx="3240000" cy="3240000"/>
+          </a:xfrm>
+          <a:prstGeom prst="rect">
+            <a:avLst/>
+          </a:prstGeom>
+        </p:spPr>
+      </p:pic>
+      <p:sp>
+        <p:nvSpPr>
+          <p:cNvPr id="18" name="文本框 17">
+            <a:extLst>
+              <a:ext uri="{FF2B5EF4-FFF2-40B4-BE49-F238E27FC236}">
+                <a16:creationId xmlns:a16="http://schemas.microsoft.com/office/drawing/2014/main" id="{ECD58FBA-3E13-4416-8A8D-3A5BB1FCF885}"/>
+              </a:ext>
+            </a:extLst>
+          </p:cNvPr>
+          <p:cNvSpPr txBox="1"/>
+          <p:nvPr/>
+        </p:nvSpPr>
+        <p:spPr>
+          <a:xfrm>
+            <a:off x="268945" y="5846544"/>
+            <a:ext cx="4257243" cy="646331"/>
+          </a:xfrm>
+          <a:prstGeom prst="rect">
+            <a:avLst/>
+          </a:prstGeom>
+          <a:noFill/>
+        </p:spPr>
+        <p:txBody>
+          <a:bodyPr wrap="square" rtlCol="0">
+            <a:spAutoFit/>
+          </a:bodyPr>
+          <a:lstStyle/>
+          <a:p>
+            <a:r>
+              <a:rPr lang="en-US" altLang="zh-CN" dirty="0"/>
+              <a:t>Open slit, beam cut off in x due to telescope mirror 2 (1m)</a:t>
+            </a:r>
+            <a:endParaRPr lang="zh-CN" altLang="en-US" dirty="0"/>
+          </a:p>
+        </p:txBody>
+      </p:sp>
+    </p:spTree>
+    <p:extLst>
+      <p:ext uri="{BB962C8B-B14F-4D97-AF65-F5344CB8AC3E}">
+        <p14:creationId xmlns:p14="http://schemas.microsoft.com/office/powerpoint/2010/main" val="2443975983"/>
+      </p:ext>
+    </p:extLst>
+  </p:cSld>
+  <p:clrMapOvr>
+    <a:masterClrMapping/>
+  </p:clrMapOvr>
+</p:sld>
+</file>
+
+<file path=ppt/slides/slide16.xml><?xml version="1.0" encoding="utf-8"?>
+<p:sld xmlns:a="http://schemas.openxmlformats.org/drawingml/2006/main" xmlns:r="http://schemas.openxmlformats.org/officeDocument/2006/relationships" xmlns:p="http://schemas.openxmlformats.org/presentationml/2006/main">
+  <p:cSld>
+    <p:spTree>
+      <p:nvGrpSpPr>
+        <p:cNvPr id="1" name=""/>
+        <p:cNvGrpSpPr/>
+        <p:nvPr/>
+      </p:nvGrpSpPr>
+      <p:grpSpPr>
+        <a:xfrm>
+          <a:off x="0" y="0"/>
+          <a:ext cx="0" cy="0"/>
+          <a:chOff x="0" y="0"/>
+          <a:chExt cx="0" cy="0"/>
+        </a:xfrm>
+      </p:grpSpPr>
+      <p:sp>
+        <p:nvSpPr>
+          <p:cNvPr id="2" name="标题 1">
+            <a:extLst>
+              <a:ext uri="{FF2B5EF4-FFF2-40B4-BE49-F238E27FC236}">
+                <a16:creationId xmlns:a16="http://schemas.microsoft.com/office/drawing/2014/main" id="{E992A8B7-1629-42FE-AA40-407523A09B1A}"/>
+              </a:ext>
+            </a:extLst>
+          </p:cNvPr>
+          <p:cNvSpPr>
+            <a:spLocks noGrp="1"/>
+          </p:cNvSpPr>
+          <p:nvPr>
+            <p:ph type="title"/>
+          </p:nvPr>
+        </p:nvSpPr>
+        <p:spPr/>
+        <p:txBody>
+          <a:bodyPr/>
+          <a:lstStyle/>
+          <a:p>
+            <a:r>
+              <a:rPr lang="en-US" altLang="zh-CN" dirty="0"/>
+              <a:t>Beam profile with perfect optics, output</a:t>
+            </a:r>
+            <a:endParaRPr lang="zh-CN" altLang="en-US" dirty="0"/>
+          </a:p>
+        </p:txBody>
+      </p:sp>
+      <p:pic>
+        <p:nvPicPr>
+          <p:cNvPr id="11" name="图片 10">
+            <a:extLst>
+              <a:ext uri="{FF2B5EF4-FFF2-40B4-BE49-F238E27FC236}">
+                <a16:creationId xmlns:a16="http://schemas.microsoft.com/office/drawing/2014/main" id="{E5628EC7-BA5C-4CB6-9488-0D3B767DE1A7}"/>
+              </a:ext>
+            </a:extLst>
+          </p:cNvPr>
+          <p:cNvPicPr>
+            <a:picLocks noChangeAspect="1"/>
+          </p:cNvPicPr>
+          <p:nvPr/>
+        </p:nvPicPr>
+        <p:blipFill>
+          <a:blip r:embed="rId3">
+            <a:extLst>
+              <a:ext uri="{28A0092B-C50C-407E-A947-70E740481C1C}">
+                <a14:useLocalDpi xmlns:a14="http://schemas.microsoft.com/office/drawing/2010/main" val="0"/>
+              </a:ext>
+            </a:extLst>
+          </a:blip>
+          <a:srcRect/>
+          <a:stretch/>
+        </p:blipFill>
+        <p:spPr>
+          <a:xfrm>
+            <a:off x="4826695" y="1166796"/>
+            <a:ext cx="3240000" cy="3240000"/>
+          </a:xfrm>
+          <a:prstGeom prst="rect">
+            <a:avLst/>
+          </a:prstGeom>
+        </p:spPr>
+      </p:pic>
+      <p:pic>
+        <p:nvPicPr>
+          <p:cNvPr id="13" name="图片 12">
+            <a:extLst>
+              <a:ext uri="{FF2B5EF4-FFF2-40B4-BE49-F238E27FC236}">
+                <a16:creationId xmlns:a16="http://schemas.microsoft.com/office/drawing/2014/main" id="{96DD5AB7-74FD-47AC-98EA-290C937072DC}"/>
+              </a:ext>
+            </a:extLst>
+          </p:cNvPr>
+          <p:cNvPicPr>
+            <a:picLocks noChangeAspect="1"/>
+          </p:cNvPicPr>
+          <p:nvPr/>
+        </p:nvPicPr>
+        <p:blipFill>
+          <a:blip r:embed="rId4">
+            <a:extLst>
+              <a:ext uri="{28A0092B-C50C-407E-A947-70E740481C1C}">
+                <a14:useLocalDpi xmlns:a14="http://schemas.microsoft.com/office/drawing/2010/main" val="0"/>
+              </a:ext>
+            </a:extLst>
+          </a:blip>
+          <a:srcRect/>
+          <a:stretch/>
+        </p:blipFill>
+        <p:spPr>
+          <a:xfrm>
+            <a:off x="4821677" y="3882903"/>
+            <a:ext cx="3240000" cy="3240000"/>
+          </a:xfrm>
+          <a:prstGeom prst="rect">
+            <a:avLst/>
+          </a:prstGeom>
+        </p:spPr>
+      </p:pic>
+      <p:pic>
+        <p:nvPicPr>
+          <p:cNvPr id="15" name="图片 14">
+            <a:extLst>
+              <a:ext uri="{FF2B5EF4-FFF2-40B4-BE49-F238E27FC236}">
+                <a16:creationId xmlns:a16="http://schemas.microsoft.com/office/drawing/2014/main" id="{37D5B7FD-4547-422A-B3A4-F8B9F0FF001D}"/>
+              </a:ext>
+            </a:extLst>
+          </p:cNvPr>
+          <p:cNvPicPr>
+            <a:picLocks noChangeAspect="1"/>
+          </p:cNvPicPr>
+          <p:nvPr/>
+        </p:nvPicPr>
+        <p:blipFill>
+          <a:blip r:embed="rId5">
+            <a:extLst>
+              <a:ext uri="{28A0092B-C50C-407E-A947-70E740481C1C}">
+                <a14:useLocalDpi xmlns:a14="http://schemas.microsoft.com/office/drawing/2010/main" val="0"/>
+              </a:ext>
+            </a:extLst>
+          </a:blip>
+          <a:srcRect/>
+          <a:stretch/>
+        </p:blipFill>
+        <p:spPr>
+          <a:xfrm>
+            <a:off x="8471990" y="1166796"/>
+            <a:ext cx="3240000" cy="3240000"/>
+          </a:xfrm>
+          <a:prstGeom prst="rect">
+            <a:avLst/>
+          </a:prstGeom>
+        </p:spPr>
+      </p:pic>
+      <p:pic>
+        <p:nvPicPr>
+          <p:cNvPr id="17" name="图片 16">
+            <a:extLst>
+              <a:ext uri="{FF2B5EF4-FFF2-40B4-BE49-F238E27FC236}">
+                <a16:creationId xmlns:a16="http://schemas.microsoft.com/office/drawing/2014/main" id="{C9206398-C7CA-4063-8AF7-467401B14B6C}"/>
+              </a:ext>
+            </a:extLst>
+          </p:cNvPr>
+          <p:cNvPicPr>
+            <a:picLocks noChangeAspect="1"/>
+          </p:cNvPicPr>
+          <p:nvPr/>
+        </p:nvPicPr>
+        <p:blipFill>
+          <a:blip r:embed="rId6">
             <a:extLst>
               <a:ext uri="{28A0092B-C50C-407E-A947-70E740481C1C}">
                 <a14:useLocalDpi xmlns:a14="http://schemas.microsoft.com/office/drawing/2010/main" val="0"/>
@@ -5712,7 +6201,7 @@
             <p:nvPr/>
           </p:nvPicPr>
           <p:blipFill>
-            <a:blip r:embed="rId6">
+            <a:blip r:embed="rId7">
               <a:extLst>
                 <a:ext uri="{28A0092B-C50C-407E-A947-70E740481C1C}">
                   <a14:useLocalDpi xmlns:a14="http://schemas.microsoft.com/office/drawing/2010/main" val="0"/>
@@ -5812,7 +6301,7 @@
             <p:nvPr/>
           </p:nvPicPr>
           <p:blipFill rotWithShape="1">
-            <a:blip r:embed="rId7">
+            <a:blip r:embed="rId8">
               <a:extLst>
                 <a:ext uri="{28A0092B-C50C-407E-A947-70E740481C1C}">
                   <a14:useLocalDpi xmlns:a14="http://schemas.microsoft.com/office/drawing/2010/main" val="0"/>
@@ -6066,7 +6555,7 @@
 </p:sld>
 </file>
 
-<file path=ppt/slides/slide16.xml><?xml version="1.0" encoding="utf-8"?>
+<file path=ppt/slides/slide17.xml><?xml version="1.0" encoding="utf-8"?>
 <p:sld xmlns:a="http://schemas.openxmlformats.org/drawingml/2006/main" xmlns:r="http://schemas.openxmlformats.org/officeDocument/2006/relationships" xmlns:p="http://schemas.openxmlformats.org/presentationml/2006/main">
   <p:cSld>
     <p:spTree>

</xml_diff>